<commit_message>
presentation includes Ingestion graphs and montage of providers
</commit_message>
<xml_diff>
--- a/Dan_CYWG_2014.pptx
+++ b/Dan_CYWG_2014.pptx
@@ -3,15 +3,16 @@
 <p:presentation xmlns:a="http://schemas.openxmlformats.org/drawingml/2006/main" xmlns:p="http://schemas.openxmlformats.org/presentationml/2006/main" xmlns:r="http://schemas.openxmlformats.org/officeDocument/2006/relationships">
   <p:sldMasterIdLst>
     <p:sldMasterId id="2147483648" r:id="rId2"/>
+    <p:sldMasterId id="2147483661" r:id="rId3"/>
   </p:sldMasterIdLst>
   <p:sldIdLst>
-    <p:sldId id="256" r:id="rId3"/>
-    <p:sldId id="257" r:id="rId4"/>
-    <p:sldId id="258" r:id="rId5"/>
-    <p:sldId id="259" r:id="rId6"/>
-    <p:sldId id="260" r:id="rId7"/>
-    <p:sldId id="261" r:id="rId8"/>
-    <p:sldId id="262" r:id="rId9"/>
+    <p:sldId id="256" r:id="rId4"/>
+    <p:sldId id="257" r:id="rId5"/>
+    <p:sldId id="258" r:id="rId6"/>
+    <p:sldId id="259" r:id="rId7"/>
+    <p:sldId id="260" r:id="rId8"/>
+    <p:sldId id="261" r:id="rId9"/>
+    <p:sldId id="262" r:id="rId10"/>
   </p:sldIdLst>
   <p:sldSz cx="9144000" cy="6858000"/>
   <p:notesSz cx="7772400" cy="10058400"/>
@@ -70,7 +71,7 @@
         <p:spPr>
           <a:xfrm>
             <a:off x="685800" y="1406880"/>
-            <a:ext cx="7772040" cy="941400"/>
+            <a:ext cx="7771680" cy="941400"/>
           </a:xfrm>
           <a:prstGeom prst="rect">
             <a:avLst/>
@@ -79,6 +80,7 @@
         <p:txBody>
           <a:bodyPr lIns="0" rIns="0" tIns="0" bIns="0" anchor="ctr"/>
           <a:p>
+            <a:pPr algn="ctr"/>
             <a:endParaRPr/>
           </a:p>
         </p:txBody>
@@ -96,7 +98,7 @@
         <p:spPr>
           <a:xfrm>
             <a:off x="457200" y="1604520"/>
-            <a:ext cx="8229240" cy="1896840"/>
+            <a:ext cx="8228880" cy="1896840"/>
           </a:xfrm>
           <a:prstGeom prst="rect">
             <a:avLst/>
@@ -122,7 +124,7 @@
         <p:spPr>
           <a:xfrm>
             <a:off x="457200" y="3682080"/>
-            <a:ext cx="8229240" cy="1896840"/>
+            <a:ext cx="8228880" cy="1896840"/>
           </a:xfrm>
           <a:prstGeom prst="rect">
             <a:avLst/>
@@ -170,7 +172,7 @@
         <p:spPr>
           <a:xfrm>
             <a:off x="685800" y="1406880"/>
-            <a:ext cx="7772040" cy="941400"/>
+            <a:ext cx="7771680" cy="941400"/>
           </a:xfrm>
           <a:prstGeom prst="rect">
             <a:avLst/>
@@ -179,6 +181,7 @@
         <p:txBody>
           <a:bodyPr lIns="0" rIns="0" tIns="0" bIns="0" anchor="ctr"/>
           <a:p>
+            <a:pPr algn="ctr"/>
             <a:endParaRPr/>
           </a:p>
         </p:txBody>
@@ -196,7 +199,7 @@
         <p:spPr>
           <a:xfrm>
             <a:off x="457200" y="1604520"/>
-            <a:ext cx="4015800" cy="1896840"/>
+            <a:ext cx="4015440" cy="1896840"/>
           </a:xfrm>
           <a:prstGeom prst="rect">
             <a:avLst/>
@@ -221,8 +224,8 @@
         </p:nvSpPr>
         <p:spPr>
           <a:xfrm>
-            <a:off x="4674240" y="1604520"/>
-            <a:ext cx="4015800" cy="1896840"/>
+            <a:off x="4673880" y="1604520"/>
+            <a:ext cx="4015440" cy="1896840"/>
           </a:xfrm>
           <a:prstGeom prst="rect">
             <a:avLst/>
@@ -247,8 +250,8 @@
         </p:nvSpPr>
         <p:spPr>
           <a:xfrm>
-            <a:off x="4674240" y="3682080"/>
-            <a:ext cx="4015800" cy="1896840"/>
+            <a:off x="4673880" y="3682080"/>
+            <a:ext cx="4015440" cy="1896840"/>
           </a:xfrm>
           <a:prstGeom prst="rect">
             <a:avLst/>
@@ -274,7 +277,7 @@
         <p:spPr>
           <a:xfrm>
             <a:off x="457200" y="3682080"/>
-            <a:ext cx="4015800" cy="1896840"/>
+            <a:ext cx="4015440" cy="1896840"/>
           </a:xfrm>
           <a:prstGeom prst="rect">
             <a:avLst/>
@@ -322,7 +325,7 @@
         <p:spPr>
           <a:xfrm>
             <a:off x="685800" y="1406880"/>
-            <a:ext cx="7772040" cy="941400"/>
+            <a:ext cx="7771680" cy="941400"/>
           </a:xfrm>
           <a:prstGeom prst="rect">
             <a:avLst/>
@@ -331,6 +334,7 @@
         <p:txBody>
           <a:bodyPr lIns="0" rIns="0" tIns="0" bIns="0" anchor="ctr"/>
           <a:p>
+            <a:pPr algn="ctr"/>
             <a:endParaRPr/>
           </a:p>
         </p:txBody>
@@ -348,7 +352,7 @@
         <p:spPr>
           <a:xfrm>
             <a:off x="457200" y="1604520"/>
-            <a:ext cx="8229240" cy="3977280"/>
+            <a:ext cx="8228880" cy="3976920"/>
           </a:xfrm>
           <a:prstGeom prst="rect">
             <a:avLst/>
@@ -374,7 +378,7 @@
         <p:spPr>
           <a:xfrm>
             <a:off x="457200" y="1604520"/>
-            <a:ext cx="8229240" cy="3977280"/>
+            <a:ext cx="8228880" cy="3976920"/>
           </a:xfrm>
           <a:prstGeom prst="rect">
             <a:avLst/>
@@ -401,8 +405,8 @@
         </p:blipFill>
         <p:spPr>
           <a:xfrm>
-            <a:off x="2079000" y="1604520"/>
-            <a:ext cx="4984920" cy="3977280"/>
+            <a:off x="2079360" y="1604160"/>
+            <a:ext cx="4984200" cy="3976920"/>
           </a:xfrm>
           <a:prstGeom prst="rect">
             <a:avLst/>
@@ -426,8 +430,8 @@
         </p:blipFill>
         <p:spPr>
           <a:xfrm>
-            <a:off x="2079000" y="1604520"/>
-            <a:ext cx="4984920" cy="3977280"/>
+            <a:off x="2079360" y="1604160"/>
+            <a:ext cx="4984200" cy="3976920"/>
           </a:xfrm>
           <a:prstGeom prst="rect">
             <a:avLst/>
@@ -437,6 +441,505 @@
           </a:ln>
         </p:spPr>
       </p:pic>
+    </p:spTree>
+  </p:cSld>
+</p:sldLayout>
+</file>
+
+<file path=ppt/slideLayouts/slideLayout13.xml><?xml version="1.0" encoding="utf-8"?>
+<p:sldLayout xmlns:a="http://schemas.openxmlformats.org/drawingml/2006/main" xmlns:p="http://schemas.openxmlformats.org/presentationml/2006/main" xmlns:r="http://schemas.openxmlformats.org/officeDocument/2006/relationships" type="blank" preserve="1">
+  <p:cSld name="Blank Slide">
+    <p:spTree>
+      <p:nvGrpSpPr>
+        <p:cNvPr id="1" name=""/>
+        <p:cNvGrpSpPr/>
+        <p:nvPr/>
+      </p:nvGrpSpPr>
+      <p:grpSpPr>
+        <a:xfrm>
+          <a:off x="0" y="0"/>
+          <a:ext cx="0" cy="0"/>
+          <a:chOff x="0" y="0"/>
+          <a:chExt cx="0" cy="0"/>
+        </a:xfrm>
+      </p:grpSpPr>
+    </p:spTree>
+  </p:cSld>
+</p:sldLayout>
+</file>
+
+<file path=ppt/slideLayouts/slideLayout14.xml><?xml version="1.0" encoding="utf-8"?>
+<p:sldLayout xmlns:a="http://schemas.openxmlformats.org/drawingml/2006/main" xmlns:p="http://schemas.openxmlformats.org/presentationml/2006/main" xmlns:r="http://schemas.openxmlformats.org/officeDocument/2006/relationships" type="tx" preserve="1">
+  <p:cSld name="Title Slide">
+    <p:spTree>
+      <p:nvGrpSpPr>
+        <p:cNvPr id="1" name=""/>
+        <p:cNvGrpSpPr/>
+        <p:nvPr/>
+      </p:nvGrpSpPr>
+      <p:grpSpPr>
+        <a:xfrm>
+          <a:off x="0" y="0"/>
+          <a:ext cx="0" cy="0"/>
+          <a:chOff x="0" y="0"/>
+          <a:chExt cx="0" cy="0"/>
+        </a:xfrm>
+      </p:grpSpPr>
+      <p:sp>
+        <p:nvSpPr>
+          <p:cNvPr id="62" name="PlaceHolder 1"/>
+          <p:cNvSpPr>
+            <a:spLocks noGrp="1"/>
+          </p:cNvSpPr>
+          <p:nvPr>
+            <p:ph type="title"/>
+          </p:nvPr>
+        </p:nvSpPr>
+        <p:spPr>
+          <a:xfrm>
+            <a:off x="685800" y="1406880"/>
+            <a:ext cx="7771680" cy="941400"/>
+          </a:xfrm>
+          <a:prstGeom prst="rect">
+            <a:avLst/>
+          </a:prstGeom>
+        </p:spPr>
+        <p:txBody>
+          <a:bodyPr lIns="0" rIns="0" tIns="0" bIns="0" anchor="ctr"/>
+          <a:p>
+            <a:pPr algn="ctr"/>
+            <a:endParaRPr/>
+          </a:p>
+        </p:txBody>
+      </p:sp>
+      <p:sp>
+        <p:nvSpPr>
+          <p:cNvPr id="63" name="PlaceHolder 2"/>
+          <p:cNvSpPr>
+            <a:spLocks noGrp="1"/>
+          </p:cNvSpPr>
+          <p:nvPr>
+            <p:ph type="subTitle"/>
+          </p:nvPr>
+        </p:nvSpPr>
+        <p:spPr>
+          <a:xfrm>
+            <a:off x="457200" y="1604520"/>
+            <a:ext cx="8228880" cy="3977280"/>
+          </a:xfrm>
+          <a:prstGeom prst="rect">
+            <a:avLst/>
+          </a:prstGeom>
+        </p:spPr>
+        <p:txBody>
+          <a:bodyPr lIns="0" rIns="0" tIns="0" bIns="0" anchor="ctr"/>
+          <a:p>
+            <a:pPr algn="ctr"/>
+            <a:endParaRPr/>
+          </a:p>
+        </p:txBody>
+      </p:sp>
+    </p:spTree>
+  </p:cSld>
+</p:sldLayout>
+</file>
+
+<file path=ppt/slideLayouts/slideLayout15.xml><?xml version="1.0" encoding="utf-8"?>
+<p:sldLayout xmlns:a="http://schemas.openxmlformats.org/drawingml/2006/main" xmlns:p="http://schemas.openxmlformats.org/presentationml/2006/main" xmlns:r="http://schemas.openxmlformats.org/officeDocument/2006/relationships" type="obj" preserve="1">
+  <p:cSld name="Title, Content">
+    <p:spTree>
+      <p:nvGrpSpPr>
+        <p:cNvPr id="1" name=""/>
+        <p:cNvGrpSpPr/>
+        <p:nvPr/>
+      </p:nvGrpSpPr>
+      <p:grpSpPr>
+        <a:xfrm>
+          <a:off x="0" y="0"/>
+          <a:ext cx="0" cy="0"/>
+          <a:chOff x="0" y="0"/>
+          <a:chExt cx="0" cy="0"/>
+        </a:xfrm>
+      </p:grpSpPr>
+      <p:sp>
+        <p:nvSpPr>
+          <p:cNvPr id="64" name="PlaceHolder 1"/>
+          <p:cNvSpPr>
+            <a:spLocks noGrp="1"/>
+          </p:cNvSpPr>
+          <p:nvPr>
+            <p:ph type="title"/>
+          </p:nvPr>
+        </p:nvSpPr>
+        <p:spPr>
+          <a:xfrm>
+            <a:off x="685800" y="1406880"/>
+            <a:ext cx="7771680" cy="941400"/>
+          </a:xfrm>
+          <a:prstGeom prst="rect">
+            <a:avLst/>
+          </a:prstGeom>
+        </p:spPr>
+        <p:txBody>
+          <a:bodyPr lIns="0" rIns="0" tIns="0" bIns="0" anchor="ctr"/>
+          <a:p>
+            <a:pPr algn="ctr"/>
+            <a:endParaRPr/>
+          </a:p>
+        </p:txBody>
+      </p:sp>
+      <p:sp>
+        <p:nvSpPr>
+          <p:cNvPr id="65" name="PlaceHolder 2"/>
+          <p:cNvSpPr>
+            <a:spLocks noGrp="1"/>
+          </p:cNvSpPr>
+          <p:nvPr>
+            <p:ph type="body"/>
+          </p:nvPr>
+        </p:nvSpPr>
+        <p:spPr>
+          <a:xfrm>
+            <a:off x="457200" y="1604520"/>
+            <a:ext cx="8228880" cy="3976920"/>
+          </a:xfrm>
+          <a:prstGeom prst="rect">
+            <a:avLst/>
+          </a:prstGeom>
+        </p:spPr>
+        <p:txBody>
+          <a:bodyPr lIns="0" rIns="0" tIns="0" bIns="0"/>
+          <a:p>
+            <a:endParaRPr/>
+          </a:p>
+        </p:txBody>
+      </p:sp>
+    </p:spTree>
+  </p:cSld>
+</p:sldLayout>
+</file>
+
+<file path=ppt/slideLayouts/slideLayout16.xml><?xml version="1.0" encoding="utf-8"?>
+<p:sldLayout xmlns:a="http://schemas.openxmlformats.org/drawingml/2006/main" xmlns:p="http://schemas.openxmlformats.org/presentationml/2006/main" xmlns:r="http://schemas.openxmlformats.org/officeDocument/2006/relationships" type="twoObj" preserve="1">
+  <p:cSld name="Title, 2 Content">
+    <p:spTree>
+      <p:nvGrpSpPr>
+        <p:cNvPr id="1" name=""/>
+        <p:cNvGrpSpPr/>
+        <p:nvPr/>
+      </p:nvGrpSpPr>
+      <p:grpSpPr>
+        <a:xfrm>
+          <a:off x="0" y="0"/>
+          <a:ext cx="0" cy="0"/>
+          <a:chOff x="0" y="0"/>
+          <a:chExt cx="0" cy="0"/>
+        </a:xfrm>
+      </p:grpSpPr>
+      <p:sp>
+        <p:nvSpPr>
+          <p:cNvPr id="66" name="PlaceHolder 1"/>
+          <p:cNvSpPr>
+            <a:spLocks noGrp="1"/>
+          </p:cNvSpPr>
+          <p:nvPr>
+            <p:ph type="title"/>
+          </p:nvPr>
+        </p:nvSpPr>
+        <p:spPr>
+          <a:xfrm>
+            <a:off x="685800" y="1406880"/>
+            <a:ext cx="7771680" cy="941400"/>
+          </a:xfrm>
+          <a:prstGeom prst="rect">
+            <a:avLst/>
+          </a:prstGeom>
+        </p:spPr>
+        <p:txBody>
+          <a:bodyPr lIns="0" rIns="0" tIns="0" bIns="0" anchor="ctr"/>
+          <a:p>
+            <a:pPr algn="ctr"/>
+            <a:endParaRPr/>
+          </a:p>
+        </p:txBody>
+      </p:sp>
+      <p:sp>
+        <p:nvSpPr>
+          <p:cNvPr id="67" name="PlaceHolder 2"/>
+          <p:cNvSpPr>
+            <a:spLocks noGrp="1"/>
+          </p:cNvSpPr>
+          <p:nvPr>
+            <p:ph type="body"/>
+          </p:nvPr>
+        </p:nvSpPr>
+        <p:spPr>
+          <a:xfrm>
+            <a:off x="457200" y="1604520"/>
+            <a:ext cx="4015440" cy="3976920"/>
+          </a:xfrm>
+          <a:prstGeom prst="rect">
+            <a:avLst/>
+          </a:prstGeom>
+        </p:spPr>
+        <p:txBody>
+          <a:bodyPr lIns="0" rIns="0" tIns="0" bIns="0"/>
+          <a:p>
+            <a:endParaRPr/>
+          </a:p>
+        </p:txBody>
+      </p:sp>
+      <p:sp>
+        <p:nvSpPr>
+          <p:cNvPr id="68" name="PlaceHolder 3"/>
+          <p:cNvSpPr>
+            <a:spLocks noGrp="1"/>
+          </p:cNvSpPr>
+          <p:nvPr>
+            <p:ph type="body"/>
+          </p:nvPr>
+        </p:nvSpPr>
+        <p:spPr>
+          <a:xfrm>
+            <a:off x="4673880" y="1604520"/>
+            <a:ext cx="4015440" cy="3976920"/>
+          </a:xfrm>
+          <a:prstGeom prst="rect">
+            <a:avLst/>
+          </a:prstGeom>
+        </p:spPr>
+        <p:txBody>
+          <a:bodyPr lIns="0" rIns="0" tIns="0" bIns="0"/>
+          <a:p>
+            <a:endParaRPr/>
+          </a:p>
+        </p:txBody>
+      </p:sp>
+    </p:spTree>
+  </p:cSld>
+</p:sldLayout>
+</file>
+
+<file path=ppt/slideLayouts/slideLayout17.xml><?xml version="1.0" encoding="utf-8"?>
+<p:sldLayout xmlns:a="http://schemas.openxmlformats.org/drawingml/2006/main" xmlns:p="http://schemas.openxmlformats.org/presentationml/2006/main" xmlns:r="http://schemas.openxmlformats.org/officeDocument/2006/relationships" type="titleOnly" preserve="1">
+  <p:cSld name="Title Only">
+    <p:spTree>
+      <p:nvGrpSpPr>
+        <p:cNvPr id="1" name=""/>
+        <p:cNvGrpSpPr/>
+        <p:nvPr/>
+      </p:nvGrpSpPr>
+      <p:grpSpPr>
+        <a:xfrm>
+          <a:off x="0" y="0"/>
+          <a:ext cx="0" cy="0"/>
+          <a:chOff x="0" y="0"/>
+          <a:chExt cx="0" cy="0"/>
+        </a:xfrm>
+      </p:grpSpPr>
+      <p:sp>
+        <p:nvSpPr>
+          <p:cNvPr id="69" name="PlaceHolder 1"/>
+          <p:cNvSpPr>
+            <a:spLocks noGrp="1"/>
+          </p:cNvSpPr>
+          <p:nvPr>
+            <p:ph type="title"/>
+          </p:nvPr>
+        </p:nvSpPr>
+        <p:spPr>
+          <a:xfrm>
+            <a:off x="685800" y="1406880"/>
+            <a:ext cx="7771680" cy="941400"/>
+          </a:xfrm>
+          <a:prstGeom prst="rect">
+            <a:avLst/>
+          </a:prstGeom>
+        </p:spPr>
+        <p:txBody>
+          <a:bodyPr lIns="0" rIns="0" tIns="0" bIns="0" anchor="ctr"/>
+          <a:p>
+            <a:pPr algn="ctr"/>
+            <a:endParaRPr/>
+          </a:p>
+        </p:txBody>
+      </p:sp>
+    </p:spTree>
+  </p:cSld>
+</p:sldLayout>
+</file>
+
+<file path=ppt/slideLayouts/slideLayout18.xml><?xml version="1.0" encoding="utf-8"?>
+<p:sldLayout xmlns:a="http://schemas.openxmlformats.org/drawingml/2006/main" xmlns:p="http://schemas.openxmlformats.org/presentationml/2006/main" xmlns:r="http://schemas.openxmlformats.org/officeDocument/2006/relationships" type="objOnly" preserve="1">
+  <p:cSld name="Centered Text">
+    <p:spTree>
+      <p:nvGrpSpPr>
+        <p:cNvPr id="1" name=""/>
+        <p:cNvGrpSpPr/>
+        <p:nvPr/>
+      </p:nvGrpSpPr>
+      <p:grpSpPr>
+        <a:xfrm>
+          <a:off x="0" y="0"/>
+          <a:ext cx="0" cy="0"/>
+          <a:chOff x="0" y="0"/>
+          <a:chExt cx="0" cy="0"/>
+        </a:xfrm>
+      </p:grpSpPr>
+      <p:sp>
+        <p:nvSpPr>
+          <p:cNvPr id="70" name="PlaceHolder 1"/>
+          <p:cNvSpPr>
+            <a:spLocks noGrp="1"/>
+          </p:cNvSpPr>
+          <p:nvPr>
+            <p:ph type="subTitle"/>
+          </p:nvPr>
+        </p:nvSpPr>
+        <p:spPr>
+          <a:xfrm>
+            <a:off x="685800" y="1406880"/>
+            <a:ext cx="7771680" cy="4363920"/>
+          </a:xfrm>
+          <a:prstGeom prst="rect">
+            <a:avLst/>
+          </a:prstGeom>
+        </p:spPr>
+        <p:txBody>
+          <a:bodyPr lIns="0" rIns="0" tIns="0" bIns="0" anchor="ctr"/>
+          <a:p>
+            <a:pPr algn="ctr"/>
+            <a:endParaRPr/>
+          </a:p>
+        </p:txBody>
+      </p:sp>
+    </p:spTree>
+  </p:cSld>
+</p:sldLayout>
+</file>
+
+<file path=ppt/slideLayouts/slideLayout19.xml><?xml version="1.0" encoding="utf-8"?>
+<p:sldLayout xmlns:a="http://schemas.openxmlformats.org/drawingml/2006/main" xmlns:p="http://schemas.openxmlformats.org/presentationml/2006/main" xmlns:r="http://schemas.openxmlformats.org/officeDocument/2006/relationships" type="twoObjAndObj" preserve="1">
+  <p:cSld name="Title, 2 Content and Content">
+    <p:spTree>
+      <p:nvGrpSpPr>
+        <p:cNvPr id="1" name=""/>
+        <p:cNvGrpSpPr/>
+        <p:nvPr/>
+      </p:nvGrpSpPr>
+      <p:grpSpPr>
+        <a:xfrm>
+          <a:off x="0" y="0"/>
+          <a:ext cx="0" cy="0"/>
+          <a:chOff x="0" y="0"/>
+          <a:chExt cx="0" cy="0"/>
+        </a:xfrm>
+      </p:grpSpPr>
+      <p:sp>
+        <p:nvSpPr>
+          <p:cNvPr id="71" name="PlaceHolder 1"/>
+          <p:cNvSpPr>
+            <a:spLocks noGrp="1"/>
+          </p:cNvSpPr>
+          <p:nvPr>
+            <p:ph type="title"/>
+          </p:nvPr>
+        </p:nvSpPr>
+        <p:spPr>
+          <a:xfrm>
+            <a:off x="685800" y="1406880"/>
+            <a:ext cx="7771680" cy="941400"/>
+          </a:xfrm>
+          <a:prstGeom prst="rect">
+            <a:avLst/>
+          </a:prstGeom>
+        </p:spPr>
+        <p:txBody>
+          <a:bodyPr lIns="0" rIns="0" tIns="0" bIns="0" anchor="ctr"/>
+          <a:p>
+            <a:pPr algn="ctr"/>
+            <a:endParaRPr/>
+          </a:p>
+        </p:txBody>
+      </p:sp>
+      <p:sp>
+        <p:nvSpPr>
+          <p:cNvPr id="72" name="PlaceHolder 2"/>
+          <p:cNvSpPr>
+            <a:spLocks noGrp="1"/>
+          </p:cNvSpPr>
+          <p:nvPr>
+            <p:ph type="body"/>
+          </p:nvPr>
+        </p:nvSpPr>
+        <p:spPr>
+          <a:xfrm>
+            <a:off x="457200" y="1604520"/>
+            <a:ext cx="4015440" cy="1896840"/>
+          </a:xfrm>
+          <a:prstGeom prst="rect">
+            <a:avLst/>
+          </a:prstGeom>
+        </p:spPr>
+        <p:txBody>
+          <a:bodyPr lIns="0" rIns="0" tIns="0" bIns="0"/>
+          <a:p>
+            <a:endParaRPr/>
+          </a:p>
+        </p:txBody>
+      </p:sp>
+      <p:sp>
+        <p:nvSpPr>
+          <p:cNvPr id="73" name="PlaceHolder 3"/>
+          <p:cNvSpPr>
+            <a:spLocks noGrp="1"/>
+          </p:cNvSpPr>
+          <p:nvPr>
+            <p:ph type="body"/>
+          </p:nvPr>
+        </p:nvSpPr>
+        <p:spPr>
+          <a:xfrm>
+            <a:off x="457200" y="3682080"/>
+            <a:ext cx="4015440" cy="1896840"/>
+          </a:xfrm>
+          <a:prstGeom prst="rect">
+            <a:avLst/>
+          </a:prstGeom>
+        </p:spPr>
+        <p:txBody>
+          <a:bodyPr lIns="0" rIns="0" tIns="0" bIns="0"/>
+          <a:p>
+            <a:endParaRPr/>
+          </a:p>
+        </p:txBody>
+      </p:sp>
+      <p:sp>
+        <p:nvSpPr>
+          <p:cNvPr id="74" name="PlaceHolder 4"/>
+          <p:cNvSpPr>
+            <a:spLocks noGrp="1"/>
+          </p:cNvSpPr>
+          <p:nvPr>
+            <p:ph type="body"/>
+          </p:nvPr>
+        </p:nvSpPr>
+        <p:spPr>
+          <a:xfrm>
+            <a:off x="4673880" y="1604520"/>
+            <a:ext cx="4015440" cy="3976920"/>
+          </a:xfrm>
+          <a:prstGeom prst="rect">
+            <a:avLst/>
+          </a:prstGeom>
+        </p:spPr>
+        <p:txBody>
+          <a:bodyPr lIns="0" rIns="0" tIns="0" bIns="0"/>
+          <a:p>
+            <a:endParaRPr/>
+          </a:p>
+        </p:txBody>
+      </p:sp>
     </p:spTree>
   </p:cSld>
 </p:sldLayout>
@@ -472,7 +975,7 @@
         <p:spPr>
           <a:xfrm>
             <a:off x="685800" y="1406880"/>
-            <a:ext cx="7772040" cy="941400"/>
+            <a:ext cx="7771680" cy="941400"/>
           </a:xfrm>
           <a:prstGeom prst="rect">
             <a:avLst/>
@@ -481,6 +984,7 @@
         <p:txBody>
           <a:bodyPr lIns="0" rIns="0" tIns="0" bIns="0" anchor="ctr"/>
           <a:p>
+            <a:pPr algn="ctr"/>
             <a:endParaRPr/>
           </a:p>
         </p:txBody>
@@ -498,7 +1002,7 @@
         <p:spPr>
           <a:xfrm>
             <a:off x="457200" y="1604520"/>
-            <a:ext cx="8229240" cy="3977640"/>
+            <a:ext cx="8228880" cy="3977280"/>
           </a:xfrm>
           <a:prstGeom prst="rect">
             <a:avLst/>
@@ -512,6 +1016,665 @@
           </a:p>
         </p:txBody>
       </p:sp>
+    </p:spTree>
+  </p:cSld>
+</p:sldLayout>
+</file>
+
+<file path=ppt/slideLayouts/slideLayout20.xml><?xml version="1.0" encoding="utf-8"?>
+<p:sldLayout xmlns:a="http://schemas.openxmlformats.org/drawingml/2006/main" xmlns:p="http://schemas.openxmlformats.org/presentationml/2006/main" xmlns:r="http://schemas.openxmlformats.org/officeDocument/2006/relationships" type="objAndTwoObj" preserve="1">
+  <p:cSld name="Title Content and 2 Content">
+    <p:spTree>
+      <p:nvGrpSpPr>
+        <p:cNvPr id="1" name=""/>
+        <p:cNvGrpSpPr/>
+        <p:nvPr/>
+      </p:nvGrpSpPr>
+      <p:grpSpPr>
+        <a:xfrm>
+          <a:off x="0" y="0"/>
+          <a:ext cx="0" cy="0"/>
+          <a:chOff x="0" y="0"/>
+          <a:chExt cx="0" cy="0"/>
+        </a:xfrm>
+      </p:grpSpPr>
+      <p:sp>
+        <p:nvSpPr>
+          <p:cNvPr id="75" name="PlaceHolder 1"/>
+          <p:cNvSpPr>
+            <a:spLocks noGrp="1"/>
+          </p:cNvSpPr>
+          <p:nvPr>
+            <p:ph type="title"/>
+          </p:nvPr>
+        </p:nvSpPr>
+        <p:spPr>
+          <a:xfrm>
+            <a:off x="685800" y="1406880"/>
+            <a:ext cx="7771680" cy="941400"/>
+          </a:xfrm>
+          <a:prstGeom prst="rect">
+            <a:avLst/>
+          </a:prstGeom>
+        </p:spPr>
+        <p:txBody>
+          <a:bodyPr lIns="0" rIns="0" tIns="0" bIns="0" anchor="ctr"/>
+          <a:p>
+            <a:pPr algn="ctr"/>
+            <a:endParaRPr/>
+          </a:p>
+        </p:txBody>
+      </p:sp>
+      <p:sp>
+        <p:nvSpPr>
+          <p:cNvPr id="76" name="PlaceHolder 2"/>
+          <p:cNvSpPr>
+            <a:spLocks noGrp="1"/>
+          </p:cNvSpPr>
+          <p:nvPr>
+            <p:ph type="body"/>
+          </p:nvPr>
+        </p:nvSpPr>
+        <p:spPr>
+          <a:xfrm>
+            <a:off x="457200" y="1604520"/>
+            <a:ext cx="4015440" cy="3976920"/>
+          </a:xfrm>
+          <a:prstGeom prst="rect">
+            <a:avLst/>
+          </a:prstGeom>
+        </p:spPr>
+        <p:txBody>
+          <a:bodyPr lIns="0" rIns="0" tIns="0" bIns="0"/>
+          <a:p>
+            <a:endParaRPr/>
+          </a:p>
+        </p:txBody>
+      </p:sp>
+      <p:sp>
+        <p:nvSpPr>
+          <p:cNvPr id="77" name="PlaceHolder 3"/>
+          <p:cNvSpPr>
+            <a:spLocks noGrp="1"/>
+          </p:cNvSpPr>
+          <p:nvPr>
+            <p:ph type="body"/>
+          </p:nvPr>
+        </p:nvSpPr>
+        <p:spPr>
+          <a:xfrm>
+            <a:off x="4673880" y="1604520"/>
+            <a:ext cx="4015440" cy="1896840"/>
+          </a:xfrm>
+          <a:prstGeom prst="rect">
+            <a:avLst/>
+          </a:prstGeom>
+        </p:spPr>
+        <p:txBody>
+          <a:bodyPr lIns="0" rIns="0" tIns="0" bIns="0"/>
+          <a:p>
+            <a:endParaRPr/>
+          </a:p>
+        </p:txBody>
+      </p:sp>
+      <p:sp>
+        <p:nvSpPr>
+          <p:cNvPr id="78" name="PlaceHolder 4"/>
+          <p:cNvSpPr>
+            <a:spLocks noGrp="1"/>
+          </p:cNvSpPr>
+          <p:nvPr>
+            <p:ph type="body"/>
+          </p:nvPr>
+        </p:nvSpPr>
+        <p:spPr>
+          <a:xfrm>
+            <a:off x="4673880" y="3682080"/>
+            <a:ext cx="4015440" cy="1896840"/>
+          </a:xfrm>
+          <a:prstGeom prst="rect">
+            <a:avLst/>
+          </a:prstGeom>
+        </p:spPr>
+        <p:txBody>
+          <a:bodyPr lIns="0" rIns="0" tIns="0" bIns="0"/>
+          <a:p>
+            <a:endParaRPr/>
+          </a:p>
+        </p:txBody>
+      </p:sp>
+    </p:spTree>
+  </p:cSld>
+</p:sldLayout>
+</file>
+
+<file path=ppt/slideLayouts/slideLayout21.xml><?xml version="1.0" encoding="utf-8"?>
+<p:sldLayout xmlns:a="http://schemas.openxmlformats.org/drawingml/2006/main" xmlns:p="http://schemas.openxmlformats.org/presentationml/2006/main" xmlns:r="http://schemas.openxmlformats.org/officeDocument/2006/relationships" type="twoObjOverTx" preserve="1">
+  <p:cSld name="Title, 2 Content over Content">
+    <p:spTree>
+      <p:nvGrpSpPr>
+        <p:cNvPr id="1" name=""/>
+        <p:cNvGrpSpPr/>
+        <p:nvPr/>
+      </p:nvGrpSpPr>
+      <p:grpSpPr>
+        <a:xfrm>
+          <a:off x="0" y="0"/>
+          <a:ext cx="0" cy="0"/>
+          <a:chOff x="0" y="0"/>
+          <a:chExt cx="0" cy="0"/>
+        </a:xfrm>
+      </p:grpSpPr>
+      <p:sp>
+        <p:nvSpPr>
+          <p:cNvPr id="79" name="PlaceHolder 1"/>
+          <p:cNvSpPr>
+            <a:spLocks noGrp="1"/>
+          </p:cNvSpPr>
+          <p:nvPr>
+            <p:ph type="title"/>
+          </p:nvPr>
+        </p:nvSpPr>
+        <p:spPr>
+          <a:xfrm>
+            <a:off x="685800" y="1406880"/>
+            <a:ext cx="7771680" cy="941400"/>
+          </a:xfrm>
+          <a:prstGeom prst="rect">
+            <a:avLst/>
+          </a:prstGeom>
+        </p:spPr>
+        <p:txBody>
+          <a:bodyPr lIns="0" rIns="0" tIns="0" bIns="0" anchor="ctr"/>
+          <a:p>
+            <a:pPr algn="ctr"/>
+            <a:endParaRPr/>
+          </a:p>
+        </p:txBody>
+      </p:sp>
+      <p:sp>
+        <p:nvSpPr>
+          <p:cNvPr id="80" name="PlaceHolder 2"/>
+          <p:cNvSpPr>
+            <a:spLocks noGrp="1"/>
+          </p:cNvSpPr>
+          <p:nvPr>
+            <p:ph type="body"/>
+          </p:nvPr>
+        </p:nvSpPr>
+        <p:spPr>
+          <a:xfrm>
+            <a:off x="457200" y="1604520"/>
+            <a:ext cx="4015440" cy="1896840"/>
+          </a:xfrm>
+          <a:prstGeom prst="rect">
+            <a:avLst/>
+          </a:prstGeom>
+        </p:spPr>
+        <p:txBody>
+          <a:bodyPr lIns="0" rIns="0" tIns="0" bIns="0"/>
+          <a:p>
+            <a:endParaRPr/>
+          </a:p>
+        </p:txBody>
+      </p:sp>
+      <p:sp>
+        <p:nvSpPr>
+          <p:cNvPr id="81" name="PlaceHolder 3"/>
+          <p:cNvSpPr>
+            <a:spLocks noGrp="1"/>
+          </p:cNvSpPr>
+          <p:nvPr>
+            <p:ph type="body"/>
+          </p:nvPr>
+        </p:nvSpPr>
+        <p:spPr>
+          <a:xfrm>
+            <a:off x="4673880" y="1604520"/>
+            <a:ext cx="4015440" cy="1896840"/>
+          </a:xfrm>
+          <a:prstGeom prst="rect">
+            <a:avLst/>
+          </a:prstGeom>
+        </p:spPr>
+        <p:txBody>
+          <a:bodyPr lIns="0" rIns="0" tIns="0" bIns="0"/>
+          <a:p>
+            <a:endParaRPr/>
+          </a:p>
+        </p:txBody>
+      </p:sp>
+      <p:sp>
+        <p:nvSpPr>
+          <p:cNvPr id="82" name="PlaceHolder 4"/>
+          <p:cNvSpPr>
+            <a:spLocks noGrp="1"/>
+          </p:cNvSpPr>
+          <p:nvPr>
+            <p:ph type="body"/>
+          </p:nvPr>
+        </p:nvSpPr>
+        <p:spPr>
+          <a:xfrm>
+            <a:off x="457200" y="3682080"/>
+            <a:ext cx="8228880" cy="1896840"/>
+          </a:xfrm>
+          <a:prstGeom prst="rect">
+            <a:avLst/>
+          </a:prstGeom>
+        </p:spPr>
+        <p:txBody>
+          <a:bodyPr lIns="0" rIns="0" tIns="0" bIns="0"/>
+          <a:p>
+            <a:endParaRPr/>
+          </a:p>
+        </p:txBody>
+      </p:sp>
+    </p:spTree>
+  </p:cSld>
+</p:sldLayout>
+</file>
+
+<file path=ppt/slideLayouts/slideLayout22.xml><?xml version="1.0" encoding="utf-8"?>
+<p:sldLayout xmlns:a="http://schemas.openxmlformats.org/drawingml/2006/main" xmlns:p="http://schemas.openxmlformats.org/presentationml/2006/main" xmlns:r="http://schemas.openxmlformats.org/officeDocument/2006/relationships" type="objOverTx" preserve="1">
+  <p:cSld name="Title, Content over Content">
+    <p:spTree>
+      <p:nvGrpSpPr>
+        <p:cNvPr id="1" name=""/>
+        <p:cNvGrpSpPr/>
+        <p:nvPr/>
+      </p:nvGrpSpPr>
+      <p:grpSpPr>
+        <a:xfrm>
+          <a:off x="0" y="0"/>
+          <a:ext cx="0" cy="0"/>
+          <a:chOff x="0" y="0"/>
+          <a:chExt cx="0" cy="0"/>
+        </a:xfrm>
+      </p:grpSpPr>
+      <p:sp>
+        <p:nvSpPr>
+          <p:cNvPr id="83" name="PlaceHolder 1"/>
+          <p:cNvSpPr>
+            <a:spLocks noGrp="1"/>
+          </p:cNvSpPr>
+          <p:nvPr>
+            <p:ph type="title"/>
+          </p:nvPr>
+        </p:nvSpPr>
+        <p:spPr>
+          <a:xfrm>
+            <a:off x="685800" y="1406880"/>
+            <a:ext cx="7771680" cy="941400"/>
+          </a:xfrm>
+          <a:prstGeom prst="rect">
+            <a:avLst/>
+          </a:prstGeom>
+        </p:spPr>
+        <p:txBody>
+          <a:bodyPr lIns="0" rIns="0" tIns="0" bIns="0" anchor="ctr"/>
+          <a:p>
+            <a:pPr algn="ctr"/>
+            <a:endParaRPr/>
+          </a:p>
+        </p:txBody>
+      </p:sp>
+      <p:sp>
+        <p:nvSpPr>
+          <p:cNvPr id="84" name="PlaceHolder 2"/>
+          <p:cNvSpPr>
+            <a:spLocks noGrp="1"/>
+          </p:cNvSpPr>
+          <p:nvPr>
+            <p:ph type="body"/>
+          </p:nvPr>
+        </p:nvSpPr>
+        <p:spPr>
+          <a:xfrm>
+            <a:off x="457200" y="1604520"/>
+            <a:ext cx="8228880" cy="1896840"/>
+          </a:xfrm>
+          <a:prstGeom prst="rect">
+            <a:avLst/>
+          </a:prstGeom>
+        </p:spPr>
+        <p:txBody>
+          <a:bodyPr lIns="0" rIns="0" tIns="0" bIns="0"/>
+          <a:p>
+            <a:endParaRPr/>
+          </a:p>
+        </p:txBody>
+      </p:sp>
+      <p:sp>
+        <p:nvSpPr>
+          <p:cNvPr id="85" name="PlaceHolder 3"/>
+          <p:cNvSpPr>
+            <a:spLocks noGrp="1"/>
+          </p:cNvSpPr>
+          <p:nvPr>
+            <p:ph type="body"/>
+          </p:nvPr>
+        </p:nvSpPr>
+        <p:spPr>
+          <a:xfrm>
+            <a:off x="457200" y="3682080"/>
+            <a:ext cx="8228880" cy="1896840"/>
+          </a:xfrm>
+          <a:prstGeom prst="rect">
+            <a:avLst/>
+          </a:prstGeom>
+        </p:spPr>
+        <p:txBody>
+          <a:bodyPr lIns="0" rIns="0" tIns="0" bIns="0"/>
+          <a:p>
+            <a:endParaRPr/>
+          </a:p>
+        </p:txBody>
+      </p:sp>
+    </p:spTree>
+  </p:cSld>
+</p:sldLayout>
+</file>
+
+<file path=ppt/slideLayouts/slideLayout23.xml><?xml version="1.0" encoding="utf-8"?>
+<p:sldLayout xmlns:a="http://schemas.openxmlformats.org/drawingml/2006/main" xmlns:p="http://schemas.openxmlformats.org/presentationml/2006/main" xmlns:r="http://schemas.openxmlformats.org/officeDocument/2006/relationships" type="fourObj" preserve="1">
+  <p:cSld name="Title, 4 Content">
+    <p:spTree>
+      <p:nvGrpSpPr>
+        <p:cNvPr id="1" name=""/>
+        <p:cNvGrpSpPr/>
+        <p:nvPr/>
+      </p:nvGrpSpPr>
+      <p:grpSpPr>
+        <a:xfrm>
+          <a:off x="0" y="0"/>
+          <a:ext cx="0" cy="0"/>
+          <a:chOff x="0" y="0"/>
+          <a:chExt cx="0" cy="0"/>
+        </a:xfrm>
+      </p:grpSpPr>
+      <p:sp>
+        <p:nvSpPr>
+          <p:cNvPr id="86" name="PlaceHolder 1"/>
+          <p:cNvSpPr>
+            <a:spLocks noGrp="1"/>
+          </p:cNvSpPr>
+          <p:nvPr>
+            <p:ph type="title"/>
+          </p:nvPr>
+        </p:nvSpPr>
+        <p:spPr>
+          <a:xfrm>
+            <a:off x="685800" y="1406880"/>
+            <a:ext cx="7771680" cy="941400"/>
+          </a:xfrm>
+          <a:prstGeom prst="rect">
+            <a:avLst/>
+          </a:prstGeom>
+        </p:spPr>
+        <p:txBody>
+          <a:bodyPr lIns="0" rIns="0" tIns="0" bIns="0" anchor="ctr"/>
+          <a:p>
+            <a:pPr algn="ctr"/>
+            <a:endParaRPr/>
+          </a:p>
+        </p:txBody>
+      </p:sp>
+      <p:sp>
+        <p:nvSpPr>
+          <p:cNvPr id="87" name="PlaceHolder 2"/>
+          <p:cNvSpPr>
+            <a:spLocks noGrp="1"/>
+          </p:cNvSpPr>
+          <p:nvPr>
+            <p:ph type="body"/>
+          </p:nvPr>
+        </p:nvSpPr>
+        <p:spPr>
+          <a:xfrm>
+            <a:off x="457200" y="1604520"/>
+            <a:ext cx="4015440" cy="1896840"/>
+          </a:xfrm>
+          <a:prstGeom prst="rect">
+            <a:avLst/>
+          </a:prstGeom>
+        </p:spPr>
+        <p:txBody>
+          <a:bodyPr lIns="0" rIns="0" tIns="0" bIns="0"/>
+          <a:p>
+            <a:endParaRPr/>
+          </a:p>
+        </p:txBody>
+      </p:sp>
+      <p:sp>
+        <p:nvSpPr>
+          <p:cNvPr id="88" name="PlaceHolder 3"/>
+          <p:cNvSpPr>
+            <a:spLocks noGrp="1"/>
+          </p:cNvSpPr>
+          <p:nvPr>
+            <p:ph type="body"/>
+          </p:nvPr>
+        </p:nvSpPr>
+        <p:spPr>
+          <a:xfrm>
+            <a:off x="4673880" y="1604520"/>
+            <a:ext cx="4015440" cy="1896840"/>
+          </a:xfrm>
+          <a:prstGeom prst="rect">
+            <a:avLst/>
+          </a:prstGeom>
+        </p:spPr>
+        <p:txBody>
+          <a:bodyPr lIns="0" rIns="0" tIns="0" bIns="0"/>
+          <a:p>
+            <a:endParaRPr/>
+          </a:p>
+        </p:txBody>
+      </p:sp>
+      <p:sp>
+        <p:nvSpPr>
+          <p:cNvPr id="89" name="PlaceHolder 4"/>
+          <p:cNvSpPr>
+            <a:spLocks noGrp="1"/>
+          </p:cNvSpPr>
+          <p:nvPr>
+            <p:ph type="body"/>
+          </p:nvPr>
+        </p:nvSpPr>
+        <p:spPr>
+          <a:xfrm>
+            <a:off x="4673880" y="3682080"/>
+            <a:ext cx="4015440" cy="1896840"/>
+          </a:xfrm>
+          <a:prstGeom prst="rect">
+            <a:avLst/>
+          </a:prstGeom>
+        </p:spPr>
+        <p:txBody>
+          <a:bodyPr lIns="0" rIns="0" tIns="0" bIns="0"/>
+          <a:p>
+            <a:endParaRPr/>
+          </a:p>
+        </p:txBody>
+      </p:sp>
+      <p:sp>
+        <p:nvSpPr>
+          <p:cNvPr id="90" name="PlaceHolder 5"/>
+          <p:cNvSpPr>
+            <a:spLocks noGrp="1"/>
+          </p:cNvSpPr>
+          <p:nvPr>
+            <p:ph type="body"/>
+          </p:nvPr>
+        </p:nvSpPr>
+        <p:spPr>
+          <a:xfrm>
+            <a:off x="457200" y="3682080"/>
+            <a:ext cx="4015440" cy="1896840"/>
+          </a:xfrm>
+          <a:prstGeom prst="rect">
+            <a:avLst/>
+          </a:prstGeom>
+        </p:spPr>
+        <p:txBody>
+          <a:bodyPr lIns="0" rIns="0" tIns="0" bIns="0"/>
+          <a:p>
+            <a:endParaRPr/>
+          </a:p>
+        </p:txBody>
+      </p:sp>
+    </p:spTree>
+  </p:cSld>
+</p:sldLayout>
+</file>
+
+<file path=ppt/slideLayouts/slideLayout24.xml><?xml version="1.0" encoding="utf-8"?>
+<p:sldLayout xmlns:a="http://schemas.openxmlformats.org/drawingml/2006/main" xmlns:p="http://schemas.openxmlformats.org/presentationml/2006/main" xmlns:r="http://schemas.openxmlformats.org/officeDocument/2006/relationships" type="blank" preserve="1">
+  <p:cSld name="Title, 6 Content">
+    <p:spTree>
+      <p:nvGrpSpPr>
+        <p:cNvPr id="1" name=""/>
+        <p:cNvGrpSpPr/>
+        <p:nvPr/>
+      </p:nvGrpSpPr>
+      <p:grpSpPr>
+        <a:xfrm>
+          <a:off x="0" y="0"/>
+          <a:ext cx="0" cy="0"/>
+          <a:chOff x="0" y="0"/>
+          <a:chExt cx="0" cy="0"/>
+        </a:xfrm>
+      </p:grpSpPr>
+      <p:sp>
+        <p:nvSpPr>
+          <p:cNvPr id="91" name="PlaceHolder 1"/>
+          <p:cNvSpPr>
+            <a:spLocks noGrp="1"/>
+          </p:cNvSpPr>
+          <p:nvPr>
+            <p:ph type="title"/>
+          </p:nvPr>
+        </p:nvSpPr>
+        <p:spPr>
+          <a:xfrm>
+            <a:off x="685800" y="1406880"/>
+            <a:ext cx="7771680" cy="941400"/>
+          </a:xfrm>
+          <a:prstGeom prst="rect">
+            <a:avLst/>
+          </a:prstGeom>
+        </p:spPr>
+        <p:txBody>
+          <a:bodyPr lIns="0" rIns="0" tIns="0" bIns="0" anchor="ctr"/>
+          <a:p>
+            <a:pPr algn="ctr"/>
+            <a:endParaRPr/>
+          </a:p>
+        </p:txBody>
+      </p:sp>
+      <p:sp>
+        <p:nvSpPr>
+          <p:cNvPr id="92" name="PlaceHolder 2"/>
+          <p:cNvSpPr>
+            <a:spLocks noGrp="1"/>
+          </p:cNvSpPr>
+          <p:nvPr>
+            <p:ph type="body"/>
+          </p:nvPr>
+        </p:nvSpPr>
+        <p:spPr>
+          <a:xfrm>
+            <a:off x="457200" y="1604520"/>
+            <a:ext cx="8228880" cy="3976920"/>
+          </a:xfrm>
+          <a:prstGeom prst="rect">
+            <a:avLst/>
+          </a:prstGeom>
+        </p:spPr>
+        <p:txBody>
+          <a:bodyPr lIns="0" rIns="0" tIns="0" bIns="0"/>
+          <a:p>
+            <a:endParaRPr/>
+          </a:p>
+        </p:txBody>
+      </p:sp>
+      <p:sp>
+        <p:nvSpPr>
+          <p:cNvPr id="93" name="PlaceHolder 3"/>
+          <p:cNvSpPr>
+            <a:spLocks noGrp="1"/>
+          </p:cNvSpPr>
+          <p:nvPr>
+            <p:ph type="body"/>
+          </p:nvPr>
+        </p:nvSpPr>
+        <p:spPr>
+          <a:xfrm>
+            <a:off x="457200" y="1604520"/>
+            <a:ext cx="8228880" cy="3976920"/>
+          </a:xfrm>
+          <a:prstGeom prst="rect">
+            <a:avLst/>
+          </a:prstGeom>
+        </p:spPr>
+        <p:txBody>
+          <a:bodyPr lIns="0" rIns="0" tIns="0" bIns="0"/>
+          <a:p>
+            <a:endParaRPr/>
+          </a:p>
+        </p:txBody>
+      </p:sp>
+      <p:pic>
+        <p:nvPicPr>
+          <p:cNvPr id="94" name="" descr=""/>
+          <p:cNvPicPr/>
+          <p:nvPr/>
+        </p:nvPicPr>
+        <p:blipFill>
+          <a:blip r:embed="rId2"/>
+          <a:stretch>
+            <a:fillRect/>
+          </a:stretch>
+        </p:blipFill>
+        <p:spPr>
+          <a:xfrm>
+            <a:off x="2079360" y="1604160"/>
+            <a:ext cx="4984200" cy="3976920"/>
+          </a:xfrm>
+          <a:prstGeom prst="rect">
+            <a:avLst/>
+          </a:prstGeom>
+          <a:ln>
+            <a:noFill/>
+          </a:ln>
+        </p:spPr>
+      </p:pic>
+      <p:pic>
+        <p:nvPicPr>
+          <p:cNvPr id="95" name="" descr=""/>
+          <p:cNvPicPr/>
+          <p:nvPr/>
+        </p:nvPicPr>
+        <p:blipFill>
+          <a:blip r:embed="rId3"/>
+          <a:stretch>
+            <a:fillRect/>
+          </a:stretch>
+        </p:blipFill>
+        <p:spPr>
+          <a:xfrm>
+            <a:off x="2079360" y="1604160"/>
+            <a:ext cx="4984200" cy="3976920"/>
+          </a:xfrm>
+          <a:prstGeom prst="rect">
+            <a:avLst/>
+          </a:prstGeom>
+          <a:ln>
+            <a:noFill/>
+          </a:ln>
+        </p:spPr>
+      </p:pic>
     </p:spTree>
   </p:cSld>
 </p:sldLayout>
@@ -547,7 +1710,7 @@
         <p:spPr>
           <a:xfrm>
             <a:off x="685800" y="1406880"/>
-            <a:ext cx="7772040" cy="941400"/>
+            <a:ext cx="7771680" cy="941400"/>
           </a:xfrm>
           <a:prstGeom prst="rect">
             <a:avLst/>
@@ -556,6 +1719,7 @@
         <p:txBody>
           <a:bodyPr lIns="0" rIns="0" tIns="0" bIns="0" anchor="ctr"/>
           <a:p>
+            <a:pPr algn="ctr"/>
             <a:endParaRPr/>
           </a:p>
         </p:txBody>
@@ -573,7 +1737,7 @@
         <p:spPr>
           <a:xfrm>
             <a:off x="457200" y="1604520"/>
-            <a:ext cx="8229240" cy="3977280"/>
+            <a:ext cx="8228880" cy="3976920"/>
           </a:xfrm>
           <a:prstGeom prst="rect">
             <a:avLst/>
@@ -621,7 +1785,7 @@
         <p:spPr>
           <a:xfrm>
             <a:off x="685800" y="1406880"/>
-            <a:ext cx="7772040" cy="941400"/>
+            <a:ext cx="7771680" cy="941400"/>
           </a:xfrm>
           <a:prstGeom prst="rect">
             <a:avLst/>
@@ -630,6 +1794,7 @@
         <p:txBody>
           <a:bodyPr lIns="0" rIns="0" tIns="0" bIns="0" anchor="ctr"/>
           <a:p>
+            <a:pPr algn="ctr"/>
             <a:endParaRPr/>
           </a:p>
         </p:txBody>
@@ -647,7 +1812,7 @@
         <p:spPr>
           <a:xfrm>
             <a:off x="457200" y="1604520"/>
-            <a:ext cx="4015800" cy="3977280"/>
+            <a:ext cx="4015440" cy="3976920"/>
           </a:xfrm>
           <a:prstGeom prst="rect">
             <a:avLst/>
@@ -672,8 +1837,8 @@
         </p:nvSpPr>
         <p:spPr>
           <a:xfrm>
-            <a:off x="4674240" y="1604520"/>
-            <a:ext cx="4015800" cy="3977280"/>
+            <a:off x="4673880" y="1604520"/>
+            <a:ext cx="4015440" cy="3976920"/>
           </a:xfrm>
           <a:prstGeom prst="rect">
             <a:avLst/>
@@ -721,7 +1886,7 @@
         <p:spPr>
           <a:xfrm>
             <a:off x="685800" y="1406880"/>
-            <a:ext cx="7772040" cy="941400"/>
+            <a:ext cx="7771680" cy="941400"/>
           </a:xfrm>
           <a:prstGeom prst="rect">
             <a:avLst/>
@@ -730,6 +1895,7 @@
         <p:txBody>
           <a:bodyPr lIns="0" rIns="0" tIns="0" bIns="0" anchor="ctr"/>
           <a:p>
+            <a:pPr algn="ctr"/>
             <a:endParaRPr/>
           </a:p>
         </p:txBody>
@@ -769,7 +1935,7 @@
         <p:spPr>
           <a:xfrm>
             <a:off x="685800" y="1406880"/>
-            <a:ext cx="7772040" cy="4363920"/>
+            <a:ext cx="7771680" cy="4363920"/>
           </a:xfrm>
           <a:prstGeom prst="rect">
             <a:avLst/>
@@ -818,7 +1984,7 @@
         <p:spPr>
           <a:xfrm>
             <a:off x="685800" y="1406880"/>
-            <a:ext cx="7772040" cy="941400"/>
+            <a:ext cx="7771680" cy="941400"/>
           </a:xfrm>
           <a:prstGeom prst="rect">
             <a:avLst/>
@@ -827,6 +1993,7 @@
         <p:txBody>
           <a:bodyPr lIns="0" rIns="0" tIns="0" bIns="0" anchor="ctr"/>
           <a:p>
+            <a:pPr algn="ctr"/>
             <a:endParaRPr/>
           </a:p>
         </p:txBody>
@@ -844,7 +2011,7 @@
         <p:spPr>
           <a:xfrm>
             <a:off x="457200" y="1604520"/>
-            <a:ext cx="4015800" cy="1896840"/>
+            <a:ext cx="4015440" cy="1896840"/>
           </a:xfrm>
           <a:prstGeom prst="rect">
             <a:avLst/>
@@ -870,7 +2037,7 @@
         <p:spPr>
           <a:xfrm>
             <a:off x="457200" y="3682080"/>
-            <a:ext cx="4015800" cy="1896840"/>
+            <a:ext cx="4015440" cy="1896840"/>
           </a:xfrm>
           <a:prstGeom prst="rect">
             <a:avLst/>
@@ -895,8 +2062,8 @@
         </p:nvSpPr>
         <p:spPr>
           <a:xfrm>
-            <a:off x="4674240" y="1604520"/>
-            <a:ext cx="4015800" cy="3977280"/>
+            <a:off x="4673880" y="1604520"/>
+            <a:ext cx="4015440" cy="3976920"/>
           </a:xfrm>
           <a:prstGeom prst="rect">
             <a:avLst/>
@@ -944,7 +2111,7 @@
         <p:spPr>
           <a:xfrm>
             <a:off x="685800" y="1406880"/>
-            <a:ext cx="7772040" cy="941400"/>
+            <a:ext cx="7771680" cy="941400"/>
           </a:xfrm>
           <a:prstGeom prst="rect">
             <a:avLst/>
@@ -953,6 +2120,7 @@
         <p:txBody>
           <a:bodyPr lIns="0" rIns="0" tIns="0" bIns="0" anchor="ctr"/>
           <a:p>
+            <a:pPr algn="ctr"/>
             <a:endParaRPr/>
           </a:p>
         </p:txBody>
@@ -970,7 +2138,7 @@
         <p:spPr>
           <a:xfrm>
             <a:off x="457200" y="1604520"/>
-            <a:ext cx="4015800" cy="3977280"/>
+            <a:ext cx="4015440" cy="3976920"/>
           </a:xfrm>
           <a:prstGeom prst="rect">
             <a:avLst/>
@@ -995,8 +2163,8 @@
         </p:nvSpPr>
         <p:spPr>
           <a:xfrm>
-            <a:off x="4674240" y="1604520"/>
-            <a:ext cx="4015800" cy="1896840"/>
+            <a:off x="4673880" y="1604520"/>
+            <a:ext cx="4015440" cy="1896840"/>
           </a:xfrm>
           <a:prstGeom prst="rect">
             <a:avLst/>
@@ -1021,8 +2189,8 @@
         </p:nvSpPr>
         <p:spPr>
           <a:xfrm>
-            <a:off x="4674240" y="3682080"/>
-            <a:ext cx="4015800" cy="1896840"/>
+            <a:off x="4673880" y="3682080"/>
+            <a:ext cx="4015440" cy="1896840"/>
           </a:xfrm>
           <a:prstGeom prst="rect">
             <a:avLst/>
@@ -1070,7 +2238,7 @@
         <p:spPr>
           <a:xfrm>
             <a:off x="685800" y="1406880"/>
-            <a:ext cx="7772040" cy="941400"/>
+            <a:ext cx="7771680" cy="941400"/>
           </a:xfrm>
           <a:prstGeom prst="rect">
             <a:avLst/>
@@ -1079,6 +2247,7 @@
         <p:txBody>
           <a:bodyPr lIns="0" rIns="0" tIns="0" bIns="0" anchor="ctr"/>
           <a:p>
+            <a:pPr algn="ctr"/>
             <a:endParaRPr/>
           </a:p>
         </p:txBody>
@@ -1096,7 +2265,7 @@
         <p:spPr>
           <a:xfrm>
             <a:off x="457200" y="1604520"/>
-            <a:ext cx="4015800" cy="1896840"/>
+            <a:ext cx="4015440" cy="1896840"/>
           </a:xfrm>
           <a:prstGeom prst="rect">
             <a:avLst/>
@@ -1121,8 +2290,8 @@
         </p:nvSpPr>
         <p:spPr>
           <a:xfrm>
-            <a:off x="4674240" y="1604520"/>
-            <a:ext cx="4015800" cy="1896840"/>
+            <a:off x="4673880" y="1604520"/>
+            <a:ext cx="4015440" cy="1896840"/>
           </a:xfrm>
           <a:prstGeom prst="rect">
             <a:avLst/>
@@ -1148,7 +2317,7 @@
         <p:spPr>
           <a:xfrm>
             <a:off x="457200" y="3682080"/>
-            <a:ext cx="8229240" cy="1896840"/>
+            <a:ext cx="8228880" cy="1896840"/>
           </a:xfrm>
           <a:prstGeom prst="rect">
             <a:avLst/>
@@ -1199,7 +2368,7 @@
         <p:spPr>
           <a:xfrm>
             <a:off x="0" y="0"/>
-            <a:ext cx="9143640" cy="570240"/>
+            <a:ext cx="9143280" cy="569880"/>
           </a:xfrm>
           <a:prstGeom prst="rect">
             <a:avLst/>
@@ -1227,7 +2396,7 @@
         <p:spPr>
           <a:xfrm>
             <a:off x="227520" y="123120"/>
-            <a:ext cx="1156320" cy="352440"/>
+            <a:ext cx="1155960" cy="352080"/>
           </a:xfrm>
           <a:prstGeom prst="rect">
             <a:avLst/>
@@ -1268,7 +2437,7 @@
         <p:spPr>
           <a:xfrm>
             <a:off x="0" y="856440"/>
-            <a:ext cx="9143640" cy="4638960"/>
+            <a:ext cx="9143280" cy="4638600"/>
           </a:xfrm>
           <a:prstGeom prst="rect">
             <a:avLst/>
@@ -1296,7 +2465,7 @@
         <p:spPr>
           <a:xfrm>
             <a:off x="0" y="5495760"/>
-            <a:ext cx="9143640" cy="1361880"/>
+            <a:ext cx="9143280" cy="1361520"/>
           </a:xfrm>
           <a:prstGeom prst="rect">
             <a:avLst/>
@@ -1308,54 +2477,14 @@
       </p:pic>
       <p:sp>
         <p:nvSpPr>
-          <p:cNvPr id="5" name="PlaceHolder 4"/>
-          <p:cNvSpPr>
-            <a:spLocks noGrp="1"/>
-          </p:cNvSpPr>
-          <p:nvPr>
-            <p:ph type="title"/>
-          </p:nvPr>
-        </p:nvSpPr>
-        <p:spPr>
-          <a:xfrm>
-            <a:off x="685800" y="1406880"/>
-            <a:ext cx="7772040" cy="941040"/>
-          </a:xfrm>
-          <a:prstGeom prst="rect">
-            <a:avLst/>
-          </a:prstGeom>
-        </p:spPr>
-        <p:txBody>
-          <a:bodyPr lIns="90000" rIns="90000" tIns="45000" bIns="45000"/>
-          <a:p>
-            <a:pPr>
-              <a:lnSpc>
-                <a:spcPct val="100000"/>
-              </a:lnSpc>
-            </a:pPr>
-            <a:r>
-              <a:rPr lang="en-US" sz="3600">
-                <a:solidFill>
-                  <a:srgbClr val="000000"/>
-                </a:solidFill>
-                <a:latin typeface="Helvetica 75 Bold"/>
-              </a:rPr>
-              <a:t>Click to edit the title text formatClick to edit Master title style</a:t>
-            </a:r>
-            <a:endParaRPr/>
-          </a:p>
-        </p:txBody>
-      </p:sp>
-      <p:sp>
-        <p:nvSpPr>
-          <p:cNvPr id="6" name="CustomShape 5"/>
+          <p:cNvPr id="5" name="CustomShape 4"/>
           <p:cNvSpPr/>
           <p:nvPr/>
         </p:nvSpPr>
         <p:spPr>
           <a:xfrm>
             <a:off x="3500280" y="5729400"/>
-            <a:ext cx="5369760" cy="1208520"/>
+            <a:ext cx="5369400" cy="1208160"/>
           </a:xfrm>
           <a:prstGeom prst="rect">
             <a:avLst/>
@@ -1396,7 +2525,7 @@
       </p:sp>
       <p:pic>
         <p:nvPicPr>
-          <p:cNvPr id="7" name="Picture 8" descr=""/>
+          <p:cNvPr id="6" name="Picture 8" descr=""/>
           <p:cNvPicPr/>
           <p:nvPr/>
         </p:nvPicPr>
@@ -1409,7 +2538,7 @@
         <p:spPr>
           <a:xfrm>
             <a:off x="2528640" y="5797080"/>
-            <a:ext cx="754920" cy="759240"/>
+            <a:ext cx="754560" cy="758880"/>
           </a:xfrm>
           <a:prstGeom prst="rect">
             <a:avLst/>
@@ -1421,7 +2550,7 @@
       </p:pic>
       <p:pic>
         <p:nvPicPr>
-          <p:cNvPr id="8" name="Picture 10" descr=""/>
+          <p:cNvPr id="7" name="Picture 10" descr=""/>
           <p:cNvPicPr/>
           <p:nvPr/>
         </p:nvPicPr>
@@ -1434,7 +2563,7 @@
         <p:spPr>
           <a:xfrm>
             <a:off x="198360" y="5868720"/>
-            <a:ext cx="840960" cy="667800"/>
+            <a:ext cx="840600" cy="667440"/>
           </a:xfrm>
           <a:prstGeom prst="rect">
             <a:avLst/>
@@ -1446,7 +2575,7 @@
       </p:pic>
       <p:pic>
         <p:nvPicPr>
-          <p:cNvPr id="9" name="Picture 11" descr=""/>
+          <p:cNvPr id="8" name="Picture 11" descr=""/>
           <p:cNvPicPr/>
           <p:nvPr/>
         </p:nvPicPr>
@@ -1459,7 +2588,7 @@
         <p:spPr>
           <a:xfrm>
             <a:off x="1019160" y="5848200"/>
-            <a:ext cx="663120" cy="667800"/>
+            <a:ext cx="662760" cy="667440"/>
           </a:xfrm>
           <a:prstGeom prst="rect">
             <a:avLst/>
@@ -1471,7 +2600,7 @@
       </p:pic>
       <p:pic>
         <p:nvPicPr>
-          <p:cNvPr id="10" name="Picture 12" descr=""/>
+          <p:cNvPr id="9" name="Picture 12" descr=""/>
           <p:cNvPicPr/>
           <p:nvPr/>
         </p:nvPicPr>
@@ -1484,7 +2613,7 @@
         <p:spPr>
           <a:xfrm>
             <a:off x="1797120" y="5876640"/>
-            <a:ext cx="686880" cy="667800"/>
+            <a:ext cx="686520" cy="667440"/>
           </a:xfrm>
           <a:prstGeom prst="rect">
             <a:avLst/>
@@ -1496,14 +2625,14 @@
       </p:pic>
       <p:sp>
         <p:nvSpPr>
-          <p:cNvPr id="11" name="CustomShape 6"/>
+          <p:cNvPr id="10" name="CustomShape 5"/>
           <p:cNvSpPr/>
           <p:nvPr/>
         </p:nvSpPr>
         <p:spPr>
           <a:xfrm>
             <a:off x="0" y="0"/>
-            <a:ext cx="9143640" cy="840960"/>
+            <a:ext cx="9143280" cy="840600"/>
           </a:xfrm>
           <a:prstGeom prst="rect">
             <a:avLst/>
@@ -1518,7 +2647,7 @@
       </p:sp>
       <p:pic>
         <p:nvPicPr>
-          <p:cNvPr id="12" name="Picture 16" descr=""/>
+          <p:cNvPr id="11" name="Picture 16" descr=""/>
           <p:cNvPicPr/>
           <p:nvPr/>
         </p:nvPicPr>
@@ -1531,7 +2660,7 @@
         <p:spPr>
           <a:xfrm>
             <a:off x="227520" y="123120"/>
-            <a:ext cx="1935000" cy="590040"/>
+            <a:ext cx="1934640" cy="589680"/>
           </a:xfrm>
           <a:prstGeom prst="rect">
             <a:avLst/>
@@ -1541,6 +2670,38 @@
           </a:ln>
         </p:spPr>
       </p:pic>
+      <p:sp>
+        <p:nvSpPr>
+          <p:cNvPr id="12" name="PlaceHolder 6"/>
+          <p:cNvSpPr>
+            <a:spLocks noGrp="1"/>
+          </p:cNvSpPr>
+          <p:nvPr>
+            <p:ph type="title"/>
+          </p:nvPr>
+        </p:nvSpPr>
+        <p:spPr>
+          <a:xfrm>
+            <a:off x="685800" y="1406880"/>
+            <a:ext cx="7771680" cy="941040"/>
+          </a:xfrm>
+          <a:prstGeom prst="rect">
+            <a:avLst/>
+          </a:prstGeom>
+        </p:spPr>
+        <p:txBody>
+          <a:bodyPr lIns="0" rIns="0" tIns="0" bIns="0" anchor="ctr"/>
+          <a:p>
+            <a:r>
+              <a:rPr lang="en-US">
+                <a:latin typeface="Arial"/>
+              </a:rPr>
+              <a:t>Click to edit the title text format</a:t>
+            </a:r>
+            <a:endParaRPr/>
+          </a:p>
+        </p:txBody>
+      </p:sp>
       <p:sp>
         <p:nvSpPr>
           <p:cNvPr id="13" name="PlaceHolder 7"/>
@@ -1583,8 +2744,8 @@
               <a:buChar char=""/>
             </a:pPr>
             <a:r>
-              <a:rPr lang="en-US" sz="2400">
-                <a:latin typeface="Cambria"/>
+              <a:rPr lang="en-US" sz="2800">
+                <a:latin typeface="Arial"/>
               </a:rPr>
               <a:t>Second Outline Level</a:t>
             </a:r>
@@ -1597,8 +2758,8 @@
               <a:buChar char=""/>
             </a:pPr>
             <a:r>
-              <a:rPr lang="en-US" sz="2000">
-                <a:latin typeface="Cambria"/>
+              <a:rPr lang="en-US" sz="2400">
+                <a:latin typeface="Arial"/>
               </a:rPr>
               <a:t>Third Outline Level</a:t>
             </a:r>
@@ -1612,7 +2773,7 @@
             </a:pPr>
             <a:r>
               <a:rPr lang="en-US" sz="2000">
-                <a:latin typeface="Cambria"/>
+                <a:latin typeface="Arial"/>
               </a:rPr>
               <a:t>Fourth Outline Level</a:t>
             </a:r>
@@ -1626,7 +2787,7 @@
             </a:pPr>
             <a:r>
               <a:rPr lang="en-US" sz="2000">
-                <a:latin typeface="Cambria"/>
+                <a:latin typeface="Arial"/>
               </a:rPr>
               <a:t>Fifth Outline Level</a:t>
             </a:r>
@@ -1640,7 +2801,7 @@
             </a:pPr>
             <a:r>
               <a:rPr lang="en-US" sz="2000">
-                <a:latin typeface="Cambria"/>
+                <a:latin typeface="Arial"/>
               </a:rPr>
               <a:t>Sixth Outline Level</a:t>
             </a:r>
@@ -1654,7 +2815,7 @@
             </a:pPr>
             <a:r>
               <a:rPr lang="en-US" sz="2000">
-                <a:latin typeface="Cambria"/>
+                <a:latin typeface="Arial"/>
               </a:rPr>
               <a:t>Seventh Outline Level</a:t>
             </a:r>
@@ -1678,6 +2839,514 @@
     <p:sldLayoutId id="2147483658" r:id="rId18"/>
     <p:sldLayoutId id="2147483659" r:id="rId19"/>
     <p:sldLayoutId id="2147483660" r:id="rId20"/>
+  </p:sldLayoutIdLst>
+</p:sldMaster>
+</file>
+
+<file path=ppt/slideMasters/slideMaster2.xml><?xml version="1.0" encoding="utf-8"?>
+<p:sldMaster xmlns:a="http://schemas.openxmlformats.org/drawingml/2006/main" xmlns:p="http://schemas.openxmlformats.org/presentationml/2006/main" xmlns:r="http://schemas.openxmlformats.org/officeDocument/2006/relationships">
+  <p:cSld>
+    <p:bg>
+      <p:bgPr>
+        <a:solidFill>
+          <a:srgbClr val="e0e2dc"/>
+        </a:solidFill>
+      </p:bgPr>
+    </p:bg>
+    <p:spTree>
+      <p:nvGrpSpPr>
+        <p:cNvPr id="1" name=""/>
+        <p:cNvGrpSpPr/>
+        <p:nvPr/>
+      </p:nvGrpSpPr>
+      <p:grpSpPr>
+        <a:xfrm>
+          <a:off x="0" y="0"/>
+          <a:ext cx="0" cy="0"/>
+          <a:chOff x="0" y="0"/>
+          <a:chExt cx="0" cy="0"/>
+        </a:xfrm>
+      </p:grpSpPr>
+      <p:sp>
+        <p:nvSpPr>
+          <p:cNvPr id="48" name="CustomShape 1"/>
+          <p:cNvSpPr/>
+          <p:nvPr/>
+        </p:nvSpPr>
+        <p:spPr>
+          <a:xfrm>
+            <a:off x="0" y="0"/>
+            <a:ext cx="9143280" cy="569880"/>
+          </a:xfrm>
+          <a:prstGeom prst="rect">
+            <a:avLst/>
+          </a:prstGeom>
+          <a:solidFill>
+            <a:srgbClr val="272727"/>
+          </a:solidFill>
+          <a:ln w="9360">
+            <a:noFill/>
+          </a:ln>
+        </p:spPr>
+      </p:sp>
+      <p:pic>
+        <p:nvPicPr>
+          <p:cNvPr id="49" name="Picture 7" descr=""/>
+          <p:cNvPicPr/>
+          <p:nvPr/>
+        </p:nvPicPr>
+        <p:blipFill>
+          <a:blip r:embed="rId2"/>
+          <a:stretch>
+            <a:fillRect/>
+          </a:stretch>
+        </p:blipFill>
+        <p:spPr>
+          <a:xfrm>
+            <a:off x="227520" y="123120"/>
+            <a:ext cx="1155960" cy="352080"/>
+          </a:xfrm>
+          <a:prstGeom prst="rect">
+            <a:avLst/>
+          </a:prstGeom>
+          <a:ln>
+            <a:noFill/>
+          </a:ln>
+        </p:spPr>
+      </p:pic>
+      <p:sp>
+        <p:nvSpPr>
+          <p:cNvPr id="50" name="Line 2"/>
+          <p:cNvSpPr/>
+          <p:nvPr/>
+        </p:nvSpPr>
+        <p:spPr>
+          <a:xfrm flipV="1">
+            <a:off x="8063280" y="123120"/>
+            <a:ext cx="0" cy="331920"/>
+          </a:xfrm>
+          <a:prstGeom prst="line">
+            <a:avLst/>
+          </a:prstGeom>
+          <a:ln w="25560">
+            <a:solidFill>
+              <a:srgbClr val="ffffff"/>
+            </a:solidFill>
+            <a:round/>
+          </a:ln>
+        </p:spPr>
+      </p:sp>
+      <p:sp>
+        <p:nvSpPr>
+          <p:cNvPr id="51" name="CustomShape 3"/>
+          <p:cNvSpPr/>
+          <p:nvPr/>
+        </p:nvSpPr>
+        <p:spPr>
+          <a:xfrm>
+            <a:off x="0" y="856440"/>
+            <a:ext cx="9143280" cy="4638600"/>
+          </a:xfrm>
+          <a:prstGeom prst="rect">
+            <a:avLst/>
+          </a:prstGeom>
+          <a:solidFill>
+            <a:srgbClr val="ffffff"/>
+          </a:solidFill>
+          <a:ln w="9360">
+            <a:noFill/>
+          </a:ln>
+        </p:spPr>
+      </p:sp>
+      <p:pic>
+        <p:nvPicPr>
+          <p:cNvPr id="52" name="Picture 13" descr=""/>
+          <p:cNvPicPr/>
+          <p:nvPr/>
+        </p:nvPicPr>
+        <p:blipFill>
+          <a:blip r:embed="rId3"/>
+          <a:stretch>
+            <a:fillRect/>
+          </a:stretch>
+        </p:blipFill>
+        <p:spPr>
+          <a:xfrm>
+            <a:off x="0" y="5495760"/>
+            <a:ext cx="9143280" cy="1361520"/>
+          </a:xfrm>
+          <a:prstGeom prst="rect">
+            <a:avLst/>
+          </a:prstGeom>
+          <a:ln>
+            <a:noFill/>
+          </a:ln>
+        </p:spPr>
+      </p:pic>
+      <p:sp>
+        <p:nvSpPr>
+          <p:cNvPr id="53" name="CustomShape 4"/>
+          <p:cNvSpPr/>
+          <p:nvPr/>
+        </p:nvSpPr>
+        <p:spPr>
+          <a:xfrm>
+            <a:off x="3500280" y="5729400"/>
+            <a:ext cx="5369400" cy="1208160"/>
+          </a:xfrm>
+          <a:prstGeom prst="rect">
+            <a:avLst/>
+          </a:prstGeom>
+          <a:noFill/>
+          <a:ln>
+            <a:noFill/>
+          </a:ln>
+        </p:spPr>
+        <p:txBody>
+          <a:bodyPr lIns="90000" rIns="90000" tIns="45000" bIns="45000"/>
+          <a:p>
+            <a:pPr>
+              <a:lnSpc>
+                <a:spcPct val="100000"/>
+              </a:lnSpc>
+            </a:pPr>
+            <a:r>
+              <a:rPr i="1" lang="en-US" sz="1050">
+                <a:solidFill>
+                  <a:srgbClr val="000000"/>
+                </a:solidFill>
+                <a:latin typeface="Calibri"/>
+              </a:rPr>
+              <a:t>iDigBio is funded by a grant from the National Science Foundation’s Advancing Digitization of Biodiversity Collections Program (Cooperative Agreement EF-1115210).  Any opinions, findings, and conclusions or recommendations expressed in this material are those of the author(s) and do not necessarily reflect the views of the National Science Foundation. All images used with permission or are free from copyright.</a:t>
+            </a:r>
+            <a:endParaRPr/>
+          </a:p>
+          <a:p>
+            <a:pPr>
+              <a:lnSpc>
+                <a:spcPct val="100000"/>
+              </a:lnSpc>
+            </a:pPr>
+            <a:endParaRPr/>
+          </a:p>
+        </p:txBody>
+      </p:sp>
+      <p:pic>
+        <p:nvPicPr>
+          <p:cNvPr id="54" name="Picture 8" descr=""/>
+          <p:cNvPicPr/>
+          <p:nvPr/>
+        </p:nvPicPr>
+        <p:blipFill>
+          <a:blip r:embed="rId4"/>
+          <a:stretch>
+            <a:fillRect/>
+          </a:stretch>
+        </p:blipFill>
+        <p:spPr>
+          <a:xfrm>
+            <a:off x="2528640" y="5797080"/>
+            <a:ext cx="754560" cy="758880"/>
+          </a:xfrm>
+          <a:prstGeom prst="rect">
+            <a:avLst/>
+          </a:prstGeom>
+          <a:ln>
+            <a:noFill/>
+          </a:ln>
+        </p:spPr>
+      </p:pic>
+      <p:pic>
+        <p:nvPicPr>
+          <p:cNvPr id="55" name="Picture 10" descr=""/>
+          <p:cNvPicPr/>
+          <p:nvPr/>
+        </p:nvPicPr>
+        <p:blipFill>
+          <a:blip r:embed="rId5"/>
+          <a:stretch>
+            <a:fillRect/>
+          </a:stretch>
+        </p:blipFill>
+        <p:spPr>
+          <a:xfrm>
+            <a:off x="198360" y="5868720"/>
+            <a:ext cx="840600" cy="667440"/>
+          </a:xfrm>
+          <a:prstGeom prst="rect">
+            <a:avLst/>
+          </a:prstGeom>
+          <a:ln>
+            <a:noFill/>
+          </a:ln>
+        </p:spPr>
+      </p:pic>
+      <p:pic>
+        <p:nvPicPr>
+          <p:cNvPr id="56" name="Picture 11" descr=""/>
+          <p:cNvPicPr/>
+          <p:nvPr/>
+        </p:nvPicPr>
+        <p:blipFill>
+          <a:blip r:embed="rId6"/>
+          <a:stretch>
+            <a:fillRect/>
+          </a:stretch>
+        </p:blipFill>
+        <p:spPr>
+          <a:xfrm>
+            <a:off x="1019160" y="5848200"/>
+            <a:ext cx="662760" cy="667440"/>
+          </a:xfrm>
+          <a:prstGeom prst="rect">
+            <a:avLst/>
+          </a:prstGeom>
+          <a:ln>
+            <a:noFill/>
+          </a:ln>
+        </p:spPr>
+      </p:pic>
+      <p:pic>
+        <p:nvPicPr>
+          <p:cNvPr id="57" name="Picture 12" descr=""/>
+          <p:cNvPicPr/>
+          <p:nvPr/>
+        </p:nvPicPr>
+        <p:blipFill>
+          <a:blip r:embed="rId7"/>
+          <a:stretch>
+            <a:fillRect/>
+          </a:stretch>
+        </p:blipFill>
+        <p:spPr>
+          <a:xfrm>
+            <a:off x="1797120" y="5876640"/>
+            <a:ext cx="686520" cy="667440"/>
+          </a:xfrm>
+          <a:prstGeom prst="rect">
+            <a:avLst/>
+          </a:prstGeom>
+          <a:ln>
+            <a:noFill/>
+          </a:ln>
+        </p:spPr>
+      </p:pic>
+      <p:sp>
+        <p:nvSpPr>
+          <p:cNvPr id="58" name="CustomShape 5"/>
+          <p:cNvSpPr/>
+          <p:nvPr/>
+        </p:nvSpPr>
+        <p:spPr>
+          <a:xfrm>
+            <a:off x="0" y="0"/>
+            <a:ext cx="9143280" cy="840600"/>
+          </a:xfrm>
+          <a:prstGeom prst="rect">
+            <a:avLst/>
+          </a:prstGeom>
+          <a:solidFill>
+            <a:srgbClr val="272727"/>
+          </a:solidFill>
+          <a:ln w="9360">
+            <a:noFill/>
+          </a:ln>
+        </p:spPr>
+      </p:sp>
+      <p:pic>
+        <p:nvPicPr>
+          <p:cNvPr id="59" name="Picture 16" descr=""/>
+          <p:cNvPicPr/>
+          <p:nvPr/>
+        </p:nvPicPr>
+        <p:blipFill>
+          <a:blip r:embed="rId8"/>
+          <a:stretch>
+            <a:fillRect/>
+          </a:stretch>
+        </p:blipFill>
+        <p:spPr>
+          <a:xfrm>
+            <a:off x="227520" y="123120"/>
+            <a:ext cx="1934640" cy="589680"/>
+          </a:xfrm>
+          <a:prstGeom prst="rect">
+            <a:avLst/>
+          </a:prstGeom>
+          <a:ln>
+            <a:noFill/>
+          </a:ln>
+        </p:spPr>
+      </p:pic>
+      <p:sp>
+        <p:nvSpPr>
+          <p:cNvPr id="60" name="PlaceHolder 6"/>
+          <p:cNvSpPr>
+            <a:spLocks noGrp="1"/>
+          </p:cNvSpPr>
+          <p:nvPr>
+            <p:ph type="title"/>
+          </p:nvPr>
+        </p:nvSpPr>
+        <p:spPr>
+          <a:xfrm>
+            <a:off x="685800" y="1406880"/>
+            <a:ext cx="7771680" cy="941040"/>
+          </a:xfrm>
+          <a:prstGeom prst="rect">
+            <a:avLst/>
+          </a:prstGeom>
+        </p:spPr>
+        <p:txBody>
+          <a:bodyPr lIns="0" rIns="0" tIns="0" bIns="0" anchor="ctr"/>
+          <a:p>
+            <a:r>
+              <a:rPr lang="en-US">
+                <a:latin typeface="Arial"/>
+              </a:rPr>
+              <a:t>Click to edit the title text format</a:t>
+            </a:r>
+            <a:endParaRPr/>
+          </a:p>
+        </p:txBody>
+      </p:sp>
+      <p:sp>
+        <p:nvSpPr>
+          <p:cNvPr id="61" name="PlaceHolder 7"/>
+          <p:cNvSpPr>
+            <a:spLocks noGrp="1"/>
+          </p:cNvSpPr>
+          <p:nvPr>
+            <p:ph type="body"/>
+          </p:nvPr>
+        </p:nvSpPr>
+        <p:spPr>
+          <a:xfrm>
+            <a:off x="457200" y="1604520"/>
+            <a:ext cx="8228880" cy="3976920"/>
+          </a:xfrm>
+          <a:prstGeom prst="rect">
+            <a:avLst/>
+          </a:prstGeom>
+        </p:spPr>
+        <p:txBody>
+          <a:bodyPr lIns="0" rIns="0" tIns="0" bIns="0"/>
+          <a:p>
+            <a:pPr>
+              <a:buSzPct val="45000"/>
+              <a:buFont typeface="StarSymbol"/>
+              <a:buChar char=""/>
+            </a:pPr>
+            <a:r>
+              <a:rPr lang="en-US">
+                <a:latin typeface="Arial"/>
+              </a:rPr>
+              <a:t>Click to edit the outline text format</a:t>
+            </a:r>
+            <a:endParaRPr/>
+          </a:p>
+          <a:p>
+            <a:pPr lvl="1">
+              <a:buSzPct val="75000"/>
+              <a:buFont typeface="StarSymbol"/>
+              <a:buChar char=""/>
+            </a:pPr>
+            <a:r>
+              <a:rPr lang="en-US">
+                <a:latin typeface="Arial"/>
+              </a:rPr>
+              <a:t>Second Outline Level</a:t>
+            </a:r>
+            <a:endParaRPr/>
+          </a:p>
+          <a:p>
+            <a:pPr lvl="2">
+              <a:buSzPct val="45000"/>
+              <a:buFont typeface="StarSymbol"/>
+              <a:buChar char=""/>
+            </a:pPr>
+            <a:r>
+              <a:rPr lang="en-US">
+                <a:latin typeface="Arial"/>
+              </a:rPr>
+              <a:t>Third Outline Level</a:t>
+            </a:r>
+            <a:endParaRPr/>
+          </a:p>
+          <a:p>
+            <a:pPr lvl="3">
+              <a:buSzPct val="75000"/>
+              <a:buFont typeface="StarSymbol"/>
+              <a:buChar char=""/>
+            </a:pPr>
+            <a:r>
+              <a:rPr lang="en-US">
+                <a:latin typeface="Arial"/>
+              </a:rPr>
+              <a:t>Fourth Outline Level</a:t>
+            </a:r>
+            <a:endParaRPr/>
+          </a:p>
+          <a:p>
+            <a:pPr lvl="4">
+              <a:buSzPct val="45000"/>
+              <a:buFont typeface="StarSymbol"/>
+              <a:buChar char=""/>
+            </a:pPr>
+            <a:r>
+              <a:rPr lang="en-US">
+                <a:latin typeface="Arial"/>
+              </a:rPr>
+              <a:t>Fifth Outline Level</a:t>
+            </a:r>
+            <a:endParaRPr/>
+          </a:p>
+          <a:p>
+            <a:pPr lvl="5">
+              <a:buSzPct val="45000"/>
+              <a:buFont typeface="StarSymbol"/>
+              <a:buChar char=""/>
+            </a:pPr>
+            <a:r>
+              <a:rPr lang="en-US">
+                <a:latin typeface="Arial"/>
+              </a:rPr>
+              <a:t>Sixth Outline Level</a:t>
+            </a:r>
+            <a:endParaRPr/>
+          </a:p>
+          <a:p>
+            <a:pPr lvl="6">
+              <a:buSzPct val="45000"/>
+              <a:buFont typeface="StarSymbol"/>
+              <a:buChar char=""/>
+            </a:pPr>
+            <a:r>
+              <a:rPr lang="en-US">
+                <a:latin typeface="Arial"/>
+              </a:rPr>
+              <a:t>Seventh Outline Level</a:t>
+            </a:r>
+            <a:endParaRPr/>
+          </a:p>
+        </p:txBody>
+      </p:sp>
+    </p:spTree>
+  </p:cSld>
+  <p:clrMap bg1="lt1" bg2="lt2" tx1="dk1" tx2="dk2" accent1="accent1" accent2="accent2" accent3="accent3" accent4="accent4" accent5="accent5" accent6="accent6" hlink="hlink" folHlink="folHlink"/>
+  <p:sldLayoutIdLst>
+    <p:sldLayoutId id="2147483662" r:id="rId9"/>
+    <p:sldLayoutId id="2147483663" r:id="rId10"/>
+    <p:sldLayoutId id="2147483664" r:id="rId11"/>
+    <p:sldLayoutId id="2147483665" r:id="rId12"/>
+    <p:sldLayoutId id="2147483666" r:id="rId13"/>
+    <p:sldLayoutId id="2147483667" r:id="rId14"/>
+    <p:sldLayoutId id="2147483668" r:id="rId15"/>
+    <p:sldLayoutId id="2147483669" r:id="rId16"/>
+    <p:sldLayoutId id="2147483670" r:id="rId17"/>
+    <p:sldLayoutId id="2147483671" r:id="rId18"/>
+    <p:sldLayoutId id="2147483672" r:id="rId19"/>
+    <p:sldLayoutId id="2147483673" r:id="rId20"/>
   </p:sldLayoutIdLst>
 </p:sldMaster>
 </file>
@@ -1701,14 +3370,54 @@
       </p:grpSpPr>
       <p:sp>
         <p:nvSpPr>
-          <p:cNvPr id="48" name="TextShape 1"/>
+          <p:cNvPr id="96" name="CustomShape 1"/>
+          <p:cNvSpPr/>
+          <p:nvPr/>
+        </p:nvSpPr>
+        <p:spPr>
+          <a:xfrm>
+            <a:off x="685800" y="1406880"/>
+            <a:ext cx="7771680" cy="940680"/>
+          </a:xfrm>
+          <a:prstGeom prst="rect">
+            <a:avLst/>
+          </a:prstGeom>
+          <a:noFill/>
+          <a:ln>
+            <a:noFill/>
+          </a:ln>
+        </p:spPr>
+      </p:sp>
+      <p:sp>
+        <p:nvSpPr>
+          <p:cNvPr id="97" name="CustomShape 2"/>
+          <p:cNvSpPr/>
+          <p:nvPr/>
+        </p:nvSpPr>
+        <p:spPr>
+          <a:xfrm>
+            <a:off x="685800" y="3352320"/>
+            <a:ext cx="6400080" cy="1409400"/>
+          </a:xfrm>
+          <a:prstGeom prst="rect">
+            <a:avLst/>
+          </a:prstGeom>
+          <a:noFill/>
+          <a:ln>
+            <a:noFill/>
+          </a:ln>
+        </p:spPr>
+      </p:sp>
+      <p:sp>
+        <p:nvSpPr>
+          <p:cNvPr id="98" name="TextShape 3"/>
           <p:cNvSpPr txBox="1"/>
           <p:nvPr/>
         </p:nvSpPr>
         <p:spPr>
           <a:xfrm>
-            <a:off x="685800" y="1406880"/>
-            <a:ext cx="7772040" cy="941040"/>
+            <a:off x="1097280" y="3805200"/>
+            <a:ext cx="6852960" cy="1370160"/>
           </a:xfrm>
           <a:prstGeom prst="rect">
             <a:avLst/>
@@ -1717,29 +3426,76 @@
         <p:txBody>
           <a:bodyPr lIns="90000" rIns="90000" tIns="45000" bIns="45000"/>
           <a:p>
-            <a:endParaRPr/>
-          </a:p>
-        </p:txBody>
-      </p:sp>
-      <p:sp>
-        <p:nvSpPr>
-          <p:cNvPr id="49" name="TextShape 2"/>
+            <a:r>
+              <a:rPr lang="en-US">
+                <a:latin typeface="Arial"/>
+              </a:rPr>
+              <a:t>Dan Stoner</a:t>
+            </a:r>
+            <a:endParaRPr/>
+          </a:p>
+          <a:p>
+            <a:r>
+              <a:rPr lang="en-US">
+                <a:latin typeface="Arial"/>
+              </a:rPr>
+              <a:t>Advanced Computing and Information Systems Laboratory (ACIS)</a:t>
+            </a:r>
+            <a:endParaRPr/>
+          </a:p>
+          <a:p>
+            <a:r>
+              <a:rPr lang="en-US">
+                <a:latin typeface="Arial"/>
+              </a:rPr>
+              <a:t>University of Florida</a:t>
+            </a:r>
+            <a:endParaRPr/>
+          </a:p>
+          <a:p>
+            <a:endParaRPr/>
+          </a:p>
+          <a:p>
+            <a:r>
+              <a:rPr lang="en-US">
+                <a:latin typeface="Arial"/>
+              </a:rPr>
+              <a:t>dstoner@acis.ufl.edu</a:t>
+            </a:r>
+            <a:r>
+              <a:rPr lang="en-US">
+                <a:latin typeface="Arial"/>
+              </a:rPr>
+              <a:t>                                       @thatlinuxbox</a:t>
+            </a:r>
+            <a:endParaRPr/>
+          </a:p>
+        </p:txBody>
+      </p:sp>
+      <p:sp>
+        <p:nvSpPr>
+          <p:cNvPr id="99" name="TextShape 4"/>
           <p:cNvSpPr txBox="1"/>
           <p:nvPr/>
         </p:nvSpPr>
         <p:spPr>
           <a:xfrm>
-            <a:off x="685800" y="3352320"/>
-            <a:ext cx="6400440" cy="1409760"/>
-          </a:xfrm>
-          <a:prstGeom prst="rect">
-            <a:avLst/>
-          </a:prstGeom>
-        </p:spPr>
-        <p:txBody>
-          <a:bodyPr/>
-          <a:p>
-            <a:pPr algn="ctr"/>
+            <a:off x="1188720" y="1828800"/>
+            <a:ext cx="6126480" cy="731520"/>
+          </a:xfrm>
+          <a:prstGeom prst="rect">
+            <a:avLst/>
+          </a:prstGeom>
+        </p:spPr>
+        <p:txBody>
+          <a:bodyPr lIns="90000" rIns="90000" tIns="45000" bIns="45000"/>
+          <a:p>
+            <a:r>
+              <a:rPr lang="en-US" sz="2600">
+                <a:latin typeface="Arial"/>
+              </a:rPr>
+              <a:t>iDigBio Data Ingestion</a:t>
+            </a:r>
             <a:endParaRPr/>
           </a:p>
         </p:txBody>
@@ -1795,18 +3551,22 @@
       </p:grpSpPr>
       <p:sp>
         <p:nvSpPr>
-          <p:cNvPr id="50" name="TextShape 1"/>
-          <p:cNvSpPr txBox="1"/>
+          <p:cNvPr id="100" name="CustomShape 1"/>
+          <p:cNvSpPr/>
           <p:nvPr/>
         </p:nvSpPr>
         <p:spPr>
           <a:xfrm>
-            <a:off x="685800" y="1406880"/>
-            <a:ext cx="7772040" cy="941040"/>
-          </a:xfrm>
-          <a:prstGeom prst="rect">
-            <a:avLst/>
-          </a:prstGeom>
+            <a:off x="685800" y="914400"/>
+            <a:ext cx="7771680" cy="365760"/>
+          </a:xfrm>
+          <a:prstGeom prst="rect">
+            <a:avLst/>
+          </a:prstGeom>
+          <a:noFill/>
+          <a:ln>
+            <a:noFill/>
+          </a:ln>
         </p:spPr>
         <p:txBody>
           <a:bodyPr lIns="0" rIns="0" tIns="0" bIns="0" anchor="ctr"/>
@@ -1815,45 +3575,37 @@
               <a:rPr lang="en-US">
                 <a:latin typeface="Calibri"/>
               </a:rPr>
-              <a:t>Records</a:t>
+              <a:t>Over 300 Data Providers...</a:t>
             </a:r>
             <a:endParaRPr/>
           </a:p>
         </p:txBody>
       </p:sp>
-      <p:sp>
-        <p:nvSpPr>
-          <p:cNvPr id="51" name="TextShape 2"/>
-          <p:cNvSpPr txBox="1"/>
+      <p:pic>
+        <p:nvPicPr>
+          <p:cNvPr id="101" name="" descr=""/>
+          <p:cNvPicPr/>
           <p:nvPr/>
-        </p:nvSpPr>
-        <p:spPr>
-          <a:xfrm>
-            <a:off x="457200" y="2743200"/>
-            <a:ext cx="8229240" cy="2838600"/>
-          </a:xfrm>
-          <a:prstGeom prst="rect">
-            <a:avLst/>
-          </a:prstGeom>
-        </p:spPr>
-        <p:txBody>
-          <a:bodyPr lIns="0" rIns="0" tIns="0" bIns="0"/>
-          <a:p>
-            <a:pPr>
-              <a:buSzPct val="45000"/>
-              <a:buFont typeface="StarSymbol"/>
-              <a:buChar char=""/>
-            </a:pPr>
-            <a:r>
-              <a:rPr lang="en-US" sz="3200">
-                <a:latin typeface="Arial"/>
-              </a:rPr>
-              <a:t>Chart</a:t>
-            </a:r>
-            <a:endParaRPr/>
-          </a:p>
-        </p:txBody>
-      </p:sp>
+        </p:nvPicPr>
+        <p:blipFill>
+          <a:blip r:embed="rId1"/>
+          <a:stretch>
+            <a:fillRect/>
+          </a:stretch>
+        </p:blipFill>
+        <p:spPr>
+          <a:xfrm>
+            <a:off x="1736280" y="1302120"/>
+            <a:ext cx="5638320" cy="4228920"/>
+          </a:xfrm>
+          <a:prstGeom prst="rect">
+            <a:avLst/>
+          </a:prstGeom>
+          <a:ln>
+            <a:noFill/>
+          </a:ln>
+        </p:spPr>
+      </p:pic>
     </p:spTree>
   </p:cSld>
   <p:timing>
@@ -1903,67 +3655,31 @@
           <a:chExt cx="0" cy="0"/>
         </a:xfrm>
       </p:grpSpPr>
-      <p:sp>
-        <p:nvSpPr>
-          <p:cNvPr id="52" name="TextShape 1"/>
-          <p:cNvSpPr txBox="1"/>
+      <p:pic>
+        <p:nvPicPr>
+          <p:cNvPr id="102" name="" descr=""/>
+          <p:cNvPicPr/>
           <p:nvPr/>
-        </p:nvSpPr>
-        <p:spPr>
-          <a:xfrm>
-            <a:off x="685800" y="1406880"/>
-            <a:ext cx="7772040" cy="941040"/>
-          </a:xfrm>
-          <a:prstGeom prst="rect">
-            <a:avLst/>
-          </a:prstGeom>
-        </p:spPr>
-        <p:txBody>
-          <a:bodyPr lIns="0" rIns="0" tIns="0" bIns="0" anchor="ctr"/>
-          <a:p>
-            <a:r>
-              <a:rPr lang="en-US">
-                <a:latin typeface="Calibri"/>
-              </a:rPr>
-              <a:t>Media Records</a:t>
-            </a:r>
-            <a:endParaRPr/>
-          </a:p>
-        </p:txBody>
-      </p:sp>
-      <p:sp>
-        <p:nvSpPr>
-          <p:cNvPr id="53" name="TextShape 2"/>
-          <p:cNvSpPr txBox="1"/>
-          <p:nvPr/>
-        </p:nvSpPr>
-        <p:spPr>
-          <a:xfrm>
-            <a:off x="457200" y="2651760"/>
-            <a:ext cx="8229240" cy="2930040"/>
-          </a:xfrm>
-          <a:prstGeom prst="rect">
-            <a:avLst/>
-          </a:prstGeom>
-        </p:spPr>
-        <p:txBody>
-          <a:bodyPr lIns="0" rIns="0" tIns="0" bIns="0"/>
-          <a:p>
-            <a:pPr>
-              <a:buSzPct val="45000"/>
-              <a:buFont typeface="StarSymbol"/>
-              <a:buChar char=""/>
-            </a:pPr>
-            <a:r>
-              <a:rPr lang="en-US" sz="3200">
-                <a:latin typeface="Arial"/>
-              </a:rPr>
-              <a:t>Chart</a:t>
-            </a:r>
-            <a:endParaRPr/>
-          </a:p>
-        </p:txBody>
-      </p:sp>
+        </p:nvPicPr>
+        <p:blipFill>
+          <a:blip r:embed="rId1"/>
+          <a:stretch>
+            <a:fillRect/>
+          </a:stretch>
+        </p:blipFill>
+        <p:spPr>
+          <a:xfrm>
+            <a:off x="1378800" y="1005840"/>
+            <a:ext cx="6294960" cy="4406760"/>
+          </a:xfrm>
+          <a:prstGeom prst="rect">
+            <a:avLst/>
+          </a:prstGeom>
+          <a:ln>
+            <a:noFill/>
+          </a:ln>
+        </p:spPr>
+      </p:pic>
     </p:spTree>
   </p:cSld>
   <p:timing>
@@ -2013,67 +3729,31 @@
           <a:chExt cx="0" cy="0"/>
         </a:xfrm>
       </p:grpSpPr>
-      <p:sp>
-        <p:nvSpPr>
-          <p:cNvPr id="54" name="TextShape 1"/>
-          <p:cNvSpPr txBox="1"/>
+      <p:pic>
+        <p:nvPicPr>
+          <p:cNvPr id="103" name="" descr=""/>
+          <p:cNvPicPr/>
           <p:nvPr/>
-        </p:nvSpPr>
-        <p:spPr>
-          <a:xfrm>
-            <a:off x="685800" y="1406880"/>
-            <a:ext cx="7772040" cy="941040"/>
-          </a:xfrm>
-          <a:prstGeom prst="rect">
-            <a:avLst/>
-          </a:prstGeom>
-        </p:spPr>
-        <p:txBody>
-          <a:bodyPr lIns="0" rIns="0" tIns="0" bIns="0" anchor="ctr"/>
-          <a:p>
-            <a:r>
-              <a:rPr lang="en-US">
-                <a:latin typeface="Calibri"/>
-              </a:rPr>
-              <a:t>List of providers</a:t>
-            </a:r>
-            <a:endParaRPr/>
-          </a:p>
-        </p:txBody>
-      </p:sp>
-      <p:sp>
-        <p:nvSpPr>
-          <p:cNvPr id="55" name="TextShape 2"/>
-          <p:cNvSpPr txBox="1"/>
-          <p:nvPr/>
-        </p:nvSpPr>
-        <p:spPr>
-          <a:xfrm>
-            <a:off x="457200" y="2468880"/>
-            <a:ext cx="8229240" cy="3112920"/>
-          </a:xfrm>
-          <a:prstGeom prst="rect">
-            <a:avLst/>
-          </a:prstGeom>
-        </p:spPr>
-        <p:txBody>
-          <a:bodyPr lIns="0" rIns="0" tIns="0" bIns="0"/>
-          <a:p>
-            <a:pPr>
-              <a:buSzPct val="45000"/>
-              <a:buFont typeface="StarSymbol"/>
-              <a:buChar char=""/>
-            </a:pPr>
-            <a:r>
-              <a:rPr lang="en-US" sz="3200">
-                <a:latin typeface="Arial"/>
-              </a:rPr>
-              <a:t>Logos</a:t>
-            </a:r>
-            <a:endParaRPr/>
-          </a:p>
-        </p:txBody>
-      </p:sp>
+        </p:nvPicPr>
+        <p:blipFill>
+          <a:blip r:embed="rId1"/>
+          <a:stretch>
+            <a:fillRect/>
+          </a:stretch>
+        </p:blipFill>
+        <p:spPr>
+          <a:xfrm>
+            <a:off x="260640" y="914400"/>
+            <a:ext cx="8466840" cy="4572000"/>
+          </a:xfrm>
+          <a:prstGeom prst="rect">
+            <a:avLst/>
+          </a:prstGeom>
+          <a:ln>
+            <a:noFill/>
+          </a:ln>
+        </p:spPr>
+      </p:pic>
     </p:spTree>
   </p:cSld>
   <p:timing>
@@ -2125,93 +3805,69 @@
       </p:grpSpPr>
       <p:sp>
         <p:nvSpPr>
-          <p:cNvPr id="56" name="TextShape 1"/>
-          <p:cNvSpPr txBox="1"/>
+          <p:cNvPr id="104" name="CustomShape 1"/>
+          <p:cNvSpPr/>
           <p:nvPr/>
         </p:nvSpPr>
         <p:spPr>
           <a:xfrm>
             <a:off x="685800" y="1406880"/>
-            <a:ext cx="7772040" cy="941040"/>
-          </a:xfrm>
-          <a:prstGeom prst="rect">
-            <a:avLst/>
-          </a:prstGeom>
-        </p:spPr>
-        <p:txBody>
-          <a:bodyPr lIns="0" rIns="0" tIns="0" bIns="0" anchor="ctr"/>
-          <a:p>
-            <a:r>
-              <a:rPr lang="en-US">
-                <a:latin typeface="Calibri"/>
-              </a:rPr>
-              <a:t>Three types of data publishing technologies</a:t>
-            </a:r>
-            <a:endParaRPr/>
-          </a:p>
-        </p:txBody>
-      </p:sp>
-      <p:sp>
-        <p:nvSpPr>
-          <p:cNvPr id="57" name="TextShape 2"/>
-          <p:cNvSpPr txBox="1"/>
+            <a:ext cx="7771680" cy="940680"/>
+          </a:xfrm>
+          <a:prstGeom prst="rect">
+            <a:avLst/>
+          </a:prstGeom>
+          <a:noFill/>
+          <a:ln>
+            <a:noFill/>
+          </a:ln>
+        </p:spPr>
+      </p:sp>
+      <p:sp>
+        <p:nvSpPr>
+          <p:cNvPr id="105" name="CustomShape 2"/>
+          <p:cNvSpPr/>
           <p:nvPr/>
         </p:nvSpPr>
         <p:spPr>
           <a:xfrm>
-            <a:off x="418680" y="2651760"/>
-            <a:ext cx="8229240" cy="3277440"/>
-          </a:xfrm>
-          <a:prstGeom prst="rect">
-            <a:avLst/>
-          </a:prstGeom>
-        </p:spPr>
-        <p:txBody>
-          <a:bodyPr lIns="0" rIns="0" tIns="0" bIns="0"/>
-          <a:p>
-            <a:pPr>
-              <a:buSzPct val="45000"/>
-              <a:buFont typeface="StarSymbol"/>
-              <a:buChar char=""/>
-            </a:pPr>
-            <a:r>
-              <a:rPr lang="en-US" sz="3200">
-                <a:latin typeface="Arial"/>
-              </a:rPr>
-              <a:t>IPT – GBIF Integrated Publishing Toolkit</a:t>
-            </a:r>
-            <a:endParaRPr/>
-          </a:p>
-          <a:p>
-            <a:pPr>
-              <a:buSzPct val="45000"/>
-              <a:buFont typeface="StarSymbol"/>
-              <a:buChar char=""/>
-            </a:pPr>
-            <a:r>
-              <a:rPr lang="en-US" sz="3200">
-                <a:latin typeface="Arial"/>
-              </a:rPr>
-              <a:t>Symbiota – web-based collection management software</a:t>
-            </a:r>
-            <a:endParaRPr/>
-          </a:p>
-          <a:p>
-            <a:pPr>
-              <a:buSzPct val="45000"/>
-              <a:buFont typeface="StarSymbol"/>
-              <a:buChar char=""/>
-            </a:pPr>
-            <a:r>
-              <a:rPr lang="en-US" sz="3200">
-                <a:latin typeface="Arial"/>
-              </a:rPr>
-              <a:t>iDigBio Feeder</a:t>
-            </a:r>
-            <a:endParaRPr/>
-          </a:p>
-        </p:txBody>
-      </p:sp>
+            <a:off x="418680" y="2492640"/>
+            <a:ext cx="8228880" cy="3976920"/>
+          </a:xfrm>
+          <a:prstGeom prst="rect">
+            <a:avLst/>
+          </a:prstGeom>
+          <a:noFill/>
+          <a:ln>
+            <a:noFill/>
+          </a:ln>
+        </p:spPr>
+      </p:sp>
+      <p:pic>
+        <p:nvPicPr>
+          <p:cNvPr id="106" name="" descr=""/>
+          <p:cNvPicPr/>
+          <p:nvPr/>
+        </p:nvPicPr>
+        <p:blipFill>
+          <a:blip r:embed="rId1"/>
+          <a:stretch>
+            <a:fillRect/>
+          </a:stretch>
+        </p:blipFill>
+        <p:spPr>
+          <a:xfrm>
+            <a:off x="122400" y="956520"/>
+            <a:ext cx="8838720" cy="4438440"/>
+          </a:xfrm>
+          <a:prstGeom prst="rect">
+            <a:avLst/>
+          </a:prstGeom>
+          <a:ln>
+            <a:noFill/>
+          </a:ln>
+        </p:spPr>
+      </p:pic>
     </p:spTree>
   </p:cSld>
   <p:timing>
@@ -2263,18 +3919,22 @@
       </p:grpSpPr>
       <p:sp>
         <p:nvSpPr>
-          <p:cNvPr id="58" name="TextShape 1"/>
-          <p:cNvSpPr txBox="1"/>
+          <p:cNvPr id="107" name="CustomShape 1"/>
+          <p:cNvSpPr/>
           <p:nvPr/>
         </p:nvSpPr>
         <p:spPr>
           <a:xfrm>
             <a:off x="685800" y="1406880"/>
-            <a:ext cx="7772040" cy="941040"/>
-          </a:xfrm>
-          <a:prstGeom prst="rect">
-            <a:avLst/>
-          </a:prstGeom>
+            <a:ext cx="7771680" cy="940680"/>
+          </a:xfrm>
+          <a:prstGeom prst="rect">
+            <a:avLst/>
+          </a:prstGeom>
+          <a:noFill/>
+          <a:ln>
+            <a:noFill/>
+          </a:ln>
         </p:spPr>
         <p:txBody>
           <a:bodyPr lIns="0" rIns="0" tIns="0" bIns="0" anchor="ctr"/>
@@ -2283,7 +3943,7 @@
               <a:rPr lang="en-US">
                 <a:latin typeface="Calibri"/>
               </a:rPr>
-              <a:t>Dataset formats</a:t>
+              <a:t>Three types of data publishing technologies</a:t>
             </a:r>
             <a:endParaRPr/>
           </a:p>
@@ -2291,60 +3951,73 @@
       </p:sp>
       <p:sp>
         <p:nvSpPr>
-          <p:cNvPr id="59" name="TextShape 2"/>
-          <p:cNvSpPr txBox="1"/>
+          <p:cNvPr id="108" name="CustomShape 2"/>
+          <p:cNvSpPr/>
           <p:nvPr/>
         </p:nvSpPr>
         <p:spPr>
           <a:xfrm>
-            <a:off x="457200" y="2560320"/>
-            <a:ext cx="8229240" cy="3021480"/>
-          </a:xfrm>
-          <a:prstGeom prst="rect">
-            <a:avLst/>
-          </a:prstGeom>
+            <a:off x="418680" y="2651760"/>
+            <a:ext cx="8228880" cy="3277080"/>
+          </a:xfrm>
+          <a:prstGeom prst="rect">
+            <a:avLst/>
+          </a:prstGeom>
+          <a:noFill/>
+          <a:ln>
+            <a:noFill/>
+          </a:ln>
         </p:spPr>
         <p:txBody>
           <a:bodyPr lIns="0" rIns="0" tIns="0" bIns="0"/>
           <a:p>
             <a:pPr>
+              <a:lnSpc>
+                <a:spcPct val="100000"/>
+              </a:lnSpc>
               <a:buSzPct val="45000"/>
               <a:buFont typeface="StarSymbol"/>
-              <a:buChar char=""/>
+              <a:buChar char="l"/>
             </a:pPr>
             <a:r>
               <a:rPr lang="en-US" sz="3200">
                 <a:latin typeface="Arial"/>
               </a:rPr>
-              <a:t>IPT – DwC-A</a:t>
+              <a:t>IPT – GBIF Integrated Publishing Toolkit</a:t>
             </a:r>
             <a:endParaRPr/>
           </a:p>
           <a:p>
             <a:pPr>
+              <a:lnSpc>
+                <a:spcPct val="100000"/>
+              </a:lnSpc>
               <a:buSzPct val="45000"/>
               <a:buFont typeface="StarSymbol"/>
-              <a:buChar char=""/>
+              <a:buChar char="l"/>
             </a:pPr>
             <a:r>
               <a:rPr lang="en-US" sz="3200">
                 <a:latin typeface="Arial"/>
               </a:rPr>
-              <a:t>Symbiota portals – DwC-A</a:t>
+              <a:t>Symbiota – web-based collection management software</a:t>
             </a:r>
             <a:endParaRPr/>
           </a:p>
           <a:p>
             <a:pPr>
+              <a:lnSpc>
+                <a:spcPct val="100000"/>
+              </a:lnSpc>
               <a:buSzPct val="45000"/>
               <a:buFont typeface="StarSymbol"/>
-              <a:buChar char=""/>
+              <a:buChar char="l"/>
             </a:pPr>
             <a:r>
               <a:rPr lang="en-US" sz="3200">
                 <a:latin typeface="Arial"/>
               </a:rPr>
-              <a:t>IdigBio Feeder – DwC-A, CSV, ...</a:t>
+              <a:t>iDigBio Feeder</a:t>
             </a:r>
             <a:endParaRPr/>
           </a:p>
@@ -2401,44 +4074,106 @@
       </p:grpSpPr>
       <p:sp>
         <p:nvSpPr>
-          <p:cNvPr id="60" name="TextShape 1"/>
-          <p:cNvSpPr txBox="1"/>
+          <p:cNvPr id="109" name="CustomShape 1"/>
+          <p:cNvSpPr/>
           <p:nvPr/>
         </p:nvSpPr>
         <p:spPr>
           <a:xfrm>
             <a:off x="685800" y="1406880"/>
-            <a:ext cx="7772040" cy="941040"/>
-          </a:xfrm>
-          <a:prstGeom prst="rect">
-            <a:avLst/>
-          </a:prstGeom>
+            <a:ext cx="7771680" cy="940680"/>
+          </a:xfrm>
+          <a:prstGeom prst="rect">
+            <a:avLst/>
+          </a:prstGeom>
+          <a:noFill/>
+          <a:ln>
+            <a:noFill/>
+          </a:ln>
         </p:spPr>
         <p:txBody>
           <a:bodyPr lIns="0" rIns="0" tIns="0" bIns="0" anchor="ctr"/>
           <a:p>
-            <a:endParaRPr/>
-          </a:p>
-        </p:txBody>
-      </p:sp>
-      <p:sp>
-        <p:nvSpPr>
-          <p:cNvPr id="61" name="TextShape 2"/>
-          <p:cNvSpPr txBox="1"/>
+            <a:r>
+              <a:rPr lang="en-US">
+                <a:latin typeface="Calibri"/>
+              </a:rPr>
+              <a:t>Dataset formats</a:t>
+            </a:r>
+            <a:endParaRPr/>
+          </a:p>
+        </p:txBody>
+      </p:sp>
+      <p:sp>
+        <p:nvSpPr>
+          <p:cNvPr id="110" name="CustomShape 2"/>
+          <p:cNvSpPr/>
           <p:nvPr/>
         </p:nvSpPr>
         <p:spPr>
           <a:xfrm>
-            <a:off x="418680" y="2492640"/>
-            <a:ext cx="8229240" cy="3977280"/>
-          </a:xfrm>
-          <a:prstGeom prst="rect">
-            <a:avLst/>
-          </a:prstGeom>
+            <a:off x="457200" y="2560320"/>
+            <a:ext cx="8228880" cy="3021120"/>
+          </a:xfrm>
+          <a:prstGeom prst="rect">
+            <a:avLst/>
+          </a:prstGeom>
+          <a:noFill/>
+          <a:ln>
+            <a:noFill/>
+          </a:ln>
         </p:spPr>
         <p:txBody>
           <a:bodyPr lIns="0" rIns="0" tIns="0" bIns="0"/>
           <a:p>
+            <a:pPr>
+              <a:lnSpc>
+                <a:spcPct val="100000"/>
+              </a:lnSpc>
+              <a:buSzPct val="45000"/>
+              <a:buFont typeface="StarSymbol"/>
+              <a:buChar char="l"/>
+            </a:pPr>
+            <a:r>
+              <a:rPr lang="en-US" sz="3200">
+                <a:latin typeface="Arial"/>
+              </a:rPr>
+              <a:t>IPT – DwC-A</a:t>
+            </a:r>
+            <a:endParaRPr/>
+          </a:p>
+          <a:p>
+            <a:pPr>
+              <a:lnSpc>
+                <a:spcPct val="100000"/>
+              </a:lnSpc>
+              <a:buSzPct val="45000"/>
+              <a:buFont typeface="StarSymbol"/>
+              <a:buChar char="l"/>
+            </a:pPr>
+            <a:r>
+              <a:rPr lang="en-US" sz="3200">
+                <a:latin typeface="Arial"/>
+              </a:rPr>
+              <a:t>Symbiota portals – DwC-A</a:t>
+            </a:r>
+            <a:endParaRPr/>
+          </a:p>
+          <a:p>
+            <a:pPr>
+              <a:lnSpc>
+                <a:spcPct val="100000"/>
+              </a:lnSpc>
+              <a:buSzPct val="45000"/>
+              <a:buFont typeface="StarSymbol"/>
+              <a:buChar char="l"/>
+            </a:pPr>
+            <a:r>
+              <a:rPr lang="en-US" sz="3200">
+                <a:latin typeface="Arial"/>
+              </a:rPr>
+              <a:t>IdigBio Feeder – DwC-A, CSV, ...</a:t>
+            </a:r>
             <a:endParaRPr/>
           </a:p>
         </p:txBody>
@@ -2696,4 +4431,227 @@
     </a:fmtScheme>
   </a:themeElements>
 </a:theme>
+</file>
+
+<file path=ppt/theme/theme2.xml><?xml version="1.0" encoding="utf-8"?>
+<a:theme xmlns:a="http://schemas.openxmlformats.org/drawingml/2006/main" name="Office Theme">
+  <a:themeElements>
+    <a:clrScheme name="Office">
+      <a:dk1>
+        <a:sysClr val="windowText" lastClr="000000"/>
+      </a:dk1>
+      <a:lt1>
+        <a:sysClr val="window" lastClr="FFFFFF"/>
+      </a:lt1>
+      <a:dk2>
+        <a:srgbClr val="1F497D"/>
+      </a:dk2>
+      <a:lt2>
+        <a:srgbClr val="EEECE1"/>
+      </a:lt2>
+      <a:accent1>
+        <a:srgbClr val="4F81BD"/>
+      </a:accent1>
+      <a:accent2>
+        <a:srgbClr val="C0504D"/>
+      </a:accent2>
+      <a:accent3>
+        <a:srgbClr val="9BBB59"/>
+      </a:accent3>
+      <a:accent4>
+        <a:srgbClr val="8064A2"/>
+      </a:accent4>
+      <a:accent5>
+        <a:srgbClr val="4BACC6"/>
+      </a:accent5>
+      <a:accent6>
+        <a:srgbClr val="F79646"/>
+      </a:accent6>
+      <a:hlink>
+        <a:srgbClr val="0000FF"/>
+      </a:hlink>
+      <a:folHlink>
+        <a:srgbClr val="800080"/>
+      </a:folHlink>
+    </a:clrScheme>
+    <a:fontScheme name="Office">
+      <a:majorFont>
+        <a:latin typeface="Arial"/>
+        <a:ea typeface="DejaVu Sans"/>
+        <a:cs typeface="DejaVu Sans"/>
+      </a:majorFont>
+      <a:minorFont>
+        <a:latin typeface="Arial"/>
+        <a:ea typeface="DejaVu Sans"/>
+        <a:cs typeface="DejaVu Sans"/>
+      </a:minorFont>
+    </a:fontScheme>
+    <a:fmtScheme name="Office">
+      <a:fillStyleLst>
+        <a:solidFill>
+          <a:schemeClr val="phClr"/>
+        </a:solidFill>
+        <a:gradFill rotWithShape="1">
+          <a:gsLst>
+            <a:gs pos="0">
+              <a:schemeClr val="phClr">
+                <a:tint val="50000"/>
+                <a:satMod val="300000"/>
+              </a:schemeClr>
+            </a:gs>
+            <a:gs pos="35000">
+              <a:schemeClr val="phClr">
+                <a:tint val="37000"/>
+                <a:satMod val="300000"/>
+              </a:schemeClr>
+            </a:gs>
+            <a:gs pos="100000">
+              <a:schemeClr val="phClr">
+                <a:tint val="15000"/>
+                <a:satMod val="350000"/>
+              </a:schemeClr>
+            </a:gs>
+          </a:gsLst>
+          <a:lin ang="16200000" scaled="1"/>
+        </a:gradFill>
+        <a:gradFill rotWithShape="1">
+          <a:gsLst>
+            <a:gs pos="0">
+              <a:schemeClr val="phClr">
+                <a:shade val="51000"/>
+                <a:satMod val="130000"/>
+              </a:schemeClr>
+            </a:gs>
+            <a:gs pos="80000">
+              <a:schemeClr val="phClr">
+                <a:shade val="93000"/>
+                <a:satMod val="130000"/>
+              </a:schemeClr>
+            </a:gs>
+            <a:gs pos="100000">
+              <a:schemeClr val="phClr">
+                <a:shade val="94000"/>
+                <a:satMod val="135000"/>
+              </a:schemeClr>
+            </a:gs>
+          </a:gsLst>
+          <a:lin ang="16200000" scaled="0"/>
+        </a:gradFill>
+      </a:fillStyleLst>
+      <a:lnStyleLst>
+        <a:ln w="9525" cap="flat" cmpd="sng" algn="ctr">
+          <a:solidFill>
+            <a:schemeClr val="phClr">
+              <a:shade val="95000"/>
+              <a:satMod val="105000"/>
+            </a:schemeClr>
+          </a:solidFill>
+          <a:prstDash val="solid"/>
+        </a:ln>
+        <a:ln w="25400" cap="flat" cmpd="sng" algn="ctr">
+          <a:solidFill>
+            <a:schemeClr val="phClr"/>
+          </a:solidFill>
+          <a:prstDash val="solid"/>
+        </a:ln>
+        <a:ln w="38100" cap="flat" cmpd="sng" algn="ctr">
+          <a:solidFill>
+            <a:schemeClr val="phClr"/>
+          </a:solidFill>
+          <a:prstDash val="solid"/>
+        </a:ln>
+      </a:lnStyleLst>
+      <a:effectStyleLst>
+        <a:effectStyle>
+          <a:effectLst>
+            <a:outerShdw blurRad="40000" dist="20000" dir="5400000" rotWithShape="0">
+              <a:srgbClr val="000000">
+                <a:alpha val="38000"/>
+              </a:srgbClr>
+            </a:outerShdw>
+          </a:effectLst>
+        </a:effectStyle>
+        <a:effectStyle>
+          <a:effectLst>
+            <a:outerShdw blurRad="40000" dist="23000" dir="5400000" rotWithShape="0">
+              <a:srgbClr val="000000">
+                <a:alpha val="35000"/>
+              </a:srgbClr>
+            </a:outerShdw>
+          </a:effectLst>
+        </a:effectStyle>
+        <a:effectStyle>
+          <a:effectLst>
+            <a:outerShdw blurRad="40000" dist="23000" dir="5400000" rotWithShape="0">
+              <a:srgbClr val="000000">
+                <a:alpha val="35000"/>
+              </a:srgbClr>
+            </a:outerShdw>
+          </a:effectLst>
+          <a:scene3d>
+            <a:camera prst="orthographicFront">
+              <a:rot lat="0" lon="0" rev="0"/>
+            </a:camera>
+            <a:lightRig rig="threePt" dir="t">
+              <a:rot lat="0" lon="0" rev="1200000"/>
+            </a:lightRig>
+          </a:scene3d>
+          <a:sp3d>
+            <a:bevelT w="63500" h="25400"/>
+          </a:sp3d>
+        </a:effectStyle>
+      </a:effectStyleLst>
+      <a:bgFillStyleLst>
+        <a:solidFill>
+          <a:schemeClr val="phClr"/>
+        </a:solidFill>
+        <a:gradFill rotWithShape="1">
+          <a:gsLst>
+            <a:gs pos="0">
+              <a:schemeClr val="phClr">
+                <a:tint val="40000"/>
+                <a:satMod val="350000"/>
+              </a:schemeClr>
+            </a:gs>
+            <a:gs pos="40000">
+              <a:schemeClr val="phClr">
+                <a:tint val="45000"/>
+                <a:shade val="99000"/>
+                <a:satMod val="350000"/>
+              </a:schemeClr>
+            </a:gs>
+            <a:gs pos="100000">
+              <a:schemeClr val="phClr">
+                <a:shade val="20000"/>
+                <a:satMod val="255000"/>
+              </a:schemeClr>
+            </a:gs>
+          </a:gsLst>
+          <a:path path="circle">
+            <a:fillToRect l="50000" t="-80000" r="50000" b="180000"/>
+          </a:path>
+        </a:gradFill>
+        <a:gradFill rotWithShape="1">
+          <a:gsLst>
+            <a:gs pos="0">
+              <a:schemeClr val="phClr">
+                <a:tint val="80000"/>
+                <a:satMod val="300000"/>
+              </a:schemeClr>
+            </a:gs>
+            <a:gs pos="100000">
+              <a:schemeClr val="phClr">
+                <a:shade val="30000"/>
+                <a:satMod val="200000"/>
+              </a:schemeClr>
+            </a:gs>
+          </a:gsLst>
+          <a:path path="circle">
+            <a:fillToRect l="50000" t="50000" r="50000" b="50000"/>
+          </a:path>
+        </a:gradFill>
+      </a:bgFillStyleLst>
+    </a:fmtScheme>
+  </a:themeElements>
+</a:theme>
 </file>
</xml_diff>

<commit_message>
update Ingested record count graphs
</commit_message>
<xml_diff>
--- a/Dan_CYWG_2014.pptx
+++ b/Dan_CYWG_2014.pptx
@@ -70,8 +70,8 @@
         </p:nvSpPr>
         <p:spPr>
           <a:xfrm>
-            <a:off x="685800" y="1406880"/>
-            <a:ext cx="7771680" cy="941400"/>
+            <a:off x="457200" y="273600"/>
+            <a:ext cx="8229240" cy="1145160"/>
           </a:xfrm>
           <a:prstGeom prst="rect">
             <a:avLst/>
@@ -98,7 +98,7 @@
         <p:spPr>
           <a:xfrm>
             <a:off x="457200" y="1604520"/>
-            <a:ext cx="8228880" cy="1896840"/>
+            <a:ext cx="8229240" cy="1896840"/>
           </a:xfrm>
           <a:prstGeom prst="rect">
             <a:avLst/>
@@ -124,7 +124,7 @@
         <p:spPr>
           <a:xfrm>
             <a:off x="457200" y="3682080"/>
-            <a:ext cx="8228880" cy="1896840"/>
+            <a:ext cx="8229240" cy="1896840"/>
           </a:xfrm>
           <a:prstGeom prst="rect">
             <a:avLst/>
@@ -171,8 +171,8 @@
         </p:nvSpPr>
         <p:spPr>
           <a:xfrm>
-            <a:off x="685800" y="1406880"/>
-            <a:ext cx="7771680" cy="941400"/>
+            <a:off x="457200" y="273600"/>
+            <a:ext cx="8229240" cy="1145160"/>
           </a:xfrm>
           <a:prstGeom prst="rect">
             <a:avLst/>
@@ -199,7 +199,7 @@
         <p:spPr>
           <a:xfrm>
             <a:off x="457200" y="1604520"/>
-            <a:ext cx="4015440" cy="1896840"/>
+            <a:ext cx="4015800" cy="1896840"/>
           </a:xfrm>
           <a:prstGeom prst="rect">
             <a:avLst/>
@@ -224,8 +224,8 @@
         </p:nvSpPr>
         <p:spPr>
           <a:xfrm>
-            <a:off x="4673880" y="1604520"/>
-            <a:ext cx="4015440" cy="1896840"/>
+            <a:off x="4674240" y="1604520"/>
+            <a:ext cx="4015800" cy="1896840"/>
           </a:xfrm>
           <a:prstGeom prst="rect">
             <a:avLst/>
@@ -250,8 +250,8 @@
         </p:nvSpPr>
         <p:spPr>
           <a:xfrm>
-            <a:off x="4673880" y="3682080"/>
-            <a:ext cx="4015440" cy="1896840"/>
+            <a:off x="4674240" y="3682080"/>
+            <a:ext cx="4015800" cy="1896840"/>
           </a:xfrm>
           <a:prstGeom prst="rect">
             <a:avLst/>
@@ -277,7 +277,7 @@
         <p:spPr>
           <a:xfrm>
             <a:off x="457200" y="3682080"/>
-            <a:ext cx="4015440" cy="1896840"/>
+            <a:ext cx="4015800" cy="1896840"/>
           </a:xfrm>
           <a:prstGeom prst="rect">
             <a:avLst/>
@@ -324,8 +324,8 @@
         </p:nvSpPr>
         <p:spPr>
           <a:xfrm>
-            <a:off x="685800" y="1406880"/>
-            <a:ext cx="7771680" cy="941400"/>
+            <a:off x="457200" y="273600"/>
+            <a:ext cx="8229240" cy="1145160"/>
           </a:xfrm>
           <a:prstGeom prst="rect">
             <a:avLst/>
@@ -352,7 +352,7 @@
         <p:spPr>
           <a:xfrm>
             <a:off x="457200" y="1604520"/>
-            <a:ext cx="8228880" cy="3976920"/>
+            <a:ext cx="8229240" cy="3977280"/>
           </a:xfrm>
           <a:prstGeom prst="rect">
             <a:avLst/>
@@ -378,7 +378,7 @@
         <p:spPr>
           <a:xfrm>
             <a:off x="457200" y="1604520"/>
-            <a:ext cx="8228880" cy="3976920"/>
+            <a:ext cx="8229240" cy="3977280"/>
           </a:xfrm>
           <a:prstGeom prst="rect">
             <a:avLst/>
@@ -405,8 +405,8 @@
         </p:blipFill>
         <p:spPr>
           <a:xfrm>
-            <a:off x="2079360" y="1604160"/>
-            <a:ext cx="4984200" cy="3976920"/>
+            <a:off x="2079000" y="1604520"/>
+            <a:ext cx="4984920" cy="3977280"/>
           </a:xfrm>
           <a:prstGeom prst="rect">
             <a:avLst/>
@@ -430,8 +430,8 @@
         </p:blipFill>
         <p:spPr>
           <a:xfrm>
-            <a:off x="2079360" y="1604160"/>
-            <a:ext cx="4984200" cy="3976920"/>
+            <a:off x="2079000" y="1604520"/>
+            <a:ext cx="4984920" cy="3977280"/>
           </a:xfrm>
           <a:prstGeom prst="rect">
             <a:avLst/>
@@ -497,8 +497,8 @@
         </p:nvSpPr>
         <p:spPr>
           <a:xfrm>
-            <a:off x="685800" y="1406880"/>
-            <a:ext cx="7771680" cy="941400"/>
+            <a:off x="457200" y="273600"/>
+            <a:ext cx="8229240" cy="1145160"/>
           </a:xfrm>
           <a:prstGeom prst="rect">
             <a:avLst/>
@@ -525,7 +525,7 @@
         <p:spPr>
           <a:xfrm>
             <a:off x="457200" y="1604520"/>
-            <a:ext cx="8228880" cy="3977280"/>
+            <a:ext cx="8229240" cy="3977640"/>
           </a:xfrm>
           <a:prstGeom prst="rect">
             <a:avLst/>
@@ -573,8 +573,8 @@
         </p:nvSpPr>
         <p:spPr>
           <a:xfrm>
-            <a:off x="685800" y="1406880"/>
-            <a:ext cx="7771680" cy="941400"/>
+            <a:off x="457200" y="273600"/>
+            <a:ext cx="8229240" cy="1145160"/>
           </a:xfrm>
           <a:prstGeom prst="rect">
             <a:avLst/>
@@ -601,7 +601,7 @@
         <p:spPr>
           <a:xfrm>
             <a:off x="457200" y="1604520"/>
-            <a:ext cx="8228880" cy="3976920"/>
+            <a:ext cx="8229240" cy="3977280"/>
           </a:xfrm>
           <a:prstGeom prst="rect">
             <a:avLst/>
@@ -648,8 +648,8 @@
         </p:nvSpPr>
         <p:spPr>
           <a:xfrm>
-            <a:off x="685800" y="1406880"/>
-            <a:ext cx="7771680" cy="941400"/>
+            <a:off x="457200" y="273600"/>
+            <a:ext cx="8229240" cy="1145160"/>
           </a:xfrm>
           <a:prstGeom prst="rect">
             <a:avLst/>
@@ -676,7 +676,7 @@
         <p:spPr>
           <a:xfrm>
             <a:off x="457200" y="1604520"/>
-            <a:ext cx="4015440" cy="3976920"/>
+            <a:ext cx="4015800" cy="3977280"/>
           </a:xfrm>
           <a:prstGeom prst="rect">
             <a:avLst/>
@@ -701,8 +701,8 @@
         </p:nvSpPr>
         <p:spPr>
           <a:xfrm>
-            <a:off x="4673880" y="1604520"/>
-            <a:ext cx="4015440" cy="3976920"/>
+            <a:off x="4674240" y="1604520"/>
+            <a:ext cx="4015800" cy="3977280"/>
           </a:xfrm>
           <a:prstGeom prst="rect">
             <a:avLst/>
@@ -749,8 +749,8 @@
         </p:nvSpPr>
         <p:spPr>
           <a:xfrm>
-            <a:off x="685800" y="1406880"/>
-            <a:ext cx="7771680" cy="941400"/>
+            <a:off x="457200" y="273600"/>
+            <a:ext cx="8229240" cy="1145160"/>
           </a:xfrm>
           <a:prstGeom prst="rect">
             <a:avLst/>
@@ -798,8 +798,8 @@
         </p:nvSpPr>
         <p:spPr>
           <a:xfrm>
-            <a:off x="685800" y="1406880"/>
-            <a:ext cx="7771680" cy="4363920"/>
+            <a:off x="457200" y="273600"/>
+            <a:ext cx="8229240" cy="5308200"/>
           </a:xfrm>
           <a:prstGeom prst="rect">
             <a:avLst/>
@@ -847,8 +847,8 @@
         </p:nvSpPr>
         <p:spPr>
           <a:xfrm>
-            <a:off x="685800" y="1406880"/>
-            <a:ext cx="7771680" cy="941400"/>
+            <a:off x="457200" y="273600"/>
+            <a:ext cx="8229240" cy="1145160"/>
           </a:xfrm>
           <a:prstGeom prst="rect">
             <a:avLst/>
@@ -875,7 +875,7 @@
         <p:spPr>
           <a:xfrm>
             <a:off x="457200" y="1604520"/>
-            <a:ext cx="4015440" cy="1896840"/>
+            <a:ext cx="4015800" cy="1896840"/>
           </a:xfrm>
           <a:prstGeom prst="rect">
             <a:avLst/>
@@ -901,7 +901,7 @@
         <p:spPr>
           <a:xfrm>
             <a:off x="457200" y="3682080"/>
-            <a:ext cx="4015440" cy="1896840"/>
+            <a:ext cx="4015800" cy="1896840"/>
           </a:xfrm>
           <a:prstGeom prst="rect">
             <a:avLst/>
@@ -926,8 +926,8 @@
         </p:nvSpPr>
         <p:spPr>
           <a:xfrm>
-            <a:off x="4673880" y="1604520"/>
-            <a:ext cx="4015440" cy="3976920"/>
+            <a:off x="4674240" y="1604520"/>
+            <a:ext cx="4015800" cy="3977280"/>
           </a:xfrm>
           <a:prstGeom prst="rect">
             <a:avLst/>
@@ -974,8 +974,8 @@
         </p:nvSpPr>
         <p:spPr>
           <a:xfrm>
-            <a:off x="685800" y="1406880"/>
-            <a:ext cx="7771680" cy="941400"/>
+            <a:off x="457200" y="273600"/>
+            <a:ext cx="8229240" cy="1145160"/>
           </a:xfrm>
           <a:prstGeom prst="rect">
             <a:avLst/>
@@ -1002,7 +1002,7 @@
         <p:spPr>
           <a:xfrm>
             <a:off x="457200" y="1604520"/>
-            <a:ext cx="8228880" cy="3977280"/>
+            <a:ext cx="8229240" cy="3977640"/>
           </a:xfrm>
           <a:prstGeom prst="rect">
             <a:avLst/>
@@ -1050,8 +1050,8 @@
         </p:nvSpPr>
         <p:spPr>
           <a:xfrm>
-            <a:off x="685800" y="1406880"/>
-            <a:ext cx="7771680" cy="941400"/>
+            <a:off x="457200" y="273600"/>
+            <a:ext cx="8229240" cy="1145160"/>
           </a:xfrm>
           <a:prstGeom prst="rect">
             <a:avLst/>
@@ -1078,7 +1078,7 @@
         <p:spPr>
           <a:xfrm>
             <a:off x="457200" y="1604520"/>
-            <a:ext cx="4015440" cy="3976920"/>
+            <a:ext cx="4015800" cy="3977280"/>
           </a:xfrm>
           <a:prstGeom prst="rect">
             <a:avLst/>
@@ -1103,8 +1103,8 @@
         </p:nvSpPr>
         <p:spPr>
           <a:xfrm>
-            <a:off x="4673880" y="1604520"/>
-            <a:ext cx="4015440" cy="1896840"/>
+            <a:off x="4674240" y="1604520"/>
+            <a:ext cx="4015800" cy="1896840"/>
           </a:xfrm>
           <a:prstGeom prst="rect">
             <a:avLst/>
@@ -1129,8 +1129,8 @@
         </p:nvSpPr>
         <p:spPr>
           <a:xfrm>
-            <a:off x="4673880" y="3682080"/>
-            <a:ext cx="4015440" cy="1896840"/>
+            <a:off x="4674240" y="3682080"/>
+            <a:ext cx="4015800" cy="1896840"/>
           </a:xfrm>
           <a:prstGeom prst="rect">
             <a:avLst/>
@@ -1177,8 +1177,8 @@
         </p:nvSpPr>
         <p:spPr>
           <a:xfrm>
-            <a:off x="685800" y="1406880"/>
-            <a:ext cx="7771680" cy="941400"/>
+            <a:off x="457200" y="273600"/>
+            <a:ext cx="8229240" cy="1145160"/>
           </a:xfrm>
           <a:prstGeom prst="rect">
             <a:avLst/>
@@ -1205,7 +1205,7 @@
         <p:spPr>
           <a:xfrm>
             <a:off x="457200" y="1604520"/>
-            <a:ext cx="4015440" cy="1896840"/>
+            <a:ext cx="4015800" cy="1896840"/>
           </a:xfrm>
           <a:prstGeom prst="rect">
             <a:avLst/>
@@ -1230,8 +1230,8 @@
         </p:nvSpPr>
         <p:spPr>
           <a:xfrm>
-            <a:off x="4673880" y="1604520"/>
-            <a:ext cx="4015440" cy="1896840"/>
+            <a:off x="4674240" y="1604520"/>
+            <a:ext cx="4015800" cy="1896840"/>
           </a:xfrm>
           <a:prstGeom prst="rect">
             <a:avLst/>
@@ -1257,7 +1257,7 @@
         <p:spPr>
           <a:xfrm>
             <a:off x="457200" y="3682080"/>
-            <a:ext cx="8228880" cy="1896840"/>
+            <a:ext cx="8229240" cy="1896840"/>
           </a:xfrm>
           <a:prstGeom prst="rect">
             <a:avLst/>
@@ -1304,8 +1304,8 @@
         </p:nvSpPr>
         <p:spPr>
           <a:xfrm>
-            <a:off x="685800" y="1406880"/>
-            <a:ext cx="7771680" cy="941400"/>
+            <a:off x="457200" y="273600"/>
+            <a:ext cx="8229240" cy="1145160"/>
           </a:xfrm>
           <a:prstGeom prst="rect">
             <a:avLst/>
@@ -1332,7 +1332,7 @@
         <p:spPr>
           <a:xfrm>
             <a:off x="457200" y="1604520"/>
-            <a:ext cx="8228880" cy="1896840"/>
+            <a:ext cx="8229240" cy="1896840"/>
           </a:xfrm>
           <a:prstGeom prst="rect">
             <a:avLst/>
@@ -1358,7 +1358,7 @@
         <p:spPr>
           <a:xfrm>
             <a:off x="457200" y="3682080"/>
-            <a:ext cx="8228880" cy="1896840"/>
+            <a:ext cx="8229240" cy="1896840"/>
           </a:xfrm>
           <a:prstGeom prst="rect">
             <a:avLst/>
@@ -1405,8 +1405,8 @@
         </p:nvSpPr>
         <p:spPr>
           <a:xfrm>
-            <a:off x="685800" y="1406880"/>
-            <a:ext cx="7771680" cy="941400"/>
+            <a:off x="457200" y="273600"/>
+            <a:ext cx="8229240" cy="1145160"/>
           </a:xfrm>
           <a:prstGeom prst="rect">
             <a:avLst/>
@@ -1433,7 +1433,7 @@
         <p:spPr>
           <a:xfrm>
             <a:off x="457200" y="1604520"/>
-            <a:ext cx="4015440" cy="1896840"/>
+            <a:ext cx="4015800" cy="1896840"/>
           </a:xfrm>
           <a:prstGeom prst="rect">
             <a:avLst/>
@@ -1458,8 +1458,8 @@
         </p:nvSpPr>
         <p:spPr>
           <a:xfrm>
-            <a:off x="4673880" y="1604520"/>
-            <a:ext cx="4015440" cy="1896840"/>
+            <a:off x="4674240" y="1604520"/>
+            <a:ext cx="4015800" cy="1896840"/>
           </a:xfrm>
           <a:prstGeom prst="rect">
             <a:avLst/>
@@ -1484,8 +1484,8 @@
         </p:nvSpPr>
         <p:spPr>
           <a:xfrm>
-            <a:off x="4673880" y="3682080"/>
-            <a:ext cx="4015440" cy="1896840"/>
+            <a:off x="4674240" y="3682080"/>
+            <a:ext cx="4015800" cy="1896840"/>
           </a:xfrm>
           <a:prstGeom prst="rect">
             <a:avLst/>
@@ -1511,7 +1511,7 @@
         <p:spPr>
           <a:xfrm>
             <a:off x="457200" y="3682080"/>
-            <a:ext cx="4015440" cy="1896840"/>
+            <a:ext cx="4015800" cy="1896840"/>
           </a:xfrm>
           <a:prstGeom prst="rect">
             <a:avLst/>
@@ -1558,8 +1558,8 @@
         </p:nvSpPr>
         <p:spPr>
           <a:xfrm>
-            <a:off x="685800" y="1406880"/>
-            <a:ext cx="7771680" cy="941400"/>
+            <a:off x="457200" y="273600"/>
+            <a:ext cx="8229240" cy="1145160"/>
           </a:xfrm>
           <a:prstGeom prst="rect">
             <a:avLst/>
@@ -1586,7 +1586,7 @@
         <p:spPr>
           <a:xfrm>
             <a:off x="457200" y="1604520"/>
-            <a:ext cx="8228880" cy="3976920"/>
+            <a:ext cx="8229240" cy="3977280"/>
           </a:xfrm>
           <a:prstGeom prst="rect">
             <a:avLst/>
@@ -1612,7 +1612,7 @@
         <p:spPr>
           <a:xfrm>
             <a:off x="457200" y="1604520"/>
-            <a:ext cx="8228880" cy="3976920"/>
+            <a:ext cx="8229240" cy="3977280"/>
           </a:xfrm>
           <a:prstGeom prst="rect">
             <a:avLst/>
@@ -1639,8 +1639,8 @@
         </p:blipFill>
         <p:spPr>
           <a:xfrm>
-            <a:off x="2079360" y="1604160"/>
-            <a:ext cx="4984200" cy="3976920"/>
+            <a:off x="2079000" y="1604520"/>
+            <a:ext cx="4984920" cy="3977280"/>
           </a:xfrm>
           <a:prstGeom prst="rect">
             <a:avLst/>
@@ -1664,8 +1664,8 @@
         </p:blipFill>
         <p:spPr>
           <a:xfrm>
-            <a:off x="2079360" y="1604160"/>
-            <a:ext cx="4984200" cy="3976920"/>
+            <a:off x="2079000" y="1604520"/>
+            <a:ext cx="4984920" cy="3977280"/>
           </a:xfrm>
           <a:prstGeom prst="rect">
             <a:avLst/>
@@ -1709,8 +1709,8 @@
         </p:nvSpPr>
         <p:spPr>
           <a:xfrm>
-            <a:off x="685800" y="1406880"/>
-            <a:ext cx="7771680" cy="941400"/>
+            <a:off x="457200" y="273600"/>
+            <a:ext cx="8229240" cy="1145160"/>
           </a:xfrm>
           <a:prstGeom prst="rect">
             <a:avLst/>
@@ -1737,7 +1737,7 @@
         <p:spPr>
           <a:xfrm>
             <a:off x="457200" y="1604520"/>
-            <a:ext cx="8228880" cy="3976920"/>
+            <a:ext cx="8229240" cy="3977280"/>
           </a:xfrm>
           <a:prstGeom prst="rect">
             <a:avLst/>
@@ -1784,8 +1784,8 @@
         </p:nvSpPr>
         <p:spPr>
           <a:xfrm>
-            <a:off x="685800" y="1406880"/>
-            <a:ext cx="7771680" cy="941400"/>
+            <a:off x="457200" y="273600"/>
+            <a:ext cx="8229240" cy="1145160"/>
           </a:xfrm>
           <a:prstGeom prst="rect">
             <a:avLst/>
@@ -1812,7 +1812,7 @@
         <p:spPr>
           <a:xfrm>
             <a:off x="457200" y="1604520"/>
-            <a:ext cx="4015440" cy="3976920"/>
+            <a:ext cx="4015800" cy="3977280"/>
           </a:xfrm>
           <a:prstGeom prst="rect">
             <a:avLst/>
@@ -1837,8 +1837,8 @@
         </p:nvSpPr>
         <p:spPr>
           <a:xfrm>
-            <a:off x="4673880" y="1604520"/>
-            <a:ext cx="4015440" cy="3976920"/>
+            <a:off x="4674240" y="1604520"/>
+            <a:ext cx="4015800" cy="3977280"/>
           </a:xfrm>
           <a:prstGeom prst="rect">
             <a:avLst/>
@@ -1885,8 +1885,8 @@
         </p:nvSpPr>
         <p:spPr>
           <a:xfrm>
-            <a:off x="685800" y="1406880"/>
-            <a:ext cx="7771680" cy="941400"/>
+            <a:off x="457200" y="273600"/>
+            <a:ext cx="8229240" cy="1145160"/>
           </a:xfrm>
           <a:prstGeom prst="rect">
             <a:avLst/>
@@ -1934,8 +1934,8 @@
         </p:nvSpPr>
         <p:spPr>
           <a:xfrm>
-            <a:off x="685800" y="1406880"/>
-            <a:ext cx="7771680" cy="4363920"/>
+            <a:off x="457200" y="273600"/>
+            <a:ext cx="8229240" cy="5308200"/>
           </a:xfrm>
           <a:prstGeom prst="rect">
             <a:avLst/>
@@ -1983,8 +1983,8 @@
         </p:nvSpPr>
         <p:spPr>
           <a:xfrm>
-            <a:off x="685800" y="1406880"/>
-            <a:ext cx="7771680" cy="941400"/>
+            <a:off x="457200" y="273600"/>
+            <a:ext cx="8229240" cy="1145160"/>
           </a:xfrm>
           <a:prstGeom prst="rect">
             <a:avLst/>
@@ -2011,7 +2011,7 @@
         <p:spPr>
           <a:xfrm>
             <a:off x="457200" y="1604520"/>
-            <a:ext cx="4015440" cy="1896840"/>
+            <a:ext cx="4015800" cy="1896840"/>
           </a:xfrm>
           <a:prstGeom prst="rect">
             <a:avLst/>
@@ -2037,7 +2037,7 @@
         <p:spPr>
           <a:xfrm>
             <a:off x="457200" y="3682080"/>
-            <a:ext cx="4015440" cy="1896840"/>
+            <a:ext cx="4015800" cy="1896840"/>
           </a:xfrm>
           <a:prstGeom prst="rect">
             <a:avLst/>
@@ -2062,8 +2062,8 @@
         </p:nvSpPr>
         <p:spPr>
           <a:xfrm>
-            <a:off x="4673880" y="1604520"/>
-            <a:ext cx="4015440" cy="3976920"/>
+            <a:off x="4674240" y="1604520"/>
+            <a:ext cx="4015800" cy="3977280"/>
           </a:xfrm>
           <a:prstGeom prst="rect">
             <a:avLst/>
@@ -2110,8 +2110,8 @@
         </p:nvSpPr>
         <p:spPr>
           <a:xfrm>
-            <a:off x="685800" y="1406880"/>
-            <a:ext cx="7771680" cy="941400"/>
+            <a:off x="457200" y="273600"/>
+            <a:ext cx="8229240" cy="1145160"/>
           </a:xfrm>
           <a:prstGeom prst="rect">
             <a:avLst/>
@@ -2138,7 +2138,7 @@
         <p:spPr>
           <a:xfrm>
             <a:off x="457200" y="1604520"/>
-            <a:ext cx="4015440" cy="3976920"/>
+            <a:ext cx="4015800" cy="3977280"/>
           </a:xfrm>
           <a:prstGeom prst="rect">
             <a:avLst/>
@@ -2163,8 +2163,8 @@
         </p:nvSpPr>
         <p:spPr>
           <a:xfrm>
-            <a:off x="4673880" y="1604520"/>
-            <a:ext cx="4015440" cy="1896840"/>
+            <a:off x="4674240" y="1604520"/>
+            <a:ext cx="4015800" cy="1896840"/>
           </a:xfrm>
           <a:prstGeom prst="rect">
             <a:avLst/>
@@ -2189,8 +2189,8 @@
         </p:nvSpPr>
         <p:spPr>
           <a:xfrm>
-            <a:off x="4673880" y="3682080"/>
-            <a:ext cx="4015440" cy="1896840"/>
+            <a:off x="4674240" y="3682080"/>
+            <a:ext cx="4015800" cy="1896840"/>
           </a:xfrm>
           <a:prstGeom prst="rect">
             <a:avLst/>
@@ -2237,8 +2237,8 @@
         </p:nvSpPr>
         <p:spPr>
           <a:xfrm>
-            <a:off x="685800" y="1406880"/>
-            <a:ext cx="7771680" cy="941400"/>
+            <a:off x="457200" y="273600"/>
+            <a:ext cx="8229240" cy="1145160"/>
           </a:xfrm>
           <a:prstGeom prst="rect">
             <a:avLst/>
@@ -2265,7 +2265,7 @@
         <p:spPr>
           <a:xfrm>
             <a:off x="457200" y="1604520"/>
-            <a:ext cx="4015440" cy="1896840"/>
+            <a:ext cx="4015800" cy="1896840"/>
           </a:xfrm>
           <a:prstGeom prst="rect">
             <a:avLst/>
@@ -2290,8 +2290,8 @@
         </p:nvSpPr>
         <p:spPr>
           <a:xfrm>
-            <a:off x="4673880" y="1604520"/>
-            <a:ext cx="4015440" cy="1896840"/>
+            <a:off x="4674240" y="1604520"/>
+            <a:ext cx="4015800" cy="1896840"/>
           </a:xfrm>
           <a:prstGeom prst="rect">
             <a:avLst/>
@@ -2317,7 +2317,7 @@
         <p:spPr>
           <a:xfrm>
             <a:off x="457200" y="3682080"/>
-            <a:ext cx="8228880" cy="1896840"/>
+            <a:ext cx="8229240" cy="1896840"/>
           </a:xfrm>
           <a:prstGeom prst="rect">
             <a:avLst/>
@@ -2368,7 +2368,7 @@
         <p:spPr>
           <a:xfrm>
             <a:off x="0" y="0"/>
-            <a:ext cx="9143280" cy="569880"/>
+            <a:ext cx="9142920" cy="569520"/>
           </a:xfrm>
           <a:prstGeom prst="rect">
             <a:avLst/>
@@ -2396,7 +2396,7 @@
         <p:spPr>
           <a:xfrm>
             <a:off x="227520" y="123120"/>
-            <a:ext cx="1155960" cy="352080"/>
+            <a:ext cx="1155600" cy="351720"/>
           </a:xfrm>
           <a:prstGeom prst="rect">
             <a:avLst/>
@@ -2437,7 +2437,7 @@
         <p:spPr>
           <a:xfrm>
             <a:off x="0" y="856440"/>
-            <a:ext cx="9143280" cy="4638600"/>
+            <a:ext cx="9142920" cy="4638240"/>
           </a:xfrm>
           <a:prstGeom prst="rect">
             <a:avLst/>
@@ -2465,7 +2465,7 @@
         <p:spPr>
           <a:xfrm>
             <a:off x="0" y="5495760"/>
-            <a:ext cx="9143280" cy="1361520"/>
+            <a:ext cx="9142920" cy="1361160"/>
           </a:xfrm>
           <a:prstGeom prst="rect">
             <a:avLst/>
@@ -2484,7 +2484,7 @@
         <p:spPr>
           <a:xfrm>
             <a:off x="3500280" y="5729400"/>
-            <a:ext cx="5369400" cy="1208160"/>
+            <a:ext cx="5369040" cy="1207800"/>
           </a:xfrm>
           <a:prstGeom prst="rect">
             <a:avLst/>
@@ -2538,7 +2538,7 @@
         <p:spPr>
           <a:xfrm>
             <a:off x="2528640" y="5797080"/>
-            <a:ext cx="754560" cy="758880"/>
+            <a:ext cx="754200" cy="758520"/>
           </a:xfrm>
           <a:prstGeom prst="rect">
             <a:avLst/>
@@ -2563,7 +2563,7 @@
         <p:spPr>
           <a:xfrm>
             <a:off x="198360" y="5868720"/>
-            <a:ext cx="840600" cy="667440"/>
+            <a:ext cx="840240" cy="667080"/>
           </a:xfrm>
           <a:prstGeom prst="rect">
             <a:avLst/>
@@ -2588,7 +2588,7 @@
         <p:spPr>
           <a:xfrm>
             <a:off x="1019160" y="5848200"/>
-            <a:ext cx="662760" cy="667440"/>
+            <a:ext cx="662400" cy="667080"/>
           </a:xfrm>
           <a:prstGeom prst="rect">
             <a:avLst/>
@@ -2613,7 +2613,7 @@
         <p:spPr>
           <a:xfrm>
             <a:off x="1797120" y="5876640"/>
-            <a:ext cx="686520" cy="667440"/>
+            <a:ext cx="686160" cy="667080"/>
           </a:xfrm>
           <a:prstGeom prst="rect">
             <a:avLst/>
@@ -2632,7 +2632,7 @@
         <p:spPr>
           <a:xfrm>
             <a:off x="0" y="0"/>
-            <a:ext cx="9143280" cy="840600"/>
+            <a:ext cx="9142920" cy="840240"/>
           </a:xfrm>
           <a:prstGeom prst="rect">
             <a:avLst/>
@@ -2660,7 +2660,7 @@
         <p:spPr>
           <a:xfrm>
             <a:off x="227520" y="123120"/>
-            <a:ext cx="1934640" cy="589680"/>
+            <a:ext cx="1934280" cy="589320"/>
           </a:xfrm>
           <a:prstGeom prst="rect">
             <a:avLst/>
@@ -2683,7 +2683,7 @@
         <p:spPr>
           <a:xfrm>
             <a:off x="685800" y="1406880"/>
-            <a:ext cx="7771680" cy="941040"/>
+            <a:ext cx="7771320" cy="941040"/>
           </a:xfrm>
           <a:prstGeom prst="rect">
             <a:avLst/>
@@ -2715,7 +2715,7 @@
         <p:spPr>
           <a:xfrm>
             <a:off x="457200" y="1604520"/>
-            <a:ext cx="8229240" cy="3977280"/>
+            <a:ext cx="8228520" cy="3976560"/>
           </a:xfrm>
           <a:prstGeom prst="rect">
             <a:avLst/>
@@ -2730,7 +2730,7 @@
               <a:buChar char=""/>
             </a:pPr>
             <a:r>
-              <a:rPr lang="en-US" sz="3200">
+              <a:rPr lang="en-US">
                 <a:latin typeface="Arial"/>
               </a:rPr>
               <a:t>Click to edit the outline text format</a:t>
@@ -2744,7 +2744,7 @@
               <a:buChar char=""/>
             </a:pPr>
             <a:r>
-              <a:rPr lang="en-US" sz="2800">
+              <a:rPr lang="en-US">
                 <a:latin typeface="Arial"/>
               </a:rPr>
               <a:t>Second Outline Level</a:t>
@@ -2758,7 +2758,7 @@
               <a:buChar char=""/>
             </a:pPr>
             <a:r>
-              <a:rPr lang="en-US" sz="2400">
+              <a:rPr lang="en-US">
                 <a:latin typeface="Arial"/>
               </a:rPr>
               <a:t>Third Outline Level</a:t>
@@ -2772,7 +2772,7 @@
               <a:buChar char=""/>
             </a:pPr>
             <a:r>
-              <a:rPr lang="en-US" sz="2000">
+              <a:rPr lang="en-US">
                 <a:latin typeface="Arial"/>
               </a:rPr>
               <a:t>Fourth Outline Level</a:t>
@@ -2786,7 +2786,7 @@
               <a:buChar char=""/>
             </a:pPr>
             <a:r>
-              <a:rPr lang="en-US" sz="2000">
+              <a:rPr lang="en-US">
                 <a:latin typeface="Arial"/>
               </a:rPr>
               <a:t>Fifth Outline Level</a:t>
@@ -2800,7 +2800,7 @@
               <a:buChar char=""/>
             </a:pPr>
             <a:r>
-              <a:rPr lang="en-US" sz="2000">
+              <a:rPr lang="en-US">
                 <a:latin typeface="Arial"/>
               </a:rPr>
               <a:t>Sixth Outline Level</a:t>
@@ -2814,7 +2814,7 @@
               <a:buChar char=""/>
             </a:pPr>
             <a:r>
-              <a:rPr lang="en-US" sz="2000">
+              <a:rPr lang="en-US">
                 <a:latin typeface="Arial"/>
               </a:rPr>
               <a:t>Seventh Outline Level</a:t>
@@ -2876,7 +2876,7 @@
         <p:spPr>
           <a:xfrm>
             <a:off x="0" y="0"/>
-            <a:ext cx="9143280" cy="569880"/>
+            <a:ext cx="9142920" cy="569520"/>
           </a:xfrm>
           <a:prstGeom prst="rect">
             <a:avLst/>
@@ -2904,7 +2904,7 @@
         <p:spPr>
           <a:xfrm>
             <a:off x="227520" y="123120"/>
-            <a:ext cx="1155960" cy="352080"/>
+            <a:ext cx="1155600" cy="351720"/>
           </a:xfrm>
           <a:prstGeom prst="rect">
             <a:avLst/>
@@ -2945,7 +2945,7 @@
         <p:spPr>
           <a:xfrm>
             <a:off x="0" y="856440"/>
-            <a:ext cx="9143280" cy="4638600"/>
+            <a:ext cx="9142920" cy="4638240"/>
           </a:xfrm>
           <a:prstGeom prst="rect">
             <a:avLst/>
@@ -2973,7 +2973,7 @@
         <p:spPr>
           <a:xfrm>
             <a:off x="0" y="5495760"/>
-            <a:ext cx="9143280" cy="1361520"/>
+            <a:ext cx="9142920" cy="1361160"/>
           </a:xfrm>
           <a:prstGeom prst="rect">
             <a:avLst/>
@@ -2992,7 +2992,7 @@
         <p:spPr>
           <a:xfrm>
             <a:off x="3500280" y="5729400"/>
-            <a:ext cx="5369400" cy="1208160"/>
+            <a:ext cx="5369040" cy="1207800"/>
           </a:xfrm>
           <a:prstGeom prst="rect">
             <a:avLst/>
@@ -3046,7 +3046,7 @@
         <p:spPr>
           <a:xfrm>
             <a:off x="2528640" y="5797080"/>
-            <a:ext cx="754560" cy="758880"/>
+            <a:ext cx="754200" cy="758520"/>
           </a:xfrm>
           <a:prstGeom prst="rect">
             <a:avLst/>
@@ -3071,7 +3071,7 @@
         <p:spPr>
           <a:xfrm>
             <a:off x="198360" y="5868720"/>
-            <a:ext cx="840600" cy="667440"/>
+            <a:ext cx="840240" cy="667080"/>
           </a:xfrm>
           <a:prstGeom prst="rect">
             <a:avLst/>
@@ -3096,7 +3096,7 @@
         <p:spPr>
           <a:xfrm>
             <a:off x="1019160" y="5848200"/>
-            <a:ext cx="662760" cy="667440"/>
+            <a:ext cx="662400" cy="667080"/>
           </a:xfrm>
           <a:prstGeom prst="rect">
             <a:avLst/>
@@ -3121,7 +3121,7 @@
         <p:spPr>
           <a:xfrm>
             <a:off x="1797120" y="5876640"/>
-            <a:ext cx="686520" cy="667440"/>
+            <a:ext cx="686160" cy="667080"/>
           </a:xfrm>
           <a:prstGeom prst="rect">
             <a:avLst/>
@@ -3140,7 +3140,7 @@
         <p:spPr>
           <a:xfrm>
             <a:off x="0" y="0"/>
-            <a:ext cx="9143280" cy="840600"/>
+            <a:ext cx="9142920" cy="840240"/>
           </a:xfrm>
           <a:prstGeom prst="rect">
             <a:avLst/>
@@ -3168,7 +3168,7 @@
         <p:spPr>
           <a:xfrm>
             <a:off x="227520" y="123120"/>
-            <a:ext cx="1934640" cy="589680"/>
+            <a:ext cx="1934280" cy="589320"/>
           </a:xfrm>
           <a:prstGeom prst="rect">
             <a:avLst/>
@@ -3190,8 +3190,8 @@
         </p:nvSpPr>
         <p:spPr>
           <a:xfrm>
-            <a:off x="685800" y="1406880"/>
-            <a:ext cx="7771680" cy="941040"/>
+            <a:off x="457200" y="273600"/>
+            <a:ext cx="8229240" cy="1144800"/>
           </a:xfrm>
           <a:prstGeom prst="rect">
             <a:avLst/>
@@ -3200,8 +3200,9 @@
         <p:txBody>
           <a:bodyPr lIns="0" rIns="0" tIns="0" bIns="0" anchor="ctr"/>
           <a:p>
+            <a:pPr algn="ctr"/>
             <a:r>
-              <a:rPr lang="en-US">
+              <a:rPr lang="en-US" sz="4400">
                 <a:latin typeface="Arial"/>
               </a:rPr>
               <a:t>Click to edit the title text format</a:t>
@@ -3223,7 +3224,7 @@
         <p:spPr>
           <a:xfrm>
             <a:off x="457200" y="1604520"/>
-            <a:ext cx="8228880" cy="3976920"/>
+            <a:ext cx="8229240" cy="3977280"/>
           </a:xfrm>
           <a:prstGeom prst="rect">
             <a:avLst/>
@@ -3238,7 +3239,7 @@
               <a:buChar char=""/>
             </a:pPr>
             <a:r>
-              <a:rPr lang="en-US">
+              <a:rPr lang="en-US" sz="3200">
                 <a:latin typeface="Arial"/>
               </a:rPr>
               <a:t>Click to edit the outline text format</a:t>
@@ -3252,7 +3253,7 @@
               <a:buChar char=""/>
             </a:pPr>
             <a:r>
-              <a:rPr lang="en-US">
+              <a:rPr lang="en-US" sz="2800">
                 <a:latin typeface="Arial"/>
               </a:rPr>
               <a:t>Second Outline Level</a:t>
@@ -3266,7 +3267,7 @@
               <a:buChar char=""/>
             </a:pPr>
             <a:r>
-              <a:rPr lang="en-US">
+              <a:rPr lang="en-US" sz="2400">
                 <a:latin typeface="Arial"/>
               </a:rPr>
               <a:t>Third Outline Level</a:t>
@@ -3280,7 +3281,7 @@
               <a:buChar char=""/>
             </a:pPr>
             <a:r>
-              <a:rPr lang="en-US">
+              <a:rPr lang="en-US" sz="2000">
                 <a:latin typeface="Arial"/>
               </a:rPr>
               <a:t>Fourth Outline Level</a:t>
@@ -3294,7 +3295,7 @@
               <a:buChar char=""/>
             </a:pPr>
             <a:r>
-              <a:rPr lang="en-US">
+              <a:rPr lang="en-US" sz="2000">
                 <a:latin typeface="Arial"/>
               </a:rPr>
               <a:t>Fifth Outline Level</a:t>
@@ -3308,7 +3309,7 @@
               <a:buChar char=""/>
             </a:pPr>
             <a:r>
-              <a:rPr lang="en-US">
+              <a:rPr lang="en-US" sz="2000">
                 <a:latin typeface="Arial"/>
               </a:rPr>
               <a:t>Sixth Outline Level</a:t>
@@ -3322,7 +3323,7 @@
               <a:buChar char=""/>
             </a:pPr>
             <a:r>
-              <a:rPr lang="en-US">
+              <a:rPr lang="en-US" sz="2000">
                 <a:latin typeface="Arial"/>
               </a:rPr>
               <a:t>Seventh Outline Level</a:t>
@@ -3377,7 +3378,7 @@
         <p:spPr>
           <a:xfrm>
             <a:off x="685800" y="1406880"/>
-            <a:ext cx="7771680" cy="940680"/>
+            <a:ext cx="7771320" cy="940320"/>
           </a:xfrm>
           <a:prstGeom prst="rect">
             <a:avLst/>
@@ -3397,7 +3398,7 @@
         <p:spPr>
           <a:xfrm>
             <a:off x="685800" y="3352320"/>
-            <a:ext cx="6400080" cy="1409400"/>
+            <a:ext cx="6399720" cy="1409040"/>
           </a:xfrm>
           <a:prstGeom prst="rect">
             <a:avLst/>
@@ -3410,18 +3411,22 @@
       </p:sp>
       <p:sp>
         <p:nvSpPr>
-          <p:cNvPr id="98" name="TextShape 3"/>
-          <p:cNvSpPr txBox="1"/>
+          <p:cNvPr id="98" name="CustomShape 3"/>
+          <p:cNvSpPr/>
           <p:nvPr/>
         </p:nvSpPr>
         <p:spPr>
           <a:xfrm>
             <a:off x="1097280" y="3805200"/>
-            <a:ext cx="6852960" cy="1370160"/>
-          </a:xfrm>
-          <a:prstGeom prst="rect">
-            <a:avLst/>
-          </a:prstGeom>
+            <a:ext cx="6852600" cy="1369800"/>
+          </a:xfrm>
+          <a:prstGeom prst="rect">
+            <a:avLst/>
+          </a:prstGeom>
+          <a:noFill/>
+          <a:ln>
+            <a:noFill/>
+          </a:ln>
         </p:spPr>
         <p:txBody>
           <a:bodyPr lIns="90000" rIns="90000" tIns="45000" bIns="45000"/>
@@ -3460,32 +3465,30 @@
               <a:rPr lang="en-US">
                 <a:latin typeface="Arial"/>
               </a:rPr>
-              <a:t>dstoner@acis.ufl.edu</a:t>
+              <a:t>dstoner@acis.ufl.edu                                       @thatlinuxbox</a:t>
             </a:r>
-            <a:r>
-              <a:rPr lang="en-US">
-                <a:latin typeface="Arial"/>
-              </a:rPr>
-              <a:t>                                       @thatlinuxbox</a:t>
-            </a:r>
-            <a:endParaRPr/>
-          </a:p>
-        </p:txBody>
-      </p:sp>
-      <p:sp>
-        <p:nvSpPr>
-          <p:cNvPr id="99" name="TextShape 4"/>
-          <p:cNvSpPr txBox="1"/>
+            <a:endParaRPr/>
+          </a:p>
+        </p:txBody>
+      </p:sp>
+      <p:sp>
+        <p:nvSpPr>
+          <p:cNvPr id="99" name="CustomShape 4"/>
+          <p:cNvSpPr/>
           <p:nvPr/>
         </p:nvSpPr>
         <p:spPr>
           <a:xfrm>
             <a:off x="1188720" y="1828800"/>
-            <a:ext cx="6126480" cy="731520"/>
-          </a:xfrm>
-          <a:prstGeom prst="rect">
-            <a:avLst/>
-          </a:prstGeom>
+            <a:ext cx="6126120" cy="731160"/>
+          </a:xfrm>
+          <a:prstGeom prst="rect">
+            <a:avLst/>
+          </a:prstGeom>
+          <a:noFill/>
+          <a:ln>
+            <a:noFill/>
+          </a:ln>
         </p:spPr>
         <p:txBody>
           <a:bodyPr lIns="90000" rIns="90000" tIns="45000" bIns="45000"/>
@@ -3558,7 +3561,7 @@
         <p:spPr>
           <a:xfrm>
             <a:off x="685800" y="914400"/>
-            <a:ext cx="7771680" cy="365760"/>
+            <a:ext cx="7771320" cy="365400"/>
           </a:xfrm>
           <a:prstGeom prst="rect">
             <a:avLst/>
@@ -3595,8 +3598,8 @@
         </p:blipFill>
         <p:spPr>
           <a:xfrm>
-            <a:off x="1736280" y="1302120"/>
-            <a:ext cx="5638320" cy="4228920"/>
+            <a:off x="1920240" y="1604520"/>
+            <a:ext cx="5302800" cy="3977280"/>
           </a:xfrm>
           <a:prstGeom prst="rect">
             <a:avLst/>
@@ -3670,7 +3673,7 @@
         <p:spPr>
           <a:xfrm>
             <a:off x="1378800" y="1005840"/>
-            <a:ext cx="6294960" cy="4406760"/>
+            <a:ext cx="6294600" cy="4406400"/>
           </a:xfrm>
           <a:prstGeom prst="rect">
             <a:avLst/>
@@ -3743,8 +3746,8 @@
         </p:blipFill>
         <p:spPr>
           <a:xfrm>
-            <a:off x="260640" y="914400"/>
-            <a:ext cx="8466840" cy="4572000"/>
+            <a:off x="362520" y="879120"/>
+            <a:ext cx="8362080" cy="4515840"/>
           </a:xfrm>
           <a:prstGeom prst="rect">
             <a:avLst/>
@@ -3812,7 +3815,7 @@
         <p:spPr>
           <a:xfrm>
             <a:off x="685800" y="1406880"/>
-            <a:ext cx="7771680" cy="940680"/>
+            <a:ext cx="7771320" cy="940320"/>
           </a:xfrm>
           <a:prstGeom prst="rect">
             <a:avLst/>
@@ -3832,7 +3835,7 @@
         <p:spPr>
           <a:xfrm>
             <a:off x="418680" y="2492640"/>
-            <a:ext cx="8228880" cy="3976920"/>
+            <a:ext cx="8228520" cy="3976560"/>
           </a:xfrm>
           <a:prstGeom prst="rect">
             <a:avLst/>
@@ -3857,8 +3860,8 @@
         </p:blipFill>
         <p:spPr>
           <a:xfrm>
-            <a:off x="122400" y="956520"/>
-            <a:ext cx="8838720" cy="4438440"/>
+            <a:off x="91440" y="968760"/>
+            <a:ext cx="8996400" cy="4517640"/>
           </a:xfrm>
           <a:prstGeom prst="rect">
             <a:avLst/>
@@ -3926,7 +3929,7 @@
         <p:spPr>
           <a:xfrm>
             <a:off x="685800" y="1406880"/>
-            <a:ext cx="7771680" cy="940680"/>
+            <a:ext cx="7771320" cy="940320"/>
           </a:xfrm>
           <a:prstGeom prst="rect">
             <a:avLst/>
@@ -3958,7 +3961,7 @@
         <p:spPr>
           <a:xfrm>
             <a:off x="418680" y="2651760"/>
-            <a:ext cx="8228880" cy="3277080"/>
+            <a:ext cx="8228520" cy="3276720"/>
           </a:xfrm>
           <a:prstGeom prst="rect">
             <a:avLst/>
@@ -4081,7 +4084,7 @@
         <p:spPr>
           <a:xfrm>
             <a:off x="685800" y="1406880"/>
-            <a:ext cx="7771680" cy="940680"/>
+            <a:ext cx="7771320" cy="940320"/>
           </a:xfrm>
           <a:prstGeom prst="rect">
             <a:avLst/>
@@ -4113,7 +4116,7 @@
         <p:spPr>
           <a:xfrm>
             <a:off x="457200" y="2560320"/>
-            <a:ext cx="8228880" cy="3021120"/>
+            <a:ext cx="8228520" cy="3020760"/>
           </a:xfrm>
           <a:prstGeom prst="rect">
             <a:avLst/>

</xml_diff>

<commit_message>
replace inverse color with original screenshot. muck with title slide.
</commit_message>
<xml_diff>
--- a/Dan_CYWG_2014.pptx
+++ b/Dan_CYWG_2014.pptx
@@ -2371,7 +2371,7 @@
         <p:spPr>
           <a:xfrm>
             <a:off x="0" y="0"/>
-            <a:ext cx="9142200" cy="568800"/>
+            <a:ext cx="9141840" cy="568440"/>
           </a:xfrm>
           <a:prstGeom prst="rect">
             <a:avLst/>
@@ -2399,7 +2399,7 @@
         <p:spPr>
           <a:xfrm>
             <a:off x="227520" y="123120"/>
-            <a:ext cx="1154880" cy="351000"/>
+            <a:ext cx="1154520" cy="350640"/>
           </a:xfrm>
           <a:prstGeom prst="rect">
             <a:avLst/>
@@ -2440,7 +2440,7 @@
         <p:spPr>
           <a:xfrm>
             <a:off x="0" y="856440"/>
-            <a:ext cx="9142200" cy="4637520"/>
+            <a:ext cx="9141840" cy="4637160"/>
           </a:xfrm>
           <a:prstGeom prst="rect">
             <a:avLst/>
@@ -2468,7 +2468,7 @@
         <p:spPr>
           <a:xfrm>
             <a:off x="0" y="5495760"/>
-            <a:ext cx="9142200" cy="1360440"/>
+            <a:ext cx="9141840" cy="1360080"/>
           </a:xfrm>
           <a:prstGeom prst="rect">
             <a:avLst/>
@@ -2487,7 +2487,7 @@
         <p:spPr>
           <a:xfrm>
             <a:off x="3500280" y="5729400"/>
-            <a:ext cx="5368320" cy="1207080"/>
+            <a:ext cx="5367960" cy="1206720"/>
           </a:xfrm>
           <a:prstGeom prst="rect">
             <a:avLst/>
@@ -2541,7 +2541,7 @@
         <p:spPr>
           <a:xfrm>
             <a:off x="2528640" y="5797080"/>
-            <a:ext cx="753480" cy="757800"/>
+            <a:ext cx="753120" cy="757440"/>
           </a:xfrm>
           <a:prstGeom prst="rect">
             <a:avLst/>
@@ -2566,7 +2566,7 @@
         <p:spPr>
           <a:xfrm>
             <a:off x="198360" y="5868720"/>
-            <a:ext cx="839520" cy="666360"/>
+            <a:ext cx="839160" cy="666000"/>
           </a:xfrm>
           <a:prstGeom prst="rect">
             <a:avLst/>
@@ -2591,7 +2591,7 @@
         <p:spPr>
           <a:xfrm>
             <a:off x="1019160" y="5848200"/>
-            <a:ext cx="661680" cy="666360"/>
+            <a:ext cx="661320" cy="666000"/>
           </a:xfrm>
           <a:prstGeom prst="rect">
             <a:avLst/>
@@ -2616,7 +2616,7 @@
         <p:spPr>
           <a:xfrm>
             <a:off x="1797120" y="5876640"/>
-            <a:ext cx="685440" cy="666360"/>
+            <a:ext cx="685080" cy="666000"/>
           </a:xfrm>
           <a:prstGeom prst="rect">
             <a:avLst/>
@@ -2635,7 +2635,7 @@
         <p:spPr>
           <a:xfrm>
             <a:off x="0" y="0"/>
-            <a:ext cx="9142200" cy="839520"/>
+            <a:ext cx="9141840" cy="839160"/>
           </a:xfrm>
           <a:prstGeom prst="rect">
             <a:avLst/>
@@ -2663,7 +2663,7 @@
         <p:spPr>
           <a:xfrm>
             <a:off x="227520" y="123120"/>
-            <a:ext cx="1933560" cy="588600"/>
+            <a:ext cx="1933200" cy="588240"/>
           </a:xfrm>
           <a:prstGeom prst="rect">
             <a:avLst/>
@@ -2864,7 +2864,7 @@
         <p:spPr>
           <a:xfrm>
             <a:off x="0" y="0"/>
-            <a:ext cx="9142200" cy="568800"/>
+            <a:ext cx="9141840" cy="568440"/>
           </a:xfrm>
           <a:prstGeom prst="rect">
             <a:avLst/>
@@ -2892,7 +2892,7 @@
         <p:spPr>
           <a:xfrm>
             <a:off x="227520" y="123120"/>
-            <a:ext cx="1154880" cy="351000"/>
+            <a:ext cx="1154520" cy="350640"/>
           </a:xfrm>
           <a:prstGeom prst="rect">
             <a:avLst/>
@@ -2933,7 +2933,7 @@
         <p:spPr>
           <a:xfrm>
             <a:off x="0" y="856440"/>
-            <a:ext cx="9142200" cy="4637520"/>
+            <a:ext cx="9141840" cy="4637160"/>
           </a:xfrm>
           <a:prstGeom prst="rect">
             <a:avLst/>
@@ -2961,7 +2961,7 @@
         <p:spPr>
           <a:xfrm>
             <a:off x="0" y="5495760"/>
-            <a:ext cx="9142200" cy="1360440"/>
+            <a:ext cx="9141840" cy="1360080"/>
           </a:xfrm>
           <a:prstGeom prst="rect">
             <a:avLst/>
@@ -2980,7 +2980,7 @@
         <p:spPr>
           <a:xfrm>
             <a:off x="3500280" y="5729400"/>
-            <a:ext cx="5368320" cy="1207080"/>
+            <a:ext cx="5367960" cy="1206720"/>
           </a:xfrm>
           <a:prstGeom prst="rect">
             <a:avLst/>
@@ -3034,7 +3034,7 @@
         <p:spPr>
           <a:xfrm>
             <a:off x="2528640" y="5797080"/>
-            <a:ext cx="753480" cy="757800"/>
+            <a:ext cx="753120" cy="757440"/>
           </a:xfrm>
           <a:prstGeom prst="rect">
             <a:avLst/>
@@ -3059,7 +3059,7 @@
         <p:spPr>
           <a:xfrm>
             <a:off x="198360" y="5868720"/>
-            <a:ext cx="839520" cy="666360"/>
+            <a:ext cx="839160" cy="666000"/>
           </a:xfrm>
           <a:prstGeom prst="rect">
             <a:avLst/>
@@ -3084,7 +3084,7 @@
         <p:spPr>
           <a:xfrm>
             <a:off x="1019160" y="5848200"/>
-            <a:ext cx="661680" cy="666360"/>
+            <a:ext cx="661320" cy="666000"/>
           </a:xfrm>
           <a:prstGeom prst="rect">
             <a:avLst/>
@@ -3109,7 +3109,7 @@
         <p:spPr>
           <a:xfrm>
             <a:off x="1797120" y="5876640"/>
-            <a:ext cx="685440" cy="666360"/>
+            <a:ext cx="685080" cy="666000"/>
           </a:xfrm>
           <a:prstGeom prst="rect">
             <a:avLst/>
@@ -3128,7 +3128,7 @@
         <p:spPr>
           <a:xfrm>
             <a:off x="0" y="0"/>
-            <a:ext cx="9142200" cy="839520"/>
+            <a:ext cx="9141840" cy="839160"/>
           </a:xfrm>
           <a:prstGeom prst="rect">
             <a:avLst/>
@@ -3156,7 +3156,7 @@
         <p:spPr>
           <a:xfrm>
             <a:off x="227520" y="123120"/>
-            <a:ext cx="1933560" cy="588600"/>
+            <a:ext cx="1933200" cy="588240"/>
           </a:xfrm>
           <a:prstGeom prst="rect">
             <a:avLst/>
@@ -3350,7 +3350,7 @@
         <p:spPr>
           <a:xfrm>
             <a:off x="685800" y="1406880"/>
-            <a:ext cx="7770600" cy="939600"/>
+            <a:ext cx="7770240" cy="939240"/>
           </a:xfrm>
           <a:prstGeom prst="rect">
             <a:avLst/>
@@ -3370,7 +3370,7 @@
         <p:spPr>
           <a:xfrm>
             <a:off x="685800" y="3352320"/>
-            <a:ext cx="6399000" cy="1408320"/>
+            <a:ext cx="6398640" cy="1407960"/>
           </a:xfrm>
           <a:prstGeom prst="rect">
             <a:avLst/>
@@ -3389,8 +3389,8 @@
         </p:nvSpPr>
         <p:spPr>
           <a:xfrm>
-            <a:off x="1097280" y="3805200"/>
-            <a:ext cx="6851880" cy="1369080"/>
+            <a:off x="822960" y="3383280"/>
+            <a:ext cx="7406640" cy="1790640"/>
           </a:xfrm>
           <a:prstGeom prst="rect">
             <a:avLst/>
@@ -3451,8 +3451,8 @@
         </p:nvSpPr>
         <p:spPr>
           <a:xfrm>
-            <a:off x="1097280" y="1828800"/>
-            <a:ext cx="7223400" cy="730440"/>
+            <a:off x="822960" y="1280160"/>
+            <a:ext cx="7497360" cy="1278720"/>
           </a:xfrm>
           <a:prstGeom prst="rect">
             <a:avLst/>
@@ -3560,7 +3560,7 @@
         <p:spPr>
           <a:xfrm>
             <a:off x="511560" y="1716840"/>
-            <a:ext cx="8266680" cy="2946600"/>
+            <a:ext cx="8266320" cy="2946240"/>
           </a:xfrm>
           <a:prstGeom prst="rect">
             <a:avLst/>
@@ -3628,7 +3628,7 @@
         <p:spPr>
           <a:xfrm>
             <a:off x="685800" y="914400"/>
-            <a:ext cx="7770600" cy="364680"/>
+            <a:ext cx="7770240" cy="364320"/>
           </a:xfrm>
           <a:prstGeom prst="rect">
             <a:avLst/>
@@ -3666,7 +3666,7 @@
         <p:spPr>
           <a:xfrm>
             <a:off x="1920240" y="1418040"/>
-            <a:ext cx="5302080" cy="3976560"/>
+            <a:ext cx="5301720" cy="3976200"/>
           </a:xfrm>
           <a:prstGeom prst="rect">
             <a:avLst/>
@@ -3740,7 +3740,7 @@
         <p:spPr>
           <a:xfrm>
             <a:off x="1378800" y="1005840"/>
-            <a:ext cx="6293880" cy="4405680"/>
+            <a:ext cx="6293520" cy="4405320"/>
           </a:xfrm>
           <a:prstGeom prst="rect">
             <a:avLst/>
@@ -3814,7 +3814,7 @@
         <p:spPr>
           <a:xfrm>
             <a:off x="362520" y="879120"/>
-            <a:ext cx="8361360" cy="4515120"/>
+            <a:ext cx="8361000" cy="4514760"/>
           </a:xfrm>
           <a:prstGeom prst="rect">
             <a:avLst/>
@@ -3882,7 +3882,7 @@
         <p:spPr>
           <a:xfrm>
             <a:off x="685800" y="1406880"/>
-            <a:ext cx="7770600" cy="939600"/>
+            <a:ext cx="7770240" cy="939240"/>
           </a:xfrm>
           <a:prstGeom prst="rect">
             <a:avLst/>
@@ -3902,7 +3902,7 @@
         <p:spPr>
           <a:xfrm>
             <a:off x="418680" y="2492640"/>
-            <a:ext cx="8227800" cy="3975840"/>
+            <a:ext cx="8227440" cy="3975480"/>
           </a:xfrm>
           <a:prstGeom prst="rect">
             <a:avLst/>
@@ -3928,7 +3928,7 @@
         <p:spPr>
           <a:xfrm>
             <a:off x="91440" y="968760"/>
-            <a:ext cx="8995680" cy="4516920"/>
+            <a:ext cx="8995320" cy="4516560"/>
           </a:xfrm>
           <a:prstGeom prst="rect">
             <a:avLst/>
@@ -3996,7 +3996,7 @@
         <p:spPr>
           <a:xfrm>
             <a:off x="548640" y="914400"/>
-            <a:ext cx="7863480" cy="457200"/>
+            <a:ext cx="7863120" cy="456840"/>
           </a:xfrm>
           <a:prstGeom prst="rect">
             <a:avLst/>
@@ -4033,8 +4033,8 @@
         </p:blipFill>
         <p:spPr>
           <a:xfrm>
-            <a:off x="965880" y="1371600"/>
-            <a:ext cx="6854400" cy="4023000"/>
+            <a:off x="719280" y="914400"/>
+            <a:ext cx="7788960" cy="4572000"/>
           </a:xfrm>
           <a:prstGeom prst="rect">
             <a:avLst/>
@@ -4102,7 +4102,7 @@
         <p:spPr>
           <a:xfrm>
             <a:off x="685800" y="1406880"/>
-            <a:ext cx="7770600" cy="939600"/>
+            <a:ext cx="7770240" cy="939240"/>
           </a:xfrm>
           <a:prstGeom prst="rect">
             <a:avLst/>
@@ -4134,7 +4134,7 @@
         <p:spPr>
           <a:xfrm>
             <a:off x="418680" y="2651760"/>
-            <a:ext cx="8227800" cy="3276000"/>
+            <a:ext cx="8227440" cy="3275640"/>
           </a:xfrm>
           <a:prstGeom prst="rect">
             <a:avLst/>
@@ -4257,7 +4257,7 @@
         <p:spPr>
           <a:xfrm>
             <a:off x="685800" y="1406880"/>
-            <a:ext cx="7770600" cy="939600"/>
+            <a:ext cx="7770240" cy="939240"/>
           </a:xfrm>
           <a:prstGeom prst="rect">
             <a:avLst/>
@@ -4289,7 +4289,7 @@
         <p:spPr>
           <a:xfrm>
             <a:off x="457200" y="2560320"/>
-            <a:ext cx="8227800" cy="3020040"/>
+            <a:ext cx="8227440" cy="3019680"/>
           </a:xfrm>
           <a:prstGeom prst="rect">
             <a:avLst/>

</xml_diff>

<commit_message>
add DwC-A info, diagram image, link to TDWG. Add content to 3 types of publishing.
</commit_message>
<xml_diff>
--- a/Dan_CYWG_2014.pptx
+++ b/Dan_CYWG_2014.pptx
@@ -2371,7 +2371,7 @@
         <p:spPr>
           <a:xfrm>
             <a:off x="0" y="0"/>
-            <a:ext cx="9141840" cy="568440"/>
+            <a:ext cx="9141480" cy="568080"/>
           </a:xfrm>
           <a:prstGeom prst="rect">
             <a:avLst/>
@@ -2399,7 +2399,7 @@
         <p:spPr>
           <a:xfrm>
             <a:off x="227520" y="123120"/>
-            <a:ext cx="1154520" cy="350640"/>
+            <a:ext cx="1154160" cy="350280"/>
           </a:xfrm>
           <a:prstGeom prst="rect">
             <a:avLst/>
@@ -2440,7 +2440,7 @@
         <p:spPr>
           <a:xfrm>
             <a:off x="0" y="856440"/>
-            <a:ext cx="9141840" cy="4637160"/>
+            <a:ext cx="9141480" cy="4636800"/>
           </a:xfrm>
           <a:prstGeom prst="rect">
             <a:avLst/>
@@ -2468,7 +2468,7 @@
         <p:spPr>
           <a:xfrm>
             <a:off x="0" y="5495760"/>
-            <a:ext cx="9141840" cy="1360080"/>
+            <a:ext cx="9141480" cy="1359720"/>
           </a:xfrm>
           <a:prstGeom prst="rect">
             <a:avLst/>
@@ -2487,7 +2487,7 @@
         <p:spPr>
           <a:xfrm>
             <a:off x="3500280" y="5729400"/>
-            <a:ext cx="5367960" cy="1206720"/>
+            <a:ext cx="5367600" cy="1206360"/>
           </a:xfrm>
           <a:prstGeom prst="rect">
             <a:avLst/>
@@ -2541,7 +2541,7 @@
         <p:spPr>
           <a:xfrm>
             <a:off x="2528640" y="5797080"/>
-            <a:ext cx="753120" cy="757440"/>
+            <a:ext cx="752760" cy="757080"/>
           </a:xfrm>
           <a:prstGeom prst="rect">
             <a:avLst/>
@@ -2566,7 +2566,7 @@
         <p:spPr>
           <a:xfrm>
             <a:off x="198360" y="5868720"/>
-            <a:ext cx="839160" cy="666000"/>
+            <a:ext cx="838800" cy="665640"/>
           </a:xfrm>
           <a:prstGeom prst="rect">
             <a:avLst/>
@@ -2591,7 +2591,7 @@
         <p:spPr>
           <a:xfrm>
             <a:off x="1019160" y="5848200"/>
-            <a:ext cx="661320" cy="666000"/>
+            <a:ext cx="660960" cy="665640"/>
           </a:xfrm>
           <a:prstGeom prst="rect">
             <a:avLst/>
@@ -2616,7 +2616,7 @@
         <p:spPr>
           <a:xfrm>
             <a:off x="1797120" y="5876640"/>
-            <a:ext cx="685080" cy="666000"/>
+            <a:ext cx="684720" cy="665640"/>
           </a:xfrm>
           <a:prstGeom prst="rect">
             <a:avLst/>
@@ -2635,7 +2635,7 @@
         <p:spPr>
           <a:xfrm>
             <a:off x="0" y="0"/>
-            <a:ext cx="9141840" cy="839160"/>
+            <a:ext cx="9141480" cy="838800"/>
           </a:xfrm>
           <a:prstGeom prst="rect">
             <a:avLst/>
@@ -2663,7 +2663,7 @@
         <p:spPr>
           <a:xfrm>
             <a:off x="227520" y="123120"/>
-            <a:ext cx="1933200" cy="588240"/>
+            <a:ext cx="1932840" cy="587880"/>
           </a:xfrm>
           <a:prstGeom prst="rect">
             <a:avLst/>
@@ -2864,7 +2864,7 @@
         <p:spPr>
           <a:xfrm>
             <a:off x="0" y="0"/>
-            <a:ext cx="9141840" cy="568440"/>
+            <a:ext cx="9141480" cy="568080"/>
           </a:xfrm>
           <a:prstGeom prst="rect">
             <a:avLst/>
@@ -2892,7 +2892,7 @@
         <p:spPr>
           <a:xfrm>
             <a:off x="227520" y="123120"/>
-            <a:ext cx="1154520" cy="350640"/>
+            <a:ext cx="1154160" cy="350280"/>
           </a:xfrm>
           <a:prstGeom prst="rect">
             <a:avLst/>
@@ -2933,7 +2933,7 @@
         <p:spPr>
           <a:xfrm>
             <a:off x="0" y="856440"/>
-            <a:ext cx="9141840" cy="4637160"/>
+            <a:ext cx="9141480" cy="4636800"/>
           </a:xfrm>
           <a:prstGeom prst="rect">
             <a:avLst/>
@@ -2961,7 +2961,7 @@
         <p:spPr>
           <a:xfrm>
             <a:off x="0" y="5495760"/>
-            <a:ext cx="9141840" cy="1360080"/>
+            <a:ext cx="9141480" cy="1359720"/>
           </a:xfrm>
           <a:prstGeom prst="rect">
             <a:avLst/>
@@ -2980,7 +2980,7 @@
         <p:spPr>
           <a:xfrm>
             <a:off x="3500280" y="5729400"/>
-            <a:ext cx="5367960" cy="1206720"/>
+            <a:ext cx="5367600" cy="1206360"/>
           </a:xfrm>
           <a:prstGeom prst="rect">
             <a:avLst/>
@@ -3034,7 +3034,7 @@
         <p:spPr>
           <a:xfrm>
             <a:off x="2528640" y="5797080"/>
-            <a:ext cx="753120" cy="757440"/>
+            <a:ext cx="752760" cy="757080"/>
           </a:xfrm>
           <a:prstGeom prst="rect">
             <a:avLst/>
@@ -3059,7 +3059,7 @@
         <p:spPr>
           <a:xfrm>
             <a:off x="198360" y="5868720"/>
-            <a:ext cx="839160" cy="666000"/>
+            <a:ext cx="838800" cy="665640"/>
           </a:xfrm>
           <a:prstGeom prst="rect">
             <a:avLst/>
@@ -3084,7 +3084,7 @@
         <p:spPr>
           <a:xfrm>
             <a:off x="1019160" y="5848200"/>
-            <a:ext cx="661320" cy="666000"/>
+            <a:ext cx="660960" cy="665640"/>
           </a:xfrm>
           <a:prstGeom prst="rect">
             <a:avLst/>
@@ -3109,7 +3109,7 @@
         <p:spPr>
           <a:xfrm>
             <a:off x="1797120" y="5876640"/>
-            <a:ext cx="685080" cy="666000"/>
+            <a:ext cx="684720" cy="665640"/>
           </a:xfrm>
           <a:prstGeom prst="rect">
             <a:avLst/>
@@ -3128,7 +3128,7 @@
         <p:spPr>
           <a:xfrm>
             <a:off x="0" y="0"/>
-            <a:ext cx="9141840" cy="839160"/>
+            <a:ext cx="9141480" cy="838800"/>
           </a:xfrm>
           <a:prstGeom prst="rect">
             <a:avLst/>
@@ -3156,7 +3156,7 @@
         <p:spPr>
           <a:xfrm>
             <a:off x="227520" y="123120"/>
-            <a:ext cx="1933200" cy="588240"/>
+            <a:ext cx="1932840" cy="587880"/>
           </a:xfrm>
           <a:prstGeom prst="rect">
             <a:avLst/>
@@ -3350,7 +3350,7 @@
         <p:spPr>
           <a:xfrm>
             <a:off x="685800" y="1406880"/>
-            <a:ext cx="7770240" cy="939240"/>
+            <a:ext cx="7769880" cy="938880"/>
           </a:xfrm>
           <a:prstGeom prst="rect">
             <a:avLst/>
@@ -3370,7 +3370,7 @@
         <p:spPr>
           <a:xfrm>
             <a:off x="685800" y="3352320"/>
-            <a:ext cx="6398640" cy="1407960"/>
+            <a:ext cx="6398280" cy="1407600"/>
           </a:xfrm>
           <a:prstGeom prst="rect">
             <a:avLst/>
@@ -3390,7 +3390,7 @@
         <p:spPr>
           <a:xfrm>
             <a:off x="822960" y="3383280"/>
-            <a:ext cx="7406640" cy="1790640"/>
+            <a:ext cx="7406280" cy="1790280"/>
           </a:xfrm>
           <a:prstGeom prst="rect">
             <a:avLst/>
@@ -3452,7 +3452,7 @@
         <p:spPr>
           <a:xfrm>
             <a:off x="822960" y="1280160"/>
-            <a:ext cx="7497360" cy="1278720"/>
+            <a:ext cx="7497000" cy="1278360"/>
           </a:xfrm>
           <a:prstGeom prst="rect">
             <a:avLst/>
@@ -3547,7 +3547,7 @@
       </p:grpSpPr>
       <p:pic>
         <p:nvPicPr>
-          <p:cNvPr descr="" id="113" name=""/>
+          <p:cNvPr descr="" id="115" name=""/>
           <p:cNvPicPr/>
           <p:nvPr/>
         </p:nvPicPr>
@@ -3560,7 +3560,7 @@
         <p:spPr>
           <a:xfrm>
             <a:off x="511560" y="1716840"/>
-            <a:ext cx="8266320" cy="2946240"/>
+            <a:ext cx="8265960" cy="2945880"/>
           </a:xfrm>
           <a:prstGeom prst="rect">
             <a:avLst/>
@@ -3575,10 +3575,10 @@
   <p:timing>
     <p:tnLst>
       <p:par>
-        <p:cTn dur="indefinite" id="17" nodeType="tmRoot" restart="never">
+        <p:cTn dur="indefinite" id="19" nodeType="tmRoot" restart="never">
           <p:childTnLst>
             <p:seq>
-              <p:cTn id="18" nodeType="mainSeq"/>
+              <p:cTn id="20" nodeType="mainSeq"/>
               <p:prevCondLst>
                 <p:cond delay="0" evt="onPrev">
                   <p:tgtEl>
@@ -3628,7 +3628,7 @@
         <p:spPr>
           <a:xfrm>
             <a:off x="685800" y="914400"/>
-            <a:ext cx="7770240" cy="364320"/>
+            <a:ext cx="7769880" cy="363960"/>
           </a:xfrm>
           <a:prstGeom prst="rect">
             <a:avLst/>
@@ -3666,7 +3666,7 @@
         <p:spPr>
           <a:xfrm>
             <a:off x="1920240" y="1418040"/>
-            <a:ext cx="5301720" cy="3976200"/>
+            <a:ext cx="5301360" cy="3975840"/>
           </a:xfrm>
           <a:prstGeom prst="rect">
             <a:avLst/>
@@ -3740,7 +3740,7 @@
         <p:spPr>
           <a:xfrm>
             <a:off x="1378800" y="1005840"/>
-            <a:ext cx="6293520" cy="4405320"/>
+            <a:ext cx="6293160" cy="4404960"/>
           </a:xfrm>
           <a:prstGeom prst="rect">
             <a:avLst/>
@@ -3814,7 +3814,7 @@
         <p:spPr>
           <a:xfrm>
             <a:off x="362520" y="879120"/>
-            <a:ext cx="8361000" cy="4514760"/>
+            <a:ext cx="8360640" cy="4514400"/>
           </a:xfrm>
           <a:prstGeom prst="rect">
             <a:avLst/>
@@ -3882,7 +3882,7 @@
         <p:spPr>
           <a:xfrm>
             <a:off x="685800" y="1406880"/>
-            <a:ext cx="7770240" cy="939240"/>
+            <a:ext cx="7769880" cy="938880"/>
           </a:xfrm>
           <a:prstGeom prst="rect">
             <a:avLst/>
@@ -3902,7 +3902,7 @@
         <p:spPr>
           <a:xfrm>
             <a:off x="418680" y="2492640"/>
-            <a:ext cx="8227440" cy="3975480"/>
+            <a:ext cx="8227080" cy="3975120"/>
           </a:xfrm>
           <a:prstGeom prst="rect">
             <a:avLst/>
@@ -3928,7 +3928,7 @@
         <p:spPr>
           <a:xfrm>
             <a:off x="91440" y="968760"/>
-            <a:ext cx="8995320" cy="4516560"/>
+            <a:ext cx="8994960" cy="4516200"/>
           </a:xfrm>
           <a:prstGeom prst="rect">
             <a:avLst/>
@@ -3996,7 +3996,7 @@
         <p:spPr>
           <a:xfrm>
             <a:off x="548640" y="914400"/>
-            <a:ext cx="7863120" cy="456840"/>
+            <a:ext cx="7862760" cy="456480"/>
           </a:xfrm>
           <a:prstGeom prst="rect">
             <a:avLst/>
@@ -4034,7 +4034,7 @@
         <p:spPr>
           <a:xfrm>
             <a:off x="719280" y="914400"/>
-            <a:ext cx="7788960" cy="4572000"/>
+            <a:ext cx="7788600" cy="4571640"/>
           </a:xfrm>
           <a:prstGeom prst="rect">
             <a:avLst/>
@@ -4101,8 +4101,8 @@
         </p:nvSpPr>
         <p:spPr>
           <a:xfrm>
-            <a:off x="685800" y="1406880"/>
-            <a:ext cx="7770240" cy="939240"/>
+            <a:off x="685800" y="822960"/>
+            <a:ext cx="7769880" cy="1097280"/>
           </a:xfrm>
           <a:prstGeom prst="rect">
             <a:avLst/>
@@ -4116,10 +4116,10 @@
           <a:bodyPr anchor="ctr" bIns="0" lIns="0" rIns="0" tIns="0"/>
           <a:p>
             <a:r>
-              <a:rPr lang="en-US">
+              <a:rPr lang="en-US" sz="2800">
                 <a:latin typeface="Calibri"/>
               </a:rPr>
-              <a:t>Three types of data publishing technologies</a:t>
+              <a:t>Three types of data publishing technologies currently being consumed:</a:t>
             </a:r>
             <a:endParaRPr/>
           </a:p>
@@ -4133,8 +4133,8 @@
         </p:nvSpPr>
         <p:spPr>
           <a:xfrm>
-            <a:off x="418680" y="2651760"/>
-            <a:ext cx="8227440" cy="3275640"/>
+            <a:off x="418680" y="2103120"/>
+            <a:ext cx="8227080" cy="3017520"/>
           </a:xfrm>
           <a:prstGeom prst="rect">
             <a:avLst/>
@@ -4153,13 +4153,13 @@
               </a:lnSpc>
               <a:buSzPct val="25000"/>
               <a:buFont typeface="StarSymbol"/>
-              <a:buChar char="l"/>
+              <a:buChar char=""/>
             </a:pPr>
             <a:r>
-              <a:rPr lang="en-US" sz="3200">
+              <a:rPr lang="en-US" sz="2800">
                 <a:latin typeface="Arial"/>
               </a:rPr>
-              <a:t>IPT – GBIF Integrated Publishing Toolkit</a:t>
+              <a:t>GBIF Integrated Publishing Toolkit (IPT)</a:t>
             </a:r>
             <a:endParaRPr/>
           </a:p>
@@ -4170,13 +4170,19 @@
               </a:lnSpc>
               <a:buSzPct val="25000"/>
               <a:buFont typeface="StarSymbol"/>
-              <a:buChar char="l"/>
+              <a:buChar char=""/>
             </a:pPr>
             <a:r>
-              <a:rPr lang="en-US" sz="3200">
+              <a:rPr lang="en-US" sz="2800">
                 <a:latin typeface="Arial"/>
               </a:rPr>
-              <a:t>Symbiota – web-based collection management software</a:t>
+              <a:t>  </a:t>
+            </a:r>
+            <a:r>
+              <a:rPr lang="en-US" sz="2800">
+                <a:latin typeface="Arial"/>
+              </a:rPr>
+              <a:t>http://www.gbif.org/ipt</a:t>
             </a:r>
             <a:endParaRPr/>
           </a:p>
@@ -4187,14 +4193,65 @@
               </a:lnSpc>
               <a:buSzPct val="25000"/>
               <a:buFont typeface="StarSymbol"/>
-              <a:buChar char="l"/>
+              <a:buChar char=""/>
             </a:pPr>
             <a:r>
-              <a:rPr lang="en-US" sz="3200">
+              <a:rPr lang="en-US" sz="2800">
                 <a:latin typeface="Arial"/>
               </a:rPr>
-              <a:t>iDigBio Feeder</a:t>
+              <a:t>Symbiota – web-based collection management software</a:t>
             </a:r>
+            <a:endParaRPr/>
+          </a:p>
+          <a:p>
+            <a:pPr>
+              <a:lnSpc>
+                <a:spcPct val="100000"/>
+              </a:lnSpc>
+              <a:buSzPct val="25000"/>
+              <a:buFont typeface="StarSymbol"/>
+              <a:buChar char=""/>
+            </a:pPr>
+            <a:r>
+              <a:rPr lang="en-US" sz="2800">
+                <a:latin typeface="Arial"/>
+              </a:rPr>
+              <a:t>  </a:t>
+            </a:r>
+            <a:r>
+              <a:rPr lang="en-US" sz="2800">
+                <a:latin typeface="Arial"/>
+              </a:rPr>
+              <a:t>http://symbiota.org/</a:t>
+            </a:r>
+            <a:endParaRPr/>
+          </a:p>
+          <a:p>
+            <a:pPr>
+              <a:lnSpc>
+                <a:spcPct val="100000"/>
+              </a:lnSpc>
+              <a:buSzPct val="25000"/>
+              <a:buFont typeface="StarSymbol"/>
+              <a:buChar char=""/>
+            </a:pPr>
+            <a:r>
+              <a:rPr lang="en-US" sz="2800">
+                <a:latin typeface="Arial"/>
+              </a:rPr>
+              <a:t>iDigBio Feeder – for providers who do not run infrastructure</a:t>
+            </a:r>
+            <a:endParaRPr/>
+          </a:p>
+          <a:p>
+            <a:pPr>
+              <a:lnSpc>
+                <a:spcPct val="100000"/>
+              </a:lnSpc>
+              <a:buSzPct val="25000"/>
+              <a:buFont typeface="StarSymbol"/>
+              <a:buChar char=""/>
+            </a:pPr>
             <a:endParaRPr/>
           </a:p>
         </p:txBody>
@@ -4250,110 +4307,77 @@
       </p:grpSpPr>
       <p:sp>
         <p:nvSpPr>
-          <p:cNvPr id="111" name="CustomShape 1"/>
-          <p:cNvSpPr/>
+          <p:cNvPr id="111" name="TextShape 1"/>
+          <p:cNvSpPr txBox="1"/>
           <p:nvPr/>
         </p:nvSpPr>
         <p:spPr>
           <a:xfrm>
-            <a:off x="685800" y="1406880"/>
-            <a:ext cx="7770240" cy="939240"/>
-          </a:xfrm>
-          <a:prstGeom prst="rect">
-            <a:avLst/>
-          </a:prstGeom>
-          <a:noFill/>
+            <a:off x="822960" y="878400"/>
+            <a:ext cx="7589520" cy="2011680"/>
+          </a:xfrm>
+          <a:prstGeom prst="rect">
+            <a:avLst/>
+          </a:prstGeom>
+        </p:spPr>
+        <p:txBody>
+          <a:bodyPr bIns="45000" lIns="90000" rIns="90000" tIns="45000" wrap="none"/>
+          <a:p>
+            <a:r>
+              <a:rPr lang="en-US" sz="2400"/>
+              <a:t>Darwin Core Archive / DwC-A</a:t>
+            </a:r>
+            <a:endParaRPr/>
+          </a:p>
+          <a:p>
+            <a:r>
+              <a:rPr lang="en-US" sz="2200">
+                <a:latin typeface="Arial"/>
+                <a:hlinkClick r:id="rId1"/>
+              </a:rPr>
+              <a:t>http://rs.tdwg.org/dwc/terms/guides/text/</a:t>
+            </a:r>
+            <a:endParaRPr/>
+          </a:p>
+          <a:p>
+            <a:endParaRPr/>
+          </a:p>
+          <a:p>
+            <a:r>
+              <a:rPr lang="en-US" sz="2200">
+                <a:latin typeface="Arial"/>
+              </a:rPr>
+              <a:t>A Darwin Core Archive is a zip file that includes both metadata about the dataset, the data itself, and any optional extension data.</a:t>
+            </a:r>
+            <a:endParaRPr/>
+          </a:p>
+        </p:txBody>
+      </p:sp>
+      <p:pic>
+        <p:nvPicPr>
+          <p:cNvPr descr="" id="112" name=""/>
+          <p:cNvPicPr/>
+          <p:nvPr/>
+        </p:nvPicPr>
+        <p:blipFill>
+          <a:blip r:embed="rId2"/>
+          <a:stretch>
+            <a:fillRect/>
+          </a:stretch>
+        </p:blipFill>
+        <p:spPr>
+          <a:xfrm>
+            <a:off x="919080" y="2890080"/>
+            <a:ext cx="7146720" cy="2596320"/>
+          </a:xfrm>
+          <a:prstGeom prst="rect">
+            <a:avLst/>
+          </a:prstGeom>
           <a:ln>
             <a:noFill/>
           </a:ln>
         </p:spPr>
-        <p:txBody>
-          <a:bodyPr anchor="ctr" bIns="0" lIns="0" rIns="0" tIns="0"/>
-          <a:p>
-            <a:r>
-              <a:rPr lang="en-US">
-                <a:latin typeface="Calibri"/>
-              </a:rPr>
-              <a:t>Dataset formats</a:t>
-            </a:r>
-            <a:endParaRPr/>
-          </a:p>
-        </p:txBody>
-      </p:sp>
-      <p:sp>
-        <p:nvSpPr>
-          <p:cNvPr id="112" name="CustomShape 2"/>
-          <p:cNvSpPr/>
-          <p:nvPr/>
-        </p:nvSpPr>
-        <p:spPr>
-          <a:xfrm>
-            <a:off x="457200" y="2560320"/>
-            <a:ext cx="8227440" cy="3019680"/>
-          </a:xfrm>
-          <a:prstGeom prst="rect">
-            <a:avLst/>
-          </a:prstGeom>
-          <a:noFill/>
-          <a:ln>
-            <a:noFill/>
-          </a:ln>
-        </p:spPr>
-        <p:txBody>
-          <a:bodyPr bIns="0" lIns="0" rIns="0" tIns="0"/>
-          <a:p>
-            <a:pPr>
-              <a:lnSpc>
-                <a:spcPct val="100000"/>
-              </a:lnSpc>
-              <a:buSzPct val="25000"/>
-              <a:buFont typeface="StarSymbol"/>
-              <a:buChar char="l"/>
-            </a:pPr>
-            <a:r>
-              <a:rPr lang="en-US" sz="3200">
-                <a:latin typeface="Arial"/>
-              </a:rPr>
-              <a:t>IPT – DwC-A</a:t>
-            </a:r>
-            <a:endParaRPr/>
-          </a:p>
-          <a:p>
-            <a:pPr>
-              <a:lnSpc>
-                <a:spcPct val="100000"/>
-              </a:lnSpc>
-              <a:buSzPct val="25000"/>
-              <a:buFont typeface="StarSymbol"/>
-              <a:buChar char="l"/>
-            </a:pPr>
-            <a:r>
-              <a:rPr lang="en-US" sz="3200">
-                <a:latin typeface="Arial"/>
-              </a:rPr>
-              <a:t>Symbiota portals – DwC-A</a:t>
-            </a:r>
-            <a:endParaRPr/>
-          </a:p>
-          <a:p>
-            <a:pPr>
-              <a:lnSpc>
-                <a:spcPct val="100000"/>
-              </a:lnSpc>
-              <a:buSzPct val="25000"/>
-              <a:buFont typeface="StarSymbol"/>
-              <a:buChar char="l"/>
-            </a:pPr>
-            <a:r>
-              <a:rPr lang="en-US" sz="3200">
-                <a:latin typeface="Arial"/>
-              </a:rPr>
-              <a:t>IdigBio Feeder – DwC-A, CSV, ...</a:t>
-            </a:r>
-            <a:endParaRPr/>
-          </a:p>
-        </p:txBody>
-      </p:sp>
+      </p:pic>
     </p:spTree>
   </p:cSld>
   <p:timing>
@@ -4403,8 +4427,149 @@
           <a:chExt cx="0" cy="0"/>
         </a:xfrm>
       </p:grpSpPr>
+      <p:sp>
+        <p:nvSpPr>
+          <p:cNvPr id="113" name="CustomShape 1"/>
+          <p:cNvSpPr/>
+          <p:nvPr/>
+        </p:nvSpPr>
+        <p:spPr>
+          <a:xfrm>
+            <a:off x="685800" y="1005840"/>
+            <a:ext cx="7769880" cy="731520"/>
+          </a:xfrm>
+          <a:prstGeom prst="rect">
+            <a:avLst/>
+          </a:prstGeom>
+          <a:noFill/>
+          <a:ln>
+            <a:noFill/>
+          </a:ln>
+        </p:spPr>
+        <p:txBody>
+          <a:bodyPr anchor="ctr" bIns="0" lIns="0" rIns="0" tIns="0"/>
+          <a:p>
+            <a:r>
+              <a:rPr lang="en-US" sz="3200">
+                <a:latin typeface="Calibri"/>
+              </a:rPr>
+              <a:t>Dataset formats</a:t>
+            </a:r>
+            <a:endParaRPr/>
+          </a:p>
+        </p:txBody>
+      </p:sp>
+      <p:sp>
+        <p:nvSpPr>
+          <p:cNvPr id="114" name="CustomShape 2"/>
+          <p:cNvSpPr/>
+          <p:nvPr/>
+        </p:nvSpPr>
+        <p:spPr>
+          <a:xfrm>
+            <a:off x="457200" y="2011680"/>
+            <a:ext cx="8227080" cy="3567960"/>
+          </a:xfrm>
+          <a:prstGeom prst="rect">
+            <a:avLst/>
+          </a:prstGeom>
+          <a:noFill/>
+          <a:ln>
+            <a:noFill/>
+          </a:ln>
+        </p:spPr>
+        <p:txBody>
+          <a:bodyPr bIns="0" lIns="0" rIns="0" tIns="0"/>
+          <a:p>
+            <a:pPr>
+              <a:lnSpc>
+                <a:spcPct val="100000"/>
+              </a:lnSpc>
+            </a:pPr>
+            <a:endParaRPr/>
+          </a:p>
+          <a:p>
+            <a:pPr>
+              <a:lnSpc>
+                <a:spcPct val="100000"/>
+              </a:lnSpc>
+              <a:buSzPct val="25000"/>
+              <a:buFont typeface="StarSymbol"/>
+              <a:buChar char=""/>
+            </a:pPr>
+            <a:r>
+              <a:rPr lang="en-US" sz="3200">
+                <a:latin typeface="Arial"/>
+              </a:rPr>
+              <a:t>IPT – DwC-A</a:t>
+            </a:r>
+            <a:endParaRPr/>
+          </a:p>
+          <a:p>
+            <a:pPr>
+              <a:lnSpc>
+                <a:spcPct val="100000"/>
+              </a:lnSpc>
+              <a:buSzPct val="25000"/>
+              <a:buFont typeface="StarSymbol"/>
+              <a:buChar char=""/>
+            </a:pPr>
+            <a:r>
+              <a:rPr lang="en-US" sz="3200">
+                <a:latin typeface="Arial"/>
+              </a:rPr>
+              <a:t>Symbiota portals – DwC-A</a:t>
+            </a:r>
+            <a:endParaRPr/>
+          </a:p>
+          <a:p>
+            <a:pPr>
+              <a:lnSpc>
+                <a:spcPct val="100000"/>
+              </a:lnSpc>
+              <a:buSzPct val="25000"/>
+              <a:buFont typeface="StarSymbol"/>
+              <a:buChar char=""/>
+            </a:pPr>
+            <a:r>
+              <a:rPr lang="en-US" sz="3200">
+                <a:latin typeface="Arial"/>
+              </a:rPr>
+              <a:t>iDigBio Feeder – DwC-A, CSV, …</a:t>
+            </a:r>
+            <a:endParaRPr/>
+          </a:p>
+        </p:txBody>
+      </p:sp>
     </p:spTree>
   </p:cSld>
+  <p:timing>
+    <p:tnLst>
+      <p:par>
+        <p:cTn dur="indefinite" id="17" nodeType="tmRoot" restart="never">
+          <p:childTnLst>
+            <p:seq>
+              <p:cTn id="18" nodeType="mainSeq"/>
+              <p:prevCondLst>
+                <p:cond delay="0" evt="onPrev">
+                  <p:tgtEl>
+                    <p:sldTgt/>
+                  </p:tgtEl>
+                </p:cond>
+              </p:prevCondLst>
+              <p:nextCondLst>
+                <p:cond delay="0" evt="onNext">
+                  <p:tgtEl>
+                    <p:sldTgt/>
+                  </p:tgtEl>
+                </p:cond>
+              </p:nextCondLst>
+            </p:seq>
+          </p:childTnLst>
+        </p:cTn>
+      </p:par>
+    </p:tnLst>
+  </p:timing>
 </p:sld>
 </file>
 

</xml_diff>

<commit_message>
last edit. move to Google Drive.
</commit_message>
<xml_diff>
--- a/Dan_CYWG_2014.pptx
+++ b/Dan_CYWG_2014.pptx
@@ -19,6 +19,7 @@
     <p:sldId id="266" r:id="rId14"/>
     <p:sldId id="267" r:id="rId15"/>
     <p:sldId id="268" r:id="rId16"/>
+    <p:sldId id="269" r:id="rId17"/>
   </p:sldIdLst>
   <p:sldSz cx="9144000" cy="6858000"/>
   <p:notesSz cx="7772400" cy="10058400"/>
@@ -2374,7 +2375,7 @@
         <p:spPr>
           <a:xfrm>
             <a:off x="0" y="0"/>
-            <a:ext cx="9140760" cy="567360"/>
+            <a:ext cx="9140400" cy="567000"/>
           </a:xfrm>
           <a:prstGeom prst="rect">
             <a:avLst/>
@@ -2402,7 +2403,7 @@
         <p:spPr>
           <a:xfrm>
             <a:off x="227520" y="123120"/>
-            <a:ext cx="1153440" cy="349560"/>
+            <a:ext cx="1153080" cy="349200"/>
           </a:xfrm>
           <a:prstGeom prst="rect">
             <a:avLst/>
@@ -2443,7 +2444,7 @@
         <p:spPr>
           <a:xfrm>
             <a:off x="0" y="856440"/>
-            <a:ext cx="9140760" cy="4636080"/>
+            <a:ext cx="9140400" cy="4635720"/>
           </a:xfrm>
           <a:prstGeom prst="rect">
             <a:avLst/>
@@ -2471,7 +2472,7 @@
         <p:spPr>
           <a:xfrm>
             <a:off x="0" y="5495760"/>
-            <a:ext cx="9140760" cy="1359000"/>
+            <a:ext cx="9140400" cy="1358640"/>
           </a:xfrm>
           <a:prstGeom prst="rect">
             <a:avLst/>
@@ -2490,7 +2491,7 @@
         <p:spPr>
           <a:xfrm>
             <a:off x="3500280" y="5729400"/>
-            <a:ext cx="5366880" cy="1205640"/>
+            <a:ext cx="5366520" cy="1205280"/>
           </a:xfrm>
           <a:prstGeom prst="rect">
             <a:avLst/>
@@ -2544,7 +2545,7 @@
         <p:spPr>
           <a:xfrm>
             <a:off x="2528640" y="5797080"/>
-            <a:ext cx="752040" cy="756360"/>
+            <a:ext cx="751680" cy="756000"/>
           </a:xfrm>
           <a:prstGeom prst="rect">
             <a:avLst/>
@@ -2569,7 +2570,7 @@
         <p:spPr>
           <a:xfrm>
             <a:off x="198360" y="5868720"/>
-            <a:ext cx="838080" cy="664920"/>
+            <a:ext cx="837720" cy="664560"/>
           </a:xfrm>
           <a:prstGeom prst="rect">
             <a:avLst/>
@@ -2594,7 +2595,7 @@
         <p:spPr>
           <a:xfrm>
             <a:off x="1019160" y="5848200"/>
-            <a:ext cx="660240" cy="664920"/>
+            <a:ext cx="659880" cy="664560"/>
           </a:xfrm>
           <a:prstGeom prst="rect">
             <a:avLst/>
@@ -2619,7 +2620,7 @@
         <p:spPr>
           <a:xfrm>
             <a:off x="1797120" y="5876640"/>
-            <a:ext cx="684000" cy="664920"/>
+            <a:ext cx="683640" cy="664560"/>
           </a:xfrm>
           <a:prstGeom prst="rect">
             <a:avLst/>
@@ -2638,7 +2639,7 @@
         <p:spPr>
           <a:xfrm>
             <a:off x="0" y="0"/>
-            <a:ext cx="9140760" cy="838080"/>
+            <a:ext cx="9140400" cy="837720"/>
           </a:xfrm>
           <a:prstGeom prst="rect">
             <a:avLst/>
@@ -2666,7 +2667,7 @@
         <p:spPr>
           <a:xfrm>
             <a:off x="227520" y="123120"/>
-            <a:ext cx="1932120" cy="587160"/>
+            <a:ext cx="1931760" cy="586800"/>
           </a:xfrm>
           <a:prstGeom prst="rect">
             <a:avLst/>
@@ -2867,7 +2868,7 @@
         <p:spPr>
           <a:xfrm>
             <a:off x="0" y="0"/>
-            <a:ext cx="9140760" cy="567360"/>
+            <a:ext cx="9140400" cy="567000"/>
           </a:xfrm>
           <a:prstGeom prst="rect">
             <a:avLst/>
@@ -2895,7 +2896,7 @@
         <p:spPr>
           <a:xfrm>
             <a:off x="227520" y="123120"/>
-            <a:ext cx="1153440" cy="349560"/>
+            <a:ext cx="1153080" cy="349200"/>
           </a:xfrm>
           <a:prstGeom prst="rect">
             <a:avLst/>
@@ -2936,7 +2937,7 @@
         <p:spPr>
           <a:xfrm>
             <a:off x="0" y="856440"/>
-            <a:ext cx="9140760" cy="4636080"/>
+            <a:ext cx="9140400" cy="4635720"/>
           </a:xfrm>
           <a:prstGeom prst="rect">
             <a:avLst/>
@@ -2964,7 +2965,7 @@
         <p:spPr>
           <a:xfrm>
             <a:off x="0" y="5495760"/>
-            <a:ext cx="9140760" cy="1359000"/>
+            <a:ext cx="9140400" cy="1358640"/>
           </a:xfrm>
           <a:prstGeom prst="rect">
             <a:avLst/>
@@ -2983,7 +2984,7 @@
         <p:spPr>
           <a:xfrm>
             <a:off x="3500280" y="5729400"/>
-            <a:ext cx="5366880" cy="1205640"/>
+            <a:ext cx="5366520" cy="1205280"/>
           </a:xfrm>
           <a:prstGeom prst="rect">
             <a:avLst/>
@@ -3037,7 +3038,7 @@
         <p:spPr>
           <a:xfrm>
             <a:off x="2528640" y="5797080"/>
-            <a:ext cx="752040" cy="756360"/>
+            <a:ext cx="751680" cy="756000"/>
           </a:xfrm>
           <a:prstGeom prst="rect">
             <a:avLst/>
@@ -3062,7 +3063,7 @@
         <p:spPr>
           <a:xfrm>
             <a:off x="198360" y="5868720"/>
-            <a:ext cx="838080" cy="664920"/>
+            <a:ext cx="837720" cy="664560"/>
           </a:xfrm>
           <a:prstGeom prst="rect">
             <a:avLst/>
@@ -3087,7 +3088,7 @@
         <p:spPr>
           <a:xfrm>
             <a:off x="1019160" y="5848200"/>
-            <a:ext cx="660240" cy="664920"/>
+            <a:ext cx="659880" cy="664560"/>
           </a:xfrm>
           <a:prstGeom prst="rect">
             <a:avLst/>
@@ -3112,7 +3113,7 @@
         <p:spPr>
           <a:xfrm>
             <a:off x="1797120" y="5876640"/>
-            <a:ext cx="684000" cy="664920"/>
+            <a:ext cx="683640" cy="664560"/>
           </a:xfrm>
           <a:prstGeom prst="rect">
             <a:avLst/>
@@ -3131,7 +3132,7 @@
         <p:spPr>
           <a:xfrm>
             <a:off x="0" y="0"/>
-            <a:ext cx="9140760" cy="838080"/>
+            <a:ext cx="9140400" cy="837720"/>
           </a:xfrm>
           <a:prstGeom prst="rect">
             <a:avLst/>
@@ -3159,7 +3160,7 @@
         <p:spPr>
           <a:xfrm>
             <a:off x="227520" y="123120"/>
-            <a:ext cx="1932120" cy="587160"/>
+            <a:ext cx="1931760" cy="586800"/>
           </a:xfrm>
           <a:prstGeom prst="rect">
             <a:avLst/>
@@ -3346,188 +3347,56 @@
       </p:grpSpPr>
       <p:sp>
         <p:nvSpPr>
-          <p:cNvPr id="96" name="CustomShape 1"/>
-          <p:cNvSpPr/>
+          <p:cNvPr id="96" name="TextShape 1"/>
+          <p:cNvSpPr txBox="1"/>
           <p:nvPr/>
         </p:nvSpPr>
         <p:spPr>
           <a:xfrm>
-            <a:off x="685800" y="1406880"/>
-            <a:ext cx="7769160" cy="938160"/>
-          </a:xfrm>
-          <a:prstGeom prst="rect">
-            <a:avLst/>
-          </a:prstGeom>
-          <a:noFill/>
-          <a:ln>
-            <a:noFill/>
-          </a:ln>
-        </p:spPr>
-      </p:sp>
-      <p:sp>
-        <p:nvSpPr>
-          <p:cNvPr id="97" name="CustomShape 2"/>
-          <p:cNvSpPr/>
-          <p:nvPr/>
-        </p:nvSpPr>
-        <p:spPr>
-          <a:xfrm>
-            <a:off x="685800" y="3352320"/>
-            <a:ext cx="6397560" cy="1406880"/>
-          </a:xfrm>
-          <a:prstGeom prst="rect">
-            <a:avLst/>
-          </a:prstGeom>
-          <a:noFill/>
-          <a:ln>
-            <a:noFill/>
-          </a:ln>
-        </p:spPr>
-      </p:sp>
-      <p:sp>
-        <p:nvSpPr>
-          <p:cNvPr id="98" name="CustomShape 3"/>
-          <p:cNvSpPr/>
-          <p:nvPr/>
-        </p:nvSpPr>
-        <p:spPr>
-          <a:xfrm>
-            <a:off x="822960" y="3383280"/>
-            <a:ext cx="7405560" cy="1789560"/>
-          </a:xfrm>
-          <a:prstGeom prst="rect">
-            <a:avLst/>
-          </a:prstGeom>
-          <a:noFill/>
-          <a:ln>
-            <a:noFill/>
-          </a:ln>
-        </p:spPr>
-        <p:txBody>
-          <a:bodyPr bIns="45000" lIns="90000" rIns="90000" tIns="45000"/>
+            <a:off x="731520" y="1828800"/>
+            <a:ext cx="7406640" cy="1882080"/>
+          </a:xfrm>
+          <a:prstGeom prst="rect">
+            <a:avLst/>
+          </a:prstGeom>
+        </p:spPr>
+        <p:txBody>
+          <a:bodyPr bIns="45000" lIns="90000" rIns="90000" tIns="45000" wrap="none"/>
+          <a:p>
+            <a:r>
+              <a:rPr lang="en-US"/>
+              <a:t>This file deprecated.  Slides moved to Google Drive:</a:t>
+            </a:r>
+            <a:endParaRPr/>
+          </a:p>
+          <a:p>
+            <a:endParaRPr/>
+          </a:p>
+          <a:p>
+            <a:endParaRPr/>
+          </a:p>
           <a:p>
             <a:r>
               <a:rPr lang="en-US">
-                <a:latin typeface="Arial"/>
+                <a:hlinkClick r:id="rId1"/>
               </a:rPr>
-              <a:t>Dan Stoner</a:t>
-            </a:r>
-            <a:endParaRPr/>
-          </a:p>
-          <a:p>
-            <a:r>
-              <a:rPr lang="en-US">
-                <a:latin typeface="Arial"/>
-              </a:rPr>
-              <a:t>Advanced Computing and Information Systems Laboratory (ACIS)</a:t>
-            </a:r>
-            <a:endParaRPr/>
-          </a:p>
-          <a:p>
-            <a:r>
-              <a:rPr lang="en-US">
-                <a:latin typeface="Arial"/>
-              </a:rPr>
-              <a:t>University of Florida</a:t>
-            </a:r>
-            <a:endParaRPr/>
-          </a:p>
-          <a:p>
-            <a:endParaRPr/>
-          </a:p>
-          <a:p>
-            <a:r>
-              <a:rPr lang="en-US">
-                <a:latin typeface="Arial"/>
-              </a:rPr>
-              <a:t>dstoner@acis.ufl.edu                                       @thatlinuxbox</a:t>
-            </a:r>
-            <a:endParaRPr/>
-          </a:p>
-        </p:txBody>
-      </p:sp>
-      <p:sp>
-        <p:nvSpPr>
-          <p:cNvPr id="99" name="CustomShape 4"/>
-          <p:cNvSpPr/>
-          <p:nvPr/>
-        </p:nvSpPr>
-        <p:spPr>
-          <a:xfrm>
-            <a:off x="822960" y="1280160"/>
-            <a:ext cx="7496280" cy="1277640"/>
-          </a:xfrm>
-          <a:prstGeom prst="rect">
-            <a:avLst/>
-          </a:prstGeom>
-          <a:noFill/>
-          <a:ln>
-            <a:noFill/>
-          </a:ln>
-        </p:spPr>
-        <p:txBody>
-          <a:bodyPr bIns="45000" lIns="90000" rIns="90000" tIns="45000"/>
-          <a:p>
-            <a:r>
-              <a:rPr lang="en-US" sz="2400">
-                <a:latin typeface="Arial"/>
-              </a:rPr>
-              <a:t>CYWG (CyberInfrastructure Working Group)</a:t>
-            </a:r>
-            <a:endParaRPr/>
-          </a:p>
-          <a:p>
-            <a:r>
-              <a:rPr lang="en-US" sz="2400">
-                <a:latin typeface="Arial"/>
-              </a:rPr>
-              <a:t>October 2014</a:t>
-            </a:r>
-            <a:endParaRPr/>
-          </a:p>
-          <a:p>
-            <a:endParaRPr/>
-          </a:p>
-          <a:p>
-            <a:r>
-              <a:rPr b="1" lang="en-US" sz="2400">
-                <a:latin typeface="Arial"/>
-              </a:rPr>
-              <a:t>iDigBio Data Ingestion</a:t>
-            </a:r>
+              <a:t>https://docs.google.com/presentation/d/1xJkn3_FDuwIJRn9XQ64yGmywJ0bgB8Z5lSM0EbBDrP8/edit?usp=sharing</a:t>
+            </a:r>
+            <a:endParaRPr/>
+          </a:p>
+          <a:p>
+            <a:endParaRPr/>
+          </a:p>
+          <a:p>
+            <a:endParaRPr/>
+          </a:p>
+          <a:p>
             <a:endParaRPr/>
           </a:p>
         </p:txBody>
       </p:sp>
     </p:spTree>
   </p:cSld>
-  <p:timing>
-    <p:tnLst>
-      <p:par>
-        <p:cTn dur="indefinite" id="1" nodeType="tmRoot" restart="never">
-          <p:childTnLst>
-            <p:seq>
-              <p:cTn id="2" nodeType="mainSeq"/>
-              <p:prevCondLst>
-                <p:cond delay="0" evt="onPrev">
-                  <p:tgtEl>
-                    <p:sldTgt/>
-                  </p:tgtEl>
-                </p:cond>
-              </p:prevCondLst>
-              <p:nextCondLst>
-                <p:cond delay="0" evt="onNext">
-                  <p:tgtEl>
-                    <p:sldTgt/>
-                  </p:tgtEl>
-                </p:cond>
-              </p:nextCondLst>
-            </p:seq>
-          </p:childTnLst>
-        </p:cTn>
-      </p:par>
-    </p:tnLst>
-  </p:timing>
 </p:sld>
 </file>
 
@@ -3550,14 +3419,14 @@
       </p:grpSpPr>
       <p:sp>
         <p:nvSpPr>
-          <p:cNvPr id="115" name="CustomShape 1"/>
+          <p:cNvPr id="114" name="CustomShape 1"/>
           <p:cNvSpPr/>
           <p:nvPr/>
         </p:nvSpPr>
         <p:spPr>
           <a:xfrm>
-            <a:off x="822960" y="1299600"/>
-            <a:ext cx="7131960" cy="1027440"/>
+            <a:off x="685800" y="1005840"/>
+            <a:ext cx="7768800" cy="730440"/>
           </a:xfrm>
           <a:prstGeom prst="rect">
             <a:avLst/>
@@ -3568,41 +3437,28 @@
           </a:ln>
         </p:spPr>
         <p:txBody>
-          <a:bodyPr bIns="45000" lIns="90000" rIns="90000" tIns="45000" wrap="none"/>
-          <a:p>
-            <a:r>
-              <a:rPr lang="en-US" sz="2200"/>
-              <a:t>Specimen Data – Darwin Core</a:t>
-            </a:r>
-            <a:endParaRPr/>
-          </a:p>
-          <a:p>
-            <a:r>
-              <a:rPr lang="en-US" sz="2200" u="sng">
-                <a:solidFill>
-                  <a:srgbClr val="000000"/>
-                </a:solidFill>
-                <a:hlinkClick r:id="rId1"/>
+          <a:bodyPr anchor="ctr" bIns="0" lIns="0" rIns="0" tIns="0"/>
+          <a:p>
+            <a:r>
+              <a:rPr lang="en-US" sz="3200">
+                <a:latin typeface="Calibri"/>
               </a:rPr>
-              <a:t>http://www.tdwg.org/standards/450/</a:t>
-            </a:r>
-            <a:endParaRPr/>
-          </a:p>
-          <a:p>
-            <a:endParaRPr/>
-          </a:p>
-        </p:txBody>
-      </p:sp>
-      <p:sp>
-        <p:nvSpPr>
-          <p:cNvPr id="116" name="CustomShape 2"/>
+              <a:t>Dataset formats</a:t>
+            </a:r>
+            <a:endParaRPr/>
+          </a:p>
+        </p:txBody>
+      </p:sp>
+      <p:sp>
+        <p:nvSpPr>
+          <p:cNvPr id="115" name="CustomShape 2"/>
           <p:cNvSpPr/>
           <p:nvPr/>
         </p:nvSpPr>
         <p:spPr>
           <a:xfrm>
-            <a:off x="731520" y="2778480"/>
-            <a:ext cx="7680600" cy="857880"/>
+            <a:off x="457200" y="2011680"/>
+            <a:ext cx="8226000" cy="3566880"/>
           </a:xfrm>
           <a:prstGeom prst="rect">
             <a:avLst/>
@@ -3613,22 +3469,64 @@
           </a:ln>
         </p:spPr>
         <p:txBody>
-          <a:bodyPr bIns="45000" lIns="90000" rIns="90000" tIns="45000" wrap="none"/>
-          <a:p>
-            <a:r>
-              <a:rPr lang="en-US"/>
-              <a:t>Recommended Minimum: Record ID, Scientific Name, Occurence ID,</a:t>
-            </a:r>
-            <a:endParaRPr/>
-          </a:p>
-          <a:p>
-            <a:r>
-              <a:rPr lang="en-US"/>
-              <a:t>Event Date, Collector Name, Locality Data</a:t>
-            </a:r>
-            <a:endParaRPr/>
-          </a:p>
-          <a:p>
+          <a:bodyPr bIns="0" lIns="0" rIns="0" tIns="0"/>
+          <a:p>
+            <a:pPr>
+              <a:lnSpc>
+                <a:spcPct val="100000"/>
+              </a:lnSpc>
+            </a:pPr>
+            <a:endParaRPr/>
+          </a:p>
+          <a:p>
+            <a:pPr>
+              <a:lnSpc>
+                <a:spcPct val="100000"/>
+              </a:lnSpc>
+              <a:buSzPct val="25000"/>
+              <a:buFont typeface="StarSymbol"/>
+              <a:buChar char="l"/>
+            </a:pPr>
+            <a:r>
+              <a:rPr lang="en-US" sz="3200">
+                <a:latin typeface="Arial"/>
+              </a:rPr>
+              <a:t>IPT – DwC-A</a:t>
+            </a:r>
+            <a:endParaRPr/>
+          </a:p>
+          <a:p>
+            <a:pPr>
+              <a:lnSpc>
+                <a:spcPct val="100000"/>
+              </a:lnSpc>
+              <a:buSzPct val="25000"/>
+              <a:buFont typeface="StarSymbol"/>
+              <a:buChar char="l"/>
+            </a:pPr>
+            <a:r>
+              <a:rPr lang="en-US" sz="3200">
+                <a:latin typeface="Arial"/>
+              </a:rPr>
+              <a:t>Symbiota portals – DwC-A</a:t>
+            </a:r>
+            <a:endParaRPr/>
+          </a:p>
+          <a:p>
+            <a:pPr>
+              <a:lnSpc>
+                <a:spcPct val="100000"/>
+              </a:lnSpc>
+              <a:buSzPct val="25000"/>
+              <a:buFont typeface="StarSymbol"/>
+              <a:buChar char="l"/>
+            </a:pPr>
+            <a:r>
+              <a:rPr lang="en-US" sz="3200">
+                <a:latin typeface="Arial"/>
+              </a:rPr>
+              <a:t>iDigBio Feeder – DwC-A, CSV, …</a:t>
+            </a:r>
             <a:endParaRPr/>
           </a:p>
         </p:txBody>
@@ -3638,10 +3536,10 @@
   <p:timing>
     <p:tnLst>
       <p:par>
-        <p:cTn dur="indefinite" id="19" nodeType="tmRoot" restart="never">
+        <p:cTn dur="indefinite" id="17" nodeType="tmRoot" restart="never">
           <p:childTnLst>
             <p:seq>
-              <p:cTn id="20" nodeType="mainSeq"/>
+              <p:cTn id="18" nodeType="mainSeq"/>
               <p:prevCondLst>
                 <p:cond delay="0" evt="onPrev">
                   <p:tgtEl>
@@ -3684,14 +3582,14 @@
       </p:grpSpPr>
       <p:sp>
         <p:nvSpPr>
-          <p:cNvPr id="117" name="CustomShape 1"/>
+          <p:cNvPr id="116" name="CustomShape 1"/>
           <p:cNvSpPr/>
           <p:nvPr/>
         </p:nvSpPr>
         <p:spPr>
           <a:xfrm>
-            <a:off x="914400" y="1371600"/>
-            <a:ext cx="7497720" cy="1027440"/>
+            <a:off x="822960" y="1299600"/>
+            <a:ext cx="7131600" cy="1027080"/>
           </a:xfrm>
           <a:prstGeom prst="rect">
             <a:avLst/>
@@ -3706,7 +3604,7 @@
           <a:p>
             <a:r>
               <a:rPr lang="en-US" sz="2200"/>
-              <a:t>Media Data – Audubon Core</a:t>
+              <a:t>Specimen Data – Darwin Core</a:t>
             </a:r>
             <a:endParaRPr/>
           </a:p>
@@ -3718,7 +3616,47 @@
                 </a:solidFill>
                 <a:hlinkClick r:id="rId1"/>
               </a:rPr>
-              <a:t>http://www.tdwg.org/standards/638/</a:t>
+              <a:t>http://www.tdwg.org/standards/450/</a:t>
+            </a:r>
+            <a:endParaRPr/>
+          </a:p>
+          <a:p>
+            <a:endParaRPr/>
+          </a:p>
+        </p:txBody>
+      </p:sp>
+      <p:sp>
+        <p:nvSpPr>
+          <p:cNvPr id="117" name="CustomShape 2"/>
+          <p:cNvSpPr/>
+          <p:nvPr/>
+        </p:nvSpPr>
+        <p:spPr>
+          <a:xfrm>
+            <a:off x="731520" y="2778480"/>
+            <a:ext cx="7680240" cy="857520"/>
+          </a:xfrm>
+          <a:prstGeom prst="rect">
+            <a:avLst/>
+          </a:prstGeom>
+          <a:noFill/>
+          <a:ln>
+            <a:noFill/>
+          </a:ln>
+        </p:spPr>
+        <p:txBody>
+          <a:bodyPr bIns="45000" lIns="90000" rIns="90000" tIns="45000" wrap="none"/>
+          <a:p>
+            <a:r>
+              <a:rPr lang="en-US"/>
+              <a:t>Recommended Minimum: Record ID, Scientific Name, Occurence ID,</a:t>
+            </a:r>
+            <a:endParaRPr/>
+          </a:p>
+          <a:p>
+            <a:r>
+              <a:rPr lang="en-US"/>
+              <a:t>Event Date, Collector Name, Locality Data</a:t>
             </a:r>
             <a:endParaRPr/>
           </a:p>
@@ -3732,10 +3670,10 @@
   <p:timing>
     <p:tnLst>
       <p:par>
-        <p:cTn dur="indefinite" id="21" nodeType="tmRoot" restart="never">
+        <p:cTn dur="indefinite" id="19" nodeType="tmRoot" restart="never">
           <p:childTnLst>
             <p:seq>
-              <p:cTn id="22" nodeType="mainSeq"/>
+              <p:cTn id="20" nodeType="mainSeq"/>
               <p:prevCondLst>
                 <p:cond delay="0" evt="onPrev">
                   <p:tgtEl>
@@ -3784,8 +3722,8 @@
         </p:nvSpPr>
         <p:spPr>
           <a:xfrm>
-            <a:off x="731520" y="1371600"/>
-            <a:ext cx="4688280" cy="402480"/>
+            <a:off x="914400" y="1371600"/>
+            <a:ext cx="7497360" cy="1027080"/>
           </a:xfrm>
           <a:prstGeom prst="rect">
             <a:avLst/>
@@ -3800,204 +3738,56 @@
           <a:p>
             <a:r>
               <a:rPr lang="en-US" sz="2200"/>
-              <a:t>Details not covered in the Standards</a:t>
-            </a:r>
-            <a:endParaRPr/>
-          </a:p>
-        </p:txBody>
-      </p:sp>
-      <p:sp>
-        <p:nvSpPr>
-          <p:cNvPr id="119" name="CustomShape 2"/>
-          <p:cNvSpPr/>
-          <p:nvPr/>
-        </p:nvSpPr>
-        <p:spPr>
-          <a:xfrm>
-            <a:off x="822960" y="2194560"/>
-            <a:ext cx="7772040" cy="3242160"/>
-          </a:xfrm>
-          <a:prstGeom prst="rect">
-            <a:avLst/>
-          </a:prstGeom>
-          <a:noFill/>
-          <a:ln>
-            <a:noFill/>
-          </a:ln>
-        </p:spPr>
-        <p:txBody>
-          <a:bodyPr bIns="45000" lIns="90000" rIns="90000" tIns="45000" wrap="none"/>
-          <a:p>
-            <a:pPr>
-              <a:lnSpc>
-                <a:spcPct val="100000"/>
-              </a:lnSpc>
-              <a:buSzPct val="25000"/>
-              <a:buFont typeface="StarSymbol"/>
-              <a:buChar char="l"/>
-            </a:pPr>
-            <a:r>
-              <a:rPr lang="en-US" sz="2000"/>
-              <a:t>Controlled Vocabularies</a:t>
-            </a:r>
-            <a:endParaRPr/>
-          </a:p>
-          <a:p>
-            <a:pPr lvl="1">
-              <a:lnSpc>
-                <a:spcPct val="100000"/>
-              </a:lnSpc>
-              <a:buSzPct val="25000"/>
-              <a:buFont typeface="StarSymbol"/>
-              <a:buChar char="l"/>
-            </a:pPr>
-            <a:r>
-              <a:rPr lang="en-US" sz="2000"/>
-              <a:t>ISO Country Codes</a:t>
-            </a:r>
-            <a:endParaRPr/>
-          </a:p>
-          <a:p>
-            <a:pPr lvl="1">
-              <a:lnSpc>
-                <a:spcPct val="100000"/>
-              </a:lnSpc>
-              <a:buSzPct val="25000"/>
-              <a:buFont typeface="StarSymbol"/>
-              <a:buChar char="l"/>
-            </a:pPr>
-            <a:r>
-              <a:rPr lang="en-US" sz="2000"/>
-              <a:t>State/Province names</a:t>
-            </a:r>
-            <a:endParaRPr/>
-          </a:p>
-          <a:p>
-            <a:pPr>
-              <a:lnSpc>
-                <a:spcPct val="100000"/>
-              </a:lnSpc>
-              <a:buSzPct val="25000"/>
-              <a:buFont typeface="StarSymbol"/>
-              <a:buChar char="l"/>
-            </a:pPr>
-            <a:r>
-              <a:rPr lang="en-US" sz="2000"/>
-              <a:t>Data Formats</a:t>
-            </a:r>
-            <a:endParaRPr/>
-          </a:p>
-          <a:p>
-            <a:pPr lvl="1">
-              <a:lnSpc>
-                <a:spcPct val="100000"/>
-              </a:lnSpc>
-              <a:buSzPct val="25000"/>
-              <a:buFont typeface="StarSymbol"/>
-              <a:buChar char="l"/>
-            </a:pPr>
-            <a:r>
-              <a:rPr lang="en-US" sz="2000"/>
-              <a:t>ISO 8601 Dates</a:t>
-            </a:r>
-            <a:endParaRPr/>
-          </a:p>
-          <a:p>
-            <a:pPr lvl="1">
-              <a:lnSpc>
-                <a:spcPct val="100000"/>
-              </a:lnSpc>
-              <a:buSzPct val="25000"/>
-              <a:buFont typeface="StarSymbol"/>
-              <a:buChar char="l"/>
-            </a:pPr>
-            <a:r>
-              <a:rPr lang="en-US" sz="2000"/>
-              <a:t>WGS84 Decimal Lat/Long</a:t>
-            </a:r>
-            <a:endParaRPr/>
-          </a:p>
-          <a:p>
-            <a:pPr>
-              <a:lnSpc>
-                <a:spcPct val="100000"/>
-              </a:lnSpc>
-              <a:buSzPct val="25000"/>
-              <a:buFont typeface="StarSymbol"/>
-              <a:buChar char="l"/>
-            </a:pPr>
-            <a:r>
-              <a:rPr lang="en-US" sz="2000"/>
-              <a:t>Identifier Formats  (UUID, URN, ARK, DOI, URI, URL, LSID, ...)</a:t>
-            </a:r>
-            <a:endParaRPr/>
-          </a:p>
-          <a:p>
-            <a:pPr>
-              <a:lnSpc>
-                <a:spcPct val="100000"/>
-              </a:lnSpc>
-              <a:buSzPct val="25000"/>
-              <a:buFont typeface="StarSymbol"/>
-              <a:buChar char="l"/>
-            </a:pPr>
-            <a:r>
-              <a:rPr lang="en-US" sz="2000"/>
-              <a:t>Apple Core guidelines for herbaria</a:t>
-            </a:r>
-            <a:endParaRPr/>
-          </a:p>
-          <a:p>
-            <a:pPr>
-              <a:lnSpc>
-                <a:spcPct val="100000"/>
-              </a:lnSpc>
-              <a:buSzPct val="25000"/>
-              <a:buFont typeface="StarSymbol"/>
-              <a:buChar char="l"/>
-            </a:pPr>
-            <a:r>
-              <a:rPr lang="en-US" sz="2000" u="sng">
+              <a:t>Media Data – Audubon Core</a:t>
+            </a:r>
+            <a:endParaRPr/>
+          </a:p>
+          <a:p>
+            <a:r>
+              <a:rPr lang="en-US" sz="2200" u="sng">
                 <a:solidFill>
                   <a:srgbClr val="000000"/>
                 </a:solidFill>
                 <a:hlinkClick r:id="rId1"/>
               </a:rPr>
-              <a:t>http://code.google.com/p/applecore/wiki/Introduction</a:t>
-            </a:r>
-            <a:endParaRPr/>
-          </a:p>
-          <a:p>
-            <a:pPr>
-              <a:lnSpc>
-                <a:spcPct val="100000"/>
-              </a:lnSpc>
-              <a:buSzPct val="25000"/>
-              <a:buFont typeface="StarSymbol"/>
-              <a:buChar char="l"/>
-            </a:pPr>
-            <a:r>
-              <a:rPr lang="en-US" sz="2000">
-                <a:solidFill>
-                  <a:srgbClr val="000000"/>
-                </a:solidFill>
-              </a:rPr>
-              <a:t>Copyright and Licensing</a:t>
-            </a:r>
-            <a:endParaRPr/>
-          </a:p>
-          <a:p>
-            <a:pPr>
-              <a:lnSpc>
-                <a:spcPct val="100000"/>
-              </a:lnSpc>
-            </a:pPr>
+              <a:t>http://www.tdwg.org/standards/638/</a:t>
+            </a:r>
+            <a:endParaRPr/>
+          </a:p>
+          <a:p>
             <a:endParaRPr/>
           </a:p>
         </p:txBody>
       </p:sp>
     </p:spTree>
   </p:cSld>
+  <p:timing>
+    <p:tnLst>
+      <p:par>
+        <p:cTn dur="indefinite" id="21" nodeType="tmRoot" restart="never">
+          <p:childTnLst>
+            <p:seq>
+              <p:cTn id="22" nodeType="mainSeq"/>
+              <p:prevCondLst>
+                <p:cond delay="0" evt="onPrev">
+                  <p:tgtEl>
+                    <p:sldTgt/>
+                  </p:tgtEl>
+                </p:cond>
+              </p:prevCondLst>
+              <p:nextCondLst>
+                <p:cond delay="0" evt="onNext">
+                  <p:tgtEl>
+                    <p:sldTgt/>
+                  </p:tgtEl>
+                </p:cond>
+              </p:nextCondLst>
+            </p:seq>
+          </p:childTnLst>
+        </p:cTn>
+      </p:par>
+    </p:tnLst>
+  </p:timing>
 </p:sld>
 </file>
 
@@ -4018,9 +3808,251 @@
           <a:chExt cx="0" cy="0"/>
         </a:xfrm>
       </p:grpSpPr>
+      <p:sp>
+        <p:nvSpPr>
+          <p:cNvPr id="119" name="CustomShape 1"/>
+          <p:cNvSpPr/>
+          <p:nvPr/>
+        </p:nvSpPr>
+        <p:spPr>
+          <a:xfrm>
+            <a:off x="731520" y="1371600"/>
+            <a:ext cx="4687920" cy="402120"/>
+          </a:xfrm>
+          <a:prstGeom prst="rect">
+            <a:avLst/>
+          </a:prstGeom>
+          <a:noFill/>
+          <a:ln>
+            <a:noFill/>
+          </a:ln>
+        </p:spPr>
+        <p:txBody>
+          <a:bodyPr bIns="45000" lIns="90000" rIns="90000" tIns="45000" wrap="none"/>
+          <a:p>
+            <a:r>
+              <a:rPr lang="en-US" sz="2200"/>
+              <a:t>Details not covered in the Standards</a:t>
+            </a:r>
+            <a:endParaRPr/>
+          </a:p>
+        </p:txBody>
+      </p:sp>
+      <p:sp>
+        <p:nvSpPr>
+          <p:cNvPr id="120" name="CustomShape 2"/>
+          <p:cNvSpPr/>
+          <p:nvPr/>
+        </p:nvSpPr>
+        <p:spPr>
+          <a:xfrm>
+            <a:off x="822960" y="2194560"/>
+            <a:ext cx="7771680" cy="3241800"/>
+          </a:xfrm>
+          <a:prstGeom prst="rect">
+            <a:avLst/>
+          </a:prstGeom>
+          <a:noFill/>
+          <a:ln>
+            <a:noFill/>
+          </a:ln>
+        </p:spPr>
+        <p:txBody>
+          <a:bodyPr bIns="45000" lIns="90000" rIns="90000" tIns="45000" wrap="none"/>
+          <a:p>
+            <a:pPr>
+              <a:lnSpc>
+                <a:spcPct val="100000"/>
+              </a:lnSpc>
+              <a:buSzPct val="25000"/>
+              <a:buFont typeface="StarSymbol"/>
+              <a:buChar char="l"/>
+            </a:pPr>
+            <a:r>
+              <a:rPr lang="en-US" sz="2000"/>
+              <a:t>Controlled Vocabularies</a:t>
+            </a:r>
+            <a:endParaRPr/>
+          </a:p>
+          <a:p>
+            <a:pPr lvl="1">
+              <a:lnSpc>
+                <a:spcPct val="100000"/>
+              </a:lnSpc>
+              <a:buSzPct val="25000"/>
+              <a:buFont typeface="StarSymbol"/>
+              <a:buChar char="l"/>
+            </a:pPr>
+            <a:r>
+              <a:rPr lang="en-US" sz="2000"/>
+              <a:t>ISO Country Codes</a:t>
+            </a:r>
+            <a:endParaRPr/>
+          </a:p>
+          <a:p>
+            <a:pPr lvl="1">
+              <a:lnSpc>
+                <a:spcPct val="100000"/>
+              </a:lnSpc>
+              <a:buSzPct val="25000"/>
+              <a:buFont typeface="StarSymbol"/>
+              <a:buChar char="l"/>
+            </a:pPr>
+            <a:r>
+              <a:rPr lang="en-US" sz="2000"/>
+              <a:t>State/Province names</a:t>
+            </a:r>
+            <a:endParaRPr/>
+          </a:p>
+          <a:p>
+            <a:pPr>
+              <a:lnSpc>
+                <a:spcPct val="100000"/>
+              </a:lnSpc>
+              <a:buSzPct val="25000"/>
+              <a:buFont typeface="StarSymbol"/>
+              <a:buChar char="l"/>
+            </a:pPr>
+            <a:r>
+              <a:rPr lang="en-US" sz="2000"/>
+              <a:t>Data Formats</a:t>
+            </a:r>
+            <a:endParaRPr/>
+          </a:p>
+          <a:p>
+            <a:pPr lvl="1">
+              <a:lnSpc>
+                <a:spcPct val="100000"/>
+              </a:lnSpc>
+              <a:buSzPct val="25000"/>
+              <a:buFont typeface="StarSymbol"/>
+              <a:buChar char="l"/>
+            </a:pPr>
+            <a:r>
+              <a:rPr lang="en-US" sz="2000"/>
+              <a:t>ISO 8601 Dates</a:t>
+            </a:r>
+            <a:endParaRPr/>
+          </a:p>
+          <a:p>
+            <a:pPr lvl="1">
+              <a:lnSpc>
+                <a:spcPct val="100000"/>
+              </a:lnSpc>
+              <a:buSzPct val="25000"/>
+              <a:buFont typeface="StarSymbol"/>
+              <a:buChar char="l"/>
+            </a:pPr>
+            <a:r>
+              <a:rPr lang="en-US" sz="2000"/>
+              <a:t>WGS84 Decimal Lat/Long</a:t>
+            </a:r>
+            <a:endParaRPr/>
+          </a:p>
+          <a:p>
+            <a:pPr>
+              <a:lnSpc>
+                <a:spcPct val="100000"/>
+              </a:lnSpc>
+              <a:buSzPct val="25000"/>
+              <a:buFont typeface="StarSymbol"/>
+              <a:buChar char="l"/>
+            </a:pPr>
+            <a:r>
+              <a:rPr lang="en-US" sz="2000"/>
+              <a:t>Identifier Formats  (UUID, URN, ARK, DOI, URI, URL, LSID, ...)</a:t>
+            </a:r>
+            <a:endParaRPr/>
+          </a:p>
+          <a:p>
+            <a:pPr>
+              <a:lnSpc>
+                <a:spcPct val="100000"/>
+              </a:lnSpc>
+              <a:buSzPct val="25000"/>
+              <a:buFont typeface="StarSymbol"/>
+              <a:buChar char="l"/>
+            </a:pPr>
+            <a:r>
+              <a:rPr lang="en-US" sz="2000"/>
+              <a:t>Apple Core guidelines for herbaria</a:t>
+            </a:r>
+            <a:endParaRPr/>
+          </a:p>
+          <a:p>
+            <a:pPr>
+              <a:lnSpc>
+                <a:spcPct val="100000"/>
+              </a:lnSpc>
+              <a:buSzPct val="25000"/>
+              <a:buFont typeface="StarSymbol"/>
+              <a:buChar char="l"/>
+            </a:pPr>
+            <a:r>
+              <a:rPr lang="en-US" sz="2000" u="sng">
+                <a:solidFill>
+                  <a:srgbClr val="000000"/>
+                </a:solidFill>
+                <a:hlinkClick r:id="rId1"/>
+              </a:rPr>
+              <a:t>http://code.google.com/p/applecore/wiki/Introduction</a:t>
+            </a:r>
+            <a:endParaRPr/>
+          </a:p>
+          <a:p>
+            <a:pPr>
+              <a:lnSpc>
+                <a:spcPct val="100000"/>
+              </a:lnSpc>
+              <a:buSzPct val="25000"/>
+              <a:buFont typeface="StarSymbol"/>
+              <a:buChar char="l"/>
+            </a:pPr>
+            <a:r>
+              <a:rPr lang="en-US" sz="2000">
+                <a:solidFill>
+                  <a:srgbClr val="000000"/>
+                </a:solidFill>
+              </a:rPr>
+              <a:t>Copyright and Licensing</a:t>
+            </a:r>
+            <a:endParaRPr/>
+          </a:p>
+          <a:p>
+            <a:pPr>
+              <a:lnSpc>
+                <a:spcPct val="100000"/>
+              </a:lnSpc>
+            </a:pPr>
+            <a:endParaRPr/>
+          </a:p>
+        </p:txBody>
+      </p:sp>
+    </p:spTree>
+  </p:cSld>
+</p:sld>
+</file>
+
+<file path=ppt/slides/slide14.xml><?xml version="1.0" encoding="utf-8"?>
+<p:sld xmlns:a="http://schemas.openxmlformats.org/drawingml/2006/main" xmlns:p="http://schemas.openxmlformats.org/presentationml/2006/main" xmlns:r="http://schemas.openxmlformats.org/officeDocument/2006/relationships">
+  <p:cSld>
+    <p:spTree>
+      <p:nvGrpSpPr>
+        <p:cNvPr id="1" name=""/>
+        <p:cNvGrpSpPr/>
+        <p:nvPr/>
+      </p:nvGrpSpPr>
+      <p:grpSpPr>
+        <a:xfrm>
+          <a:off x="0" y="0"/>
+          <a:ext cx="0" cy="0"/>
+          <a:chOff x="0" y="0"/>
+          <a:chExt cx="0" cy="0"/>
+        </a:xfrm>
+      </p:grpSpPr>
       <p:pic>
         <p:nvPicPr>
-          <p:cNvPr descr="" id="120" name=""/>
+          <p:cNvPr descr="" id="121" name=""/>
           <p:cNvPicPr/>
           <p:nvPr/>
         </p:nvPicPr>
@@ -4033,7 +4065,7 @@
         <p:spPr>
           <a:xfrm>
             <a:off x="511560" y="1716840"/>
-            <a:ext cx="8265240" cy="2945160"/>
+            <a:ext cx="8264880" cy="2944800"/>
           </a:xfrm>
           <a:prstGeom prst="rect">
             <a:avLst/>
@@ -4094,14 +4126,14 @@
       </p:grpSpPr>
       <p:sp>
         <p:nvSpPr>
-          <p:cNvPr id="100" name="CustomShape 1"/>
+          <p:cNvPr id="97" name="CustomShape 1"/>
           <p:cNvSpPr/>
           <p:nvPr/>
         </p:nvSpPr>
         <p:spPr>
           <a:xfrm>
-            <a:off x="685800" y="914400"/>
-            <a:ext cx="7769160" cy="363240"/>
+            <a:off x="685800" y="1406880"/>
+            <a:ext cx="7768800" cy="937800"/>
           </a:xfrm>
           <a:prstGeom prst="rect">
             <a:avLst/>
@@ -4111,53 +4143,151 @@
             <a:noFill/>
           </a:ln>
         </p:spPr>
-        <p:txBody>
-          <a:bodyPr anchor="ctr" bIns="0" lIns="0" rIns="0" tIns="0"/>
-          <a:p>
-            <a:r>
-              <a:rPr lang="en-US">
-                <a:latin typeface="Calibri"/>
-              </a:rPr>
-              <a:t>Over 300 Data Providers...</a:t>
-            </a:r>
-            <a:endParaRPr/>
-          </a:p>
-        </p:txBody>
-      </p:sp>
-      <p:pic>
-        <p:nvPicPr>
-          <p:cNvPr descr="" id="101" name=""/>
-          <p:cNvPicPr/>
+      </p:sp>
+      <p:sp>
+        <p:nvSpPr>
+          <p:cNvPr id="98" name="CustomShape 2"/>
+          <p:cNvSpPr/>
           <p:nvPr/>
-        </p:nvPicPr>
-        <p:blipFill>
-          <a:blip r:embed="rId1"/>
-          <a:stretch>
-            <a:fillRect/>
-          </a:stretch>
-        </p:blipFill>
-        <p:spPr>
-          <a:xfrm>
-            <a:off x="1920240" y="1418040"/>
-            <a:ext cx="5300640" cy="3975120"/>
-          </a:xfrm>
-          <a:prstGeom prst="rect">
-            <a:avLst/>
-          </a:prstGeom>
+        </p:nvSpPr>
+        <p:spPr>
+          <a:xfrm>
+            <a:off x="685800" y="3352320"/>
+            <a:ext cx="6397200" cy="1406520"/>
+          </a:xfrm>
+          <a:prstGeom prst="rect">
+            <a:avLst/>
+          </a:prstGeom>
+          <a:noFill/>
           <a:ln>
             <a:noFill/>
           </a:ln>
         </p:spPr>
-      </p:pic>
+      </p:sp>
+      <p:sp>
+        <p:nvSpPr>
+          <p:cNvPr id="99" name="CustomShape 3"/>
+          <p:cNvSpPr/>
+          <p:nvPr/>
+        </p:nvSpPr>
+        <p:spPr>
+          <a:xfrm>
+            <a:off x="822960" y="3383280"/>
+            <a:ext cx="7405200" cy="1789200"/>
+          </a:xfrm>
+          <a:prstGeom prst="rect">
+            <a:avLst/>
+          </a:prstGeom>
+          <a:noFill/>
+          <a:ln>
+            <a:noFill/>
+          </a:ln>
+        </p:spPr>
+        <p:txBody>
+          <a:bodyPr bIns="45000" lIns="90000" rIns="90000" tIns="45000"/>
+          <a:p>
+            <a:r>
+              <a:rPr lang="en-US">
+                <a:latin typeface="Arial"/>
+              </a:rPr>
+              <a:t>Dan Stoner</a:t>
+            </a:r>
+            <a:endParaRPr/>
+          </a:p>
+          <a:p>
+            <a:r>
+              <a:rPr lang="en-US">
+                <a:latin typeface="Arial"/>
+              </a:rPr>
+              <a:t>Advanced Computing and Information Systems Laboratory (ACIS)</a:t>
+            </a:r>
+            <a:endParaRPr/>
+          </a:p>
+          <a:p>
+            <a:r>
+              <a:rPr lang="en-US">
+                <a:latin typeface="Arial"/>
+              </a:rPr>
+              <a:t>University of Florida</a:t>
+            </a:r>
+            <a:endParaRPr/>
+          </a:p>
+          <a:p>
+            <a:endParaRPr/>
+          </a:p>
+          <a:p>
+            <a:r>
+              <a:rPr lang="en-US">
+                <a:latin typeface="Arial"/>
+              </a:rPr>
+              <a:t>dstoner@acis.ufl.edu                                       @thatlinuxbox</a:t>
+            </a:r>
+            <a:endParaRPr/>
+          </a:p>
+        </p:txBody>
+      </p:sp>
+      <p:sp>
+        <p:nvSpPr>
+          <p:cNvPr id="100" name="CustomShape 4"/>
+          <p:cNvSpPr/>
+          <p:nvPr/>
+        </p:nvSpPr>
+        <p:spPr>
+          <a:xfrm>
+            <a:off x="822960" y="1280160"/>
+            <a:ext cx="7495920" cy="1277280"/>
+          </a:xfrm>
+          <a:prstGeom prst="rect">
+            <a:avLst/>
+          </a:prstGeom>
+          <a:noFill/>
+          <a:ln>
+            <a:noFill/>
+          </a:ln>
+        </p:spPr>
+        <p:txBody>
+          <a:bodyPr bIns="45000" lIns="90000" rIns="90000" tIns="45000"/>
+          <a:p>
+            <a:r>
+              <a:rPr lang="en-US" sz="2400">
+                <a:latin typeface="Arial"/>
+              </a:rPr>
+              <a:t>CYWG (CyberInfrastructure Working Group)</a:t>
+            </a:r>
+            <a:endParaRPr/>
+          </a:p>
+          <a:p>
+            <a:r>
+              <a:rPr lang="en-US" sz="2400">
+                <a:latin typeface="Arial"/>
+              </a:rPr>
+              <a:t>October 2014</a:t>
+            </a:r>
+            <a:endParaRPr/>
+          </a:p>
+          <a:p>
+            <a:endParaRPr/>
+          </a:p>
+          <a:p>
+            <a:r>
+              <a:rPr b="1" lang="en-US" sz="2400">
+                <a:latin typeface="Arial"/>
+              </a:rPr>
+              <a:t>iDigBio Data Ingestion</a:t>
+            </a:r>
+            <a:endParaRPr/>
+          </a:p>
+        </p:txBody>
+      </p:sp>
     </p:spTree>
   </p:cSld>
   <p:timing>
     <p:tnLst>
       <p:par>
-        <p:cTn dur="indefinite" id="3" nodeType="tmRoot" restart="never">
+        <p:cTn dur="indefinite" id="1" nodeType="tmRoot" restart="never">
           <p:childTnLst>
             <p:seq>
-              <p:cTn id="4" nodeType="mainSeq"/>
+              <p:cTn id="2" nodeType="mainSeq"/>
               <p:prevCondLst>
                 <p:cond delay="0" evt="onPrev">
                   <p:tgtEl>
@@ -4198,6 +4328,38 @@
           <a:chExt cx="0" cy="0"/>
         </a:xfrm>
       </p:grpSpPr>
+      <p:sp>
+        <p:nvSpPr>
+          <p:cNvPr id="101" name="CustomShape 1"/>
+          <p:cNvSpPr/>
+          <p:nvPr/>
+        </p:nvSpPr>
+        <p:spPr>
+          <a:xfrm>
+            <a:off x="685800" y="914400"/>
+            <a:ext cx="7768800" cy="362880"/>
+          </a:xfrm>
+          <a:prstGeom prst="rect">
+            <a:avLst/>
+          </a:prstGeom>
+          <a:noFill/>
+          <a:ln>
+            <a:noFill/>
+          </a:ln>
+        </p:spPr>
+        <p:txBody>
+          <a:bodyPr anchor="ctr" bIns="0" lIns="0" rIns="0" tIns="0"/>
+          <a:p>
+            <a:r>
+              <a:rPr lang="en-US">
+                <a:latin typeface="Calibri"/>
+              </a:rPr>
+              <a:t>Over 300 Data Providers...</a:t>
+            </a:r>
+            <a:endParaRPr/>
+          </a:p>
+        </p:txBody>
+      </p:sp>
       <p:pic>
         <p:nvPicPr>
           <p:cNvPr descr="" id="102" name=""/>
@@ -4212,8 +4374,8 @@
         </p:blipFill>
         <p:spPr>
           <a:xfrm>
-            <a:off x="1378800" y="1005840"/>
-            <a:ext cx="6292440" cy="4404240"/>
+            <a:off x="1920240" y="1418040"/>
+            <a:ext cx="5300280" cy="3974760"/>
           </a:xfrm>
           <a:prstGeom prst="rect">
             <a:avLst/>
@@ -4228,10 +4390,10 @@
   <p:timing>
     <p:tnLst>
       <p:par>
-        <p:cTn dur="indefinite" id="5" nodeType="tmRoot" restart="never">
+        <p:cTn dur="indefinite" id="3" nodeType="tmRoot" restart="never">
           <p:childTnLst>
             <p:seq>
-              <p:cTn id="6" nodeType="mainSeq"/>
+              <p:cTn id="4" nodeType="mainSeq"/>
               <p:prevCondLst>
                 <p:cond delay="0" evt="onPrev">
                   <p:tgtEl>
@@ -4286,8 +4448,8 @@
         </p:blipFill>
         <p:spPr>
           <a:xfrm>
-            <a:off x="362520" y="879120"/>
-            <a:ext cx="8359920" cy="4513680"/>
+            <a:off x="1378800" y="1005840"/>
+            <a:ext cx="6292080" cy="4403880"/>
           </a:xfrm>
           <a:prstGeom prst="rect">
             <a:avLst/>
@@ -4302,10 +4464,10 @@
   <p:timing>
     <p:tnLst>
       <p:par>
-        <p:cTn dur="indefinite" id="7" nodeType="tmRoot" restart="never">
+        <p:cTn dur="indefinite" id="5" nodeType="tmRoot" restart="never">
           <p:childTnLst>
             <p:seq>
-              <p:cTn id="8" nodeType="mainSeq"/>
+              <p:cTn id="6" nodeType="mainSeq"/>
               <p:prevCondLst>
                 <p:cond delay="0" evt="onPrev">
                   <p:tgtEl>
@@ -4346,49 +4508,9 @@
           <a:chExt cx="0" cy="0"/>
         </a:xfrm>
       </p:grpSpPr>
-      <p:sp>
-        <p:nvSpPr>
-          <p:cNvPr id="104" name="CustomShape 1"/>
-          <p:cNvSpPr/>
-          <p:nvPr/>
-        </p:nvSpPr>
-        <p:spPr>
-          <a:xfrm>
-            <a:off x="685800" y="1406880"/>
-            <a:ext cx="7769160" cy="938160"/>
-          </a:xfrm>
-          <a:prstGeom prst="rect">
-            <a:avLst/>
-          </a:prstGeom>
-          <a:noFill/>
-          <a:ln>
-            <a:noFill/>
-          </a:ln>
-        </p:spPr>
-      </p:sp>
-      <p:sp>
-        <p:nvSpPr>
-          <p:cNvPr id="105" name="CustomShape 2"/>
-          <p:cNvSpPr/>
-          <p:nvPr/>
-        </p:nvSpPr>
-        <p:spPr>
-          <a:xfrm>
-            <a:off x="418680" y="2492640"/>
-            <a:ext cx="8226360" cy="3974400"/>
-          </a:xfrm>
-          <a:prstGeom prst="rect">
-            <a:avLst/>
-          </a:prstGeom>
-          <a:noFill/>
-          <a:ln>
-            <a:noFill/>
-          </a:ln>
-        </p:spPr>
-      </p:sp>
       <p:pic>
         <p:nvPicPr>
-          <p:cNvPr descr="" id="106" name=""/>
+          <p:cNvPr descr="" id="104" name=""/>
           <p:cNvPicPr/>
           <p:nvPr/>
         </p:nvPicPr>
@@ -4400,8 +4522,8 @@
         </p:blipFill>
         <p:spPr>
           <a:xfrm>
-            <a:off x="91440" y="968760"/>
-            <a:ext cx="8994240" cy="4515480"/>
+            <a:off x="362520" y="879120"/>
+            <a:ext cx="8359560" cy="4513320"/>
           </a:xfrm>
           <a:prstGeom prst="rect">
             <a:avLst/>
@@ -4416,10 +4538,10 @@
   <p:timing>
     <p:tnLst>
       <p:par>
-        <p:cTn dur="indefinite" id="9" nodeType="tmRoot" restart="never">
+        <p:cTn dur="indefinite" id="7" nodeType="tmRoot" restart="never">
           <p:childTnLst>
             <p:seq>
-              <p:cTn id="10" nodeType="mainSeq"/>
+              <p:cTn id="8" nodeType="mainSeq"/>
               <p:prevCondLst>
                 <p:cond delay="0" evt="onPrev">
                   <p:tgtEl>
@@ -4462,14 +4584,14 @@
       </p:grpSpPr>
       <p:sp>
         <p:nvSpPr>
-          <p:cNvPr id="107" name="CustomShape 1"/>
+          <p:cNvPr id="105" name="CustomShape 1"/>
           <p:cNvSpPr/>
           <p:nvPr/>
         </p:nvSpPr>
         <p:spPr>
           <a:xfrm>
-            <a:off x="548640" y="822960"/>
-            <a:ext cx="7862040" cy="822600"/>
+            <a:off x="685800" y="1406880"/>
+            <a:ext cx="7768800" cy="937800"/>
           </a:xfrm>
           <a:prstGeom prst="rect">
             <a:avLst/>
@@ -4479,51 +4601,43 @@
             <a:noFill/>
           </a:ln>
         </p:spPr>
-        <p:txBody>
-          <a:bodyPr bIns="45000" lIns="90000" rIns="90000" tIns="45000"/>
-          <a:p>
-            <a:r>
-              <a:rPr lang="en-US" sz="2400">
-                <a:latin typeface="Arial"/>
-              </a:rPr>
-              <a:t>Ingestion Reporting</a:t>
-            </a:r>
-            <a:endParaRPr/>
-          </a:p>
-          <a:p>
-            <a:r>
-              <a:rPr lang="en-US" sz="2000" u="sng">
-                <a:solidFill>
-                  <a:srgbClr val="000000"/>
-                </a:solidFill>
-                <a:latin typeface="Arial"/>
-                <a:hlinkClick r:id="rId1"/>
-              </a:rPr>
-              <a:t>https://www.idigbio.org/portal/publishers</a:t>
-            </a:r>
-            <a:endParaRPr/>
-          </a:p>
-          <a:p>
-            <a:endParaRPr/>
-          </a:p>
-        </p:txBody>
+      </p:sp>
+      <p:sp>
+        <p:nvSpPr>
+          <p:cNvPr id="106" name="CustomShape 2"/>
+          <p:cNvSpPr/>
+          <p:nvPr/>
+        </p:nvSpPr>
+        <p:spPr>
+          <a:xfrm>
+            <a:off x="418680" y="2492640"/>
+            <a:ext cx="8226000" cy="3974040"/>
+          </a:xfrm>
+          <a:prstGeom prst="rect">
+            <a:avLst/>
+          </a:prstGeom>
+          <a:noFill/>
+          <a:ln>
+            <a:noFill/>
+          </a:ln>
+        </p:spPr>
       </p:sp>
       <p:pic>
         <p:nvPicPr>
-          <p:cNvPr descr="" id="108" name=""/>
+          <p:cNvPr descr="" id="107" name=""/>
           <p:cNvPicPr/>
           <p:nvPr/>
         </p:nvPicPr>
         <p:blipFill>
-          <a:blip r:embed="rId2"/>
+          <a:blip r:embed="rId1"/>
           <a:stretch>
             <a:fillRect/>
           </a:stretch>
         </p:blipFill>
         <p:spPr>
           <a:xfrm>
-            <a:off x="1420200" y="1737360"/>
-            <a:ext cx="6386040" cy="3747960"/>
+            <a:off x="91440" y="968760"/>
+            <a:ext cx="8993880" cy="4515120"/>
           </a:xfrm>
           <a:prstGeom prst="rect">
             <a:avLst/>
@@ -4538,10 +4652,10 @@
   <p:timing>
     <p:tnLst>
       <p:par>
-        <p:cTn dur="indefinite" id="11" nodeType="tmRoot" restart="never">
+        <p:cTn dur="indefinite" id="9" nodeType="tmRoot" restart="never">
           <p:childTnLst>
             <p:seq>
-              <p:cTn id="12" nodeType="mainSeq"/>
+              <p:cTn id="10" nodeType="mainSeq"/>
               <p:prevCondLst>
                 <p:cond delay="0" evt="onPrev">
                   <p:tgtEl>
@@ -4584,14 +4698,14 @@
       </p:grpSpPr>
       <p:sp>
         <p:nvSpPr>
-          <p:cNvPr id="109" name="CustomShape 1"/>
+          <p:cNvPr id="108" name="CustomShape 1"/>
           <p:cNvSpPr/>
           <p:nvPr/>
         </p:nvSpPr>
         <p:spPr>
           <a:xfrm>
-            <a:off x="685800" y="822960"/>
-            <a:ext cx="8000640" cy="1096560"/>
+            <a:off x="548640" y="822960"/>
+            <a:ext cx="7861680" cy="822240"/>
           </a:xfrm>
           <a:prstGeom prst="rect">
             <a:avLst/>
@@ -4602,167 +4716,68 @@
           </a:ln>
         </p:spPr>
         <p:txBody>
-          <a:bodyPr anchor="ctr" bIns="0" lIns="0" rIns="0" tIns="0"/>
-          <a:p>
-            <a:r>
-              <a:rPr lang="en-US" sz="2800">
-                <a:latin typeface="Calibri"/>
+          <a:bodyPr bIns="45000" lIns="90000" rIns="90000" tIns="45000"/>
+          <a:p>
+            <a:r>
+              <a:rPr lang="en-US" sz="2400">
+                <a:latin typeface="Arial"/>
               </a:rPr>
-              <a:t>Three types of data publishing technologies currently being consumed:</a:t>
-            </a:r>
-            <a:endParaRPr/>
-          </a:p>
-        </p:txBody>
-      </p:sp>
-      <p:sp>
-        <p:nvSpPr>
-          <p:cNvPr id="110" name="CustomShape 2"/>
-          <p:cNvSpPr/>
+              <a:t>Ingestion Reporting</a:t>
+            </a:r>
+            <a:endParaRPr/>
+          </a:p>
+          <a:p>
+            <a:r>
+              <a:rPr lang="en-US" sz="2000" u="sng">
+                <a:solidFill>
+                  <a:srgbClr val="000000"/>
+                </a:solidFill>
+                <a:latin typeface="Arial"/>
+                <a:hlinkClick r:id="rId1"/>
+              </a:rPr>
+              <a:t>https://www.idigbio.org/portal/publishers</a:t>
+            </a:r>
+            <a:endParaRPr/>
+          </a:p>
+          <a:p>
+            <a:endParaRPr/>
+          </a:p>
+        </p:txBody>
+      </p:sp>
+      <p:pic>
+        <p:nvPicPr>
+          <p:cNvPr descr="" id="109" name=""/>
+          <p:cNvPicPr/>
           <p:nvPr/>
-        </p:nvSpPr>
-        <p:spPr>
-          <a:xfrm>
-            <a:off x="418680" y="2103120"/>
-            <a:ext cx="8226360" cy="3016800"/>
-          </a:xfrm>
-          <a:prstGeom prst="rect">
-            <a:avLst/>
-          </a:prstGeom>
-          <a:noFill/>
+        </p:nvPicPr>
+        <p:blipFill>
+          <a:blip r:embed="rId2"/>
+          <a:stretch>
+            <a:fillRect/>
+          </a:stretch>
+        </p:blipFill>
+        <p:spPr>
+          <a:xfrm>
+            <a:off x="1420200" y="1737360"/>
+            <a:ext cx="6385680" cy="3747600"/>
+          </a:xfrm>
+          <a:prstGeom prst="rect">
+            <a:avLst/>
+          </a:prstGeom>
           <a:ln>
             <a:noFill/>
           </a:ln>
         </p:spPr>
-        <p:txBody>
-          <a:bodyPr bIns="0" lIns="0" rIns="0" tIns="0"/>
-          <a:p>
-            <a:pPr>
-              <a:lnSpc>
-                <a:spcPct val="100000"/>
-              </a:lnSpc>
-              <a:buSzPct val="25000"/>
-              <a:buFont typeface="StarSymbol"/>
-              <a:buChar char="l"/>
-            </a:pPr>
-            <a:r>
-              <a:rPr lang="en-US" sz="2400">
-                <a:latin typeface="Arial"/>
-              </a:rPr>
-              <a:t>GBIF Integrated Publishing Toolkit (IPT)</a:t>
-            </a:r>
-            <a:endParaRPr/>
-          </a:p>
-          <a:p>
-            <a:pPr>
-              <a:lnSpc>
-                <a:spcPct val="100000"/>
-              </a:lnSpc>
-              <a:buSzPct val="25000"/>
-              <a:buFont typeface="StarSymbol"/>
-              <a:buChar char="l"/>
-            </a:pPr>
-            <a:r>
-              <a:rPr lang="en-US" sz="2400">
-                <a:latin typeface="Arial"/>
-              </a:rPr>
-              <a:t>  </a:t>
-            </a:r>
-            <a:r>
-              <a:rPr lang="en-US" sz="2400">
-                <a:latin typeface="Arial"/>
-              </a:rPr>
-              <a:t>http://www.gbif.org/ipt</a:t>
-            </a:r>
-            <a:endParaRPr/>
-          </a:p>
-          <a:p>
-            <a:pPr>
-              <a:lnSpc>
-                <a:spcPct val="100000"/>
-              </a:lnSpc>
-              <a:buSzPct val="25000"/>
-              <a:buFont typeface="StarSymbol"/>
-              <a:buChar char="l"/>
-            </a:pPr>
-            <a:endParaRPr/>
-          </a:p>
-          <a:p>
-            <a:pPr>
-              <a:lnSpc>
-                <a:spcPct val="100000"/>
-              </a:lnSpc>
-              <a:buSzPct val="25000"/>
-              <a:buFont typeface="StarSymbol"/>
-              <a:buChar char="l"/>
-            </a:pPr>
-            <a:r>
-              <a:rPr lang="en-US" sz="2400">
-                <a:latin typeface="Arial"/>
-              </a:rPr>
-              <a:t>Symbiota – web-based collection management software</a:t>
-            </a:r>
-            <a:endParaRPr/>
-          </a:p>
-          <a:p>
-            <a:pPr>
-              <a:lnSpc>
-                <a:spcPct val="100000"/>
-              </a:lnSpc>
-              <a:buSzPct val="25000"/>
-              <a:buFont typeface="StarSymbol"/>
-              <a:buChar char="l"/>
-            </a:pPr>
-            <a:r>
-              <a:rPr lang="en-US" sz="2400">
-                <a:latin typeface="Arial"/>
-              </a:rPr>
-              <a:t>  </a:t>
-            </a:r>
-            <a:r>
-              <a:rPr lang="en-US" sz="2400">
-                <a:latin typeface="Arial"/>
-              </a:rPr>
-              <a:t>http://symbiota.org/</a:t>
-            </a:r>
-            <a:endParaRPr/>
-          </a:p>
-          <a:p>
-            <a:pPr>
-              <a:lnSpc>
-                <a:spcPct val="100000"/>
-              </a:lnSpc>
-              <a:buFont typeface="StarSymbol"/>
-              <a:buChar char="l"/>
-            </a:pPr>
-            <a:endParaRPr/>
-          </a:p>
-          <a:p>
-            <a:pPr>
-              <a:lnSpc>
-                <a:spcPct val="100000"/>
-              </a:lnSpc>
-              <a:buFont typeface="StarSymbol"/>
-              <a:buChar char="l"/>
-            </a:pPr>
-            <a:r>
-              <a:rPr lang="en-US" sz="2400">
-                <a:latin typeface="Arial"/>
-              </a:rPr>
-              <a:t>iDigBio Feeder – for providers who do not run infrastructure and send data to iDigBio via email or other means.</a:t>
-            </a:r>
-            <a:endParaRPr/>
-          </a:p>
-        </p:txBody>
-      </p:sp>
+      </p:pic>
     </p:spTree>
   </p:cSld>
   <p:timing>
     <p:tnLst>
       <p:par>
-        <p:cTn dur="indefinite" id="13" nodeType="tmRoot" restart="never">
+        <p:cTn dur="indefinite" id="11" nodeType="tmRoot" restart="never">
           <p:childTnLst>
             <p:seq>
-              <p:cTn id="14" nodeType="mainSeq"/>
+              <p:cTn id="12" nodeType="mainSeq"/>
               <p:prevCondLst>
                 <p:cond delay="0" evt="onPrev">
                   <p:tgtEl>
@@ -4803,41 +4818,16 @@
           <a:chExt cx="0" cy="0"/>
         </a:xfrm>
       </p:grpSpPr>
-      <p:pic>
-        <p:nvPicPr>
-          <p:cNvPr descr="" id="111" name=""/>
-          <p:cNvPicPr/>
-          <p:nvPr/>
-        </p:nvPicPr>
-        <p:blipFill>
-          <a:blip r:embed="rId1"/>
-          <a:stretch>
-            <a:fillRect/>
-          </a:stretch>
-        </p:blipFill>
-        <p:spPr>
-          <a:xfrm>
-            <a:off x="919080" y="2890080"/>
-            <a:ext cx="7146000" cy="2595600"/>
-          </a:xfrm>
-          <a:prstGeom prst="rect">
-            <a:avLst/>
-          </a:prstGeom>
-          <a:ln>
-            <a:noFill/>
-          </a:ln>
-        </p:spPr>
-      </p:pic>
-      <p:sp>
-        <p:nvSpPr>
-          <p:cNvPr id="112" name="CustomShape 1"/>
+      <p:sp>
+        <p:nvSpPr>
+          <p:cNvPr id="110" name="CustomShape 1"/>
           <p:cNvSpPr/>
           <p:nvPr/>
         </p:nvSpPr>
         <p:spPr>
           <a:xfrm>
-            <a:off x="548640" y="1005840"/>
-            <a:ext cx="7315200" cy="1522800"/>
+            <a:off x="685800" y="822960"/>
+            <a:ext cx="8000280" cy="1096200"/>
           </a:xfrm>
           <a:prstGeom prst="rect">
             <a:avLst/>
@@ -4848,35 +4838,148 @@
           </a:ln>
         </p:spPr>
         <p:txBody>
-          <a:bodyPr bIns="45000" lIns="90000" rIns="90000" tIns="45000" wrap="none"/>
-          <a:p>
-            <a:r>
-              <a:rPr lang="en-US" sz="2000"/>
-              <a:t>Darwin Core Archive / DwC-A</a:t>
-            </a:r>
-            <a:endParaRPr/>
-          </a:p>
-          <a:p>
-            <a:r>
-              <a:rPr lang="en-US" sz="2000"/>
-              <a:t>http://rs.tdwg.org/dwc/terms/guides/text/</a:t>
-            </a:r>
-            <a:endParaRPr/>
-          </a:p>
-          <a:p>
-            <a:endParaRPr/>
-          </a:p>
-          <a:p>
-            <a:r>
-              <a:rPr lang="en-US" sz="2000"/>
-              <a:t>A Darwin Core Archive is a zip file that includes both metadata</a:t>
-            </a:r>
-            <a:endParaRPr/>
-          </a:p>
-          <a:p>
-            <a:r>
-              <a:rPr lang="en-US" sz="2000"/>
-              <a:t>about the dataset, the data itself, and any optional extension data.</a:t>
+          <a:bodyPr anchor="ctr" bIns="0" lIns="0" rIns="0" tIns="0"/>
+          <a:p>
+            <a:r>
+              <a:rPr lang="en-US" sz="2800">
+                <a:latin typeface="Calibri"/>
+              </a:rPr>
+              <a:t>Three types of data publishing technologies currently being consumed:</a:t>
+            </a:r>
+            <a:endParaRPr/>
+          </a:p>
+        </p:txBody>
+      </p:sp>
+      <p:sp>
+        <p:nvSpPr>
+          <p:cNvPr id="111" name="CustomShape 2"/>
+          <p:cNvSpPr/>
+          <p:nvPr/>
+        </p:nvSpPr>
+        <p:spPr>
+          <a:xfrm>
+            <a:off x="418680" y="2103120"/>
+            <a:ext cx="8226000" cy="3016440"/>
+          </a:xfrm>
+          <a:prstGeom prst="rect">
+            <a:avLst/>
+          </a:prstGeom>
+          <a:noFill/>
+          <a:ln>
+            <a:noFill/>
+          </a:ln>
+        </p:spPr>
+        <p:txBody>
+          <a:bodyPr bIns="0" lIns="0" rIns="0" tIns="0"/>
+          <a:p>
+            <a:pPr>
+              <a:lnSpc>
+                <a:spcPct val="100000"/>
+              </a:lnSpc>
+              <a:buSzPct val="25000"/>
+              <a:buFont typeface="StarSymbol"/>
+              <a:buChar char="l"/>
+            </a:pPr>
+            <a:r>
+              <a:rPr lang="en-US" sz="2400">
+                <a:latin typeface="Arial"/>
+              </a:rPr>
+              <a:t>GBIF Integrated Publishing Toolkit (IPT)</a:t>
+            </a:r>
+            <a:endParaRPr/>
+          </a:p>
+          <a:p>
+            <a:pPr>
+              <a:lnSpc>
+                <a:spcPct val="100000"/>
+              </a:lnSpc>
+              <a:buSzPct val="25000"/>
+              <a:buFont typeface="StarSymbol"/>
+              <a:buChar char="l"/>
+            </a:pPr>
+            <a:r>
+              <a:rPr lang="en-US" sz="2400">
+                <a:latin typeface="Arial"/>
+              </a:rPr>
+              <a:t>  </a:t>
+            </a:r>
+            <a:r>
+              <a:rPr lang="en-US" sz="2400">
+                <a:latin typeface="Arial"/>
+              </a:rPr>
+              <a:t>http://www.gbif.org/ipt</a:t>
+            </a:r>
+            <a:endParaRPr/>
+          </a:p>
+          <a:p>
+            <a:pPr>
+              <a:lnSpc>
+                <a:spcPct val="100000"/>
+              </a:lnSpc>
+            </a:pPr>
+            <a:endParaRPr/>
+          </a:p>
+          <a:p>
+            <a:pPr>
+              <a:lnSpc>
+                <a:spcPct val="100000"/>
+              </a:lnSpc>
+              <a:buSzPct val="25000"/>
+              <a:buFont typeface="StarSymbol"/>
+              <a:buChar char="l"/>
+            </a:pPr>
+            <a:r>
+              <a:rPr lang="en-US" sz="2400">
+                <a:latin typeface="Arial"/>
+              </a:rPr>
+              <a:t>Symbiota – web-based collection management software</a:t>
+            </a:r>
+            <a:endParaRPr/>
+          </a:p>
+          <a:p>
+            <a:pPr>
+              <a:lnSpc>
+                <a:spcPct val="100000"/>
+              </a:lnSpc>
+              <a:buSzPct val="25000"/>
+              <a:buFont typeface="StarSymbol"/>
+              <a:buChar char="l"/>
+            </a:pPr>
+            <a:r>
+              <a:rPr lang="en-US" sz="2400">
+                <a:latin typeface="Arial"/>
+              </a:rPr>
+              <a:t>  </a:t>
+            </a:r>
+            <a:r>
+              <a:rPr lang="en-US" sz="2400">
+                <a:latin typeface="Arial"/>
+              </a:rPr>
+              <a:t>http://symbiota.org/</a:t>
+            </a:r>
+            <a:endParaRPr/>
+          </a:p>
+          <a:p>
+            <a:pPr>
+              <a:lnSpc>
+                <a:spcPct val="100000"/>
+              </a:lnSpc>
+            </a:pPr>
+            <a:endParaRPr/>
+          </a:p>
+          <a:p>
+            <a:pPr>
+              <a:lnSpc>
+                <a:spcPct val="100000"/>
+              </a:lnSpc>
+              <a:buFont typeface="StarSymbol"/>
+              <a:buChar char="l"/>
+            </a:pPr>
+            <a:r>
+              <a:rPr lang="en-US" sz="2400">
+                <a:latin typeface="Arial"/>
+              </a:rPr>
+              <a:t>iDigBio Feeder – for providers who do not run infrastructure and send data to iDigBio via email or other means.</a:t>
             </a:r>
             <a:endParaRPr/>
           </a:p>
@@ -4887,10 +4990,10 @@
   <p:timing>
     <p:tnLst>
       <p:par>
-        <p:cTn dur="indefinite" id="15" nodeType="tmRoot" restart="never">
+        <p:cTn dur="indefinite" id="13" nodeType="tmRoot" restart="never">
           <p:childTnLst>
             <p:seq>
-              <p:cTn id="16" nodeType="mainSeq"/>
+              <p:cTn id="14" nodeType="mainSeq"/>
               <p:prevCondLst>
                 <p:cond delay="0" evt="onPrev">
                   <p:tgtEl>
@@ -4931,6 +5034,31 @@
           <a:chExt cx="0" cy="0"/>
         </a:xfrm>
       </p:grpSpPr>
+      <p:pic>
+        <p:nvPicPr>
+          <p:cNvPr descr="" id="112" name=""/>
+          <p:cNvPicPr/>
+          <p:nvPr/>
+        </p:nvPicPr>
+        <p:blipFill>
+          <a:blip r:embed="rId1"/>
+          <a:stretch>
+            <a:fillRect/>
+          </a:stretch>
+        </p:blipFill>
+        <p:spPr>
+          <a:xfrm>
+            <a:off x="919080" y="2890080"/>
+            <a:ext cx="7145640" cy="2595240"/>
+          </a:xfrm>
+          <a:prstGeom prst="rect">
+            <a:avLst/>
+          </a:prstGeom>
+          <a:ln>
+            <a:noFill/>
+          </a:ln>
+        </p:spPr>
+      </p:pic>
       <p:sp>
         <p:nvSpPr>
           <p:cNvPr id="113" name="CustomShape 1"/>
@@ -4939,8 +5067,8 @@
         </p:nvSpPr>
         <p:spPr>
           <a:xfrm>
-            <a:off x="685800" y="1005840"/>
-            <a:ext cx="7769160" cy="730800"/>
+            <a:off x="548640" y="1005840"/>
+            <a:ext cx="7314840" cy="1522440"/>
           </a:xfrm>
           <a:prstGeom prst="rect">
             <a:avLst/>
@@ -4951,95 +5079,35 @@
           </a:ln>
         </p:spPr>
         <p:txBody>
-          <a:bodyPr anchor="ctr" bIns="0" lIns="0" rIns="0" tIns="0"/>
-          <a:p>
-            <a:r>
-              <a:rPr lang="en-US" sz="3200">
-                <a:latin typeface="Calibri"/>
-              </a:rPr>
-              <a:t>Dataset formats</a:t>
-            </a:r>
-            <a:endParaRPr/>
-          </a:p>
-        </p:txBody>
-      </p:sp>
-      <p:sp>
-        <p:nvSpPr>
-          <p:cNvPr id="114" name="CustomShape 2"/>
-          <p:cNvSpPr/>
-          <p:nvPr/>
-        </p:nvSpPr>
-        <p:spPr>
-          <a:xfrm>
-            <a:off x="457200" y="2011680"/>
-            <a:ext cx="8226360" cy="3567240"/>
-          </a:xfrm>
-          <a:prstGeom prst="rect">
-            <a:avLst/>
-          </a:prstGeom>
-          <a:noFill/>
-          <a:ln>
-            <a:noFill/>
-          </a:ln>
-        </p:spPr>
-        <p:txBody>
-          <a:bodyPr bIns="0" lIns="0" rIns="0" tIns="0"/>
-          <a:p>
-            <a:pPr>
-              <a:lnSpc>
-                <a:spcPct val="100000"/>
-              </a:lnSpc>
-            </a:pPr>
-            <a:endParaRPr/>
-          </a:p>
-          <a:p>
-            <a:pPr>
-              <a:lnSpc>
-                <a:spcPct val="100000"/>
-              </a:lnSpc>
-              <a:buSzPct val="25000"/>
-              <a:buFont typeface="StarSymbol"/>
-              <a:buChar char="l"/>
-            </a:pPr>
-            <a:r>
-              <a:rPr lang="en-US" sz="3200">
-                <a:latin typeface="Arial"/>
-              </a:rPr>
-              <a:t>IPT – DwC-A</a:t>
-            </a:r>
-            <a:endParaRPr/>
-          </a:p>
-          <a:p>
-            <a:pPr>
-              <a:lnSpc>
-                <a:spcPct val="100000"/>
-              </a:lnSpc>
-              <a:buSzPct val="25000"/>
-              <a:buFont typeface="StarSymbol"/>
-              <a:buChar char="l"/>
-            </a:pPr>
-            <a:r>
-              <a:rPr lang="en-US" sz="3200">
-                <a:latin typeface="Arial"/>
-              </a:rPr>
-              <a:t>Symbiota portals – DwC-A</a:t>
-            </a:r>
-            <a:endParaRPr/>
-          </a:p>
-          <a:p>
-            <a:pPr>
-              <a:lnSpc>
-                <a:spcPct val="100000"/>
-              </a:lnSpc>
-              <a:buSzPct val="25000"/>
-              <a:buFont typeface="StarSymbol"/>
-              <a:buChar char="l"/>
-            </a:pPr>
-            <a:r>
-              <a:rPr lang="en-US" sz="3200">
-                <a:latin typeface="Arial"/>
-              </a:rPr>
-              <a:t>iDigBio Feeder – DwC-A, CSV, …</a:t>
+          <a:bodyPr bIns="45000" lIns="90000" rIns="90000" tIns="45000" wrap="none"/>
+          <a:p>
+            <a:r>
+              <a:rPr lang="en-US" sz="2000"/>
+              <a:t>Darwin Core Archive / DwC-A</a:t>
+            </a:r>
+            <a:endParaRPr/>
+          </a:p>
+          <a:p>
+            <a:r>
+              <a:rPr lang="en-US" sz="2000"/>
+              <a:t>http://rs.tdwg.org/dwc/terms/guides/text/</a:t>
+            </a:r>
+            <a:endParaRPr/>
+          </a:p>
+          <a:p>
+            <a:endParaRPr/>
+          </a:p>
+          <a:p>
+            <a:r>
+              <a:rPr lang="en-US" sz="2000"/>
+              <a:t>A Darwin Core Archive is a zip file that includes both metadata</a:t>
+            </a:r>
+            <a:endParaRPr/>
+          </a:p>
+          <a:p>
+            <a:r>
+              <a:rPr lang="en-US" sz="2000"/>
+              <a:t>about the dataset, the data itself, and any optional extension data.</a:t>
             </a:r>
             <a:endParaRPr/>
           </a:p>
@@ -5050,10 +5118,10 @@
   <p:timing>
     <p:tnLst>
       <p:par>
-        <p:cTn dur="indefinite" id="17" nodeType="tmRoot" restart="never">
+        <p:cTn dur="indefinite" id="15" nodeType="tmRoot" restart="never">
           <p:childTnLst>
             <p:seq>
-              <p:cTn id="18" nodeType="mainSeq"/>
+              <p:cTn id="16" nodeType="mainSeq"/>
               <p:prevCondLst>
                 <p:cond delay="0" evt="onPrev">
                   <p:tgtEl>

</xml_diff>